<commit_message>
add mail builder class and sample; optimize http module; add some json samples for test
</commit_message>
<xml_diff>
--- a/doc/redis_cluster.pptx
+++ b/doc/redis_cluster.pptx
@@ -231,7 +231,7 @@
             <a:fld id="{22280FE6-A104-468D-880C-8FA3CB8840D3}" type="datetimeFigureOut">
               <a:rPr lang="zh-CN" altLang="en-US" smtClean="0"/>
               <a:pPr/>
-              <a:t>2015/5/27</a:t>
+              <a:t>2015/9/24</a:t>
             </a:fld>
             <a:endParaRPr lang="zh-CN" altLang="en-US"/>
           </a:p>
@@ -904,7 +904,7 @@
               <a:pPr>
                 <a:defRPr/>
               </a:pPr>
-              <a:t>2015/5/27</a:t>
+              <a:t>2015/9/24</a:t>
             </a:fld>
             <a:endParaRPr lang="zh-CN" altLang="en-US" sz="1200" dirty="0">
               <a:solidFill>
@@ -986,7 +986,7 @@
             <a:fld id="{8C5BEB32-F9B7-4A26-A503-E0A0BBE82DBD}" type="datetimeFigureOut">
               <a:rPr lang="zh-CN" altLang="en-US" smtClean="0"/>
               <a:pPr/>
-              <a:t>2015/5/27</a:t>
+              <a:t>2015/9/24</a:t>
             </a:fld>
             <a:endParaRPr lang="zh-CN" altLang="en-US"/>
           </a:p>
@@ -1076,7 +1076,7 @@
                 <a:tabLst/>
                 <a:defRPr/>
               </a:pPr>
-              <a:t>2015/5/27</a:t>
+              <a:t>2015/9/24</a:t>
             </a:fld>
             <a:endParaRPr kumimoji="0" lang="zh-CN" altLang="en-US" sz="1200" b="0" i="0" u="none" strike="noStrike" kern="1200" cap="none" spc="0" normalizeH="0" baseline="0" noProof="0" dirty="0">
               <a:ln>
@@ -1400,7 +1400,7 @@
                 <a:tabLst/>
                 <a:defRPr/>
               </a:pPr>
-              <a:t>2015/5/27</a:t>
+              <a:t>2015/9/24</a:t>
             </a:fld>
             <a:endParaRPr kumimoji="0" lang="zh-CN" altLang="en-US" sz="1200" b="0" i="0" u="none" strike="noStrike" kern="1200" cap="none" spc="0" normalizeH="0" baseline="0" noProof="0" dirty="0">
               <a:ln>
@@ -1969,7 +1969,7 @@
                 <a:tabLst/>
                 <a:defRPr/>
               </a:pPr>
-              <a:t>2015/5/27</a:t>
+              <a:t>2015/9/24</a:t>
             </a:fld>
             <a:endParaRPr kumimoji="0" lang="zh-CN" altLang="en-US" sz="1200" b="0" i="0" u="none" strike="noStrike" kern="1200" cap="none" spc="0" normalizeH="0" baseline="0" noProof="0" dirty="0">
               <a:ln>
@@ -2521,7 +2521,7 @@
                 <a:tabLst/>
                 <a:defRPr/>
               </a:pPr>
-              <a:t>2015/5/27</a:t>
+              <a:t>2015/9/24</a:t>
             </a:fld>
             <a:endParaRPr kumimoji="0" lang="zh-CN" altLang="en-US" sz="1200" b="0" i="0" u="none" strike="noStrike" kern="1200" cap="none" spc="0" normalizeH="0" baseline="0" noProof="0" dirty="0">
               <a:ln>
@@ -2787,7 +2787,7 @@
             <a:fld id="{8C5BEB32-F9B7-4A26-A503-E0A0BBE82DBD}" type="datetimeFigureOut">
               <a:rPr lang="zh-CN" altLang="en-US" smtClean="0"/>
               <a:pPr/>
-              <a:t>2015/5/27</a:t>
+              <a:t>2015/9/24</a:t>
             </a:fld>
             <a:endParaRPr lang="zh-CN" altLang="en-US"/>
           </a:p>
@@ -3027,7 +3027,7 @@
                 <a:tabLst/>
                 <a:defRPr/>
               </a:pPr>
-              <a:t>2015/5/27</a:t>
+              <a:t>2015/9/24</a:t>
             </a:fld>
             <a:endParaRPr kumimoji="0" lang="zh-CN" altLang="en-US" sz="1200" b="0" i="0" u="none" strike="noStrike" kern="1200" cap="none" spc="0" normalizeH="0" baseline="0" noProof="0" dirty="0">
               <a:ln>
@@ -3213,7 +3213,7 @@
             <a:fld id="{8C5BEB32-F9B7-4A26-A503-E0A0BBE82DBD}" type="datetimeFigureOut">
               <a:rPr lang="zh-CN" altLang="en-US" smtClean="0"/>
               <a:pPr/>
-              <a:t>2015/5/27</a:t>
+              <a:t>2015/9/24</a:t>
             </a:fld>
             <a:endParaRPr lang="zh-CN" altLang="en-US"/>
           </a:p>
@@ -3453,7 +3453,7 @@
                 <a:tabLst/>
                 <a:defRPr/>
               </a:pPr>
-              <a:t>2015/5/27</a:t>
+              <a:t>2015/9/24</a:t>
             </a:fld>
             <a:endParaRPr kumimoji="0" lang="zh-CN" altLang="en-US" sz="1200" b="0" i="0" u="none" strike="noStrike" kern="1200" cap="none" spc="0" normalizeH="0" baseline="0" noProof="0" dirty="0">
               <a:ln>
@@ -3615,7 +3615,7 @@
             <a:fld id="{8C5BEB32-F9B7-4A26-A503-E0A0BBE82DBD}" type="datetimeFigureOut">
               <a:rPr lang="zh-CN" altLang="en-US" smtClean="0"/>
               <a:pPr/>
-              <a:t>2015/5/27</a:t>
+              <a:t>2015/9/24</a:t>
             </a:fld>
             <a:endParaRPr lang="zh-CN" altLang="en-US"/>
           </a:p>
@@ -3956,7 +3956,7 @@
                 <a:tabLst/>
                 <a:defRPr/>
               </a:pPr>
-              <a:t>2015/5/27</a:t>
+              <a:t>2015/9/24</a:t>
             </a:fld>
             <a:endParaRPr kumimoji="0" lang="zh-CN" altLang="en-US" sz="1200" b="0" i="0" u="none" strike="noStrike" kern="1200" cap="none" spc="0" normalizeH="0" baseline="0" noProof="0" dirty="0">
               <a:ln>
@@ -4118,7 +4118,7 @@
             <a:fld id="{8C5BEB32-F9B7-4A26-A503-E0A0BBE82DBD}" type="datetimeFigureOut">
               <a:rPr lang="zh-CN" altLang="en-US" smtClean="0"/>
               <a:pPr/>
-              <a:t>2015/5/27</a:t>
+              <a:t>2015/9/24</a:t>
             </a:fld>
             <a:endParaRPr lang="zh-CN" altLang="en-US"/>
           </a:p>
@@ -4346,7 +4346,7 @@
                 <a:tabLst/>
                 <a:defRPr/>
               </a:pPr>
-              <a:t>2015/5/27</a:t>
+              <a:t>2015/9/24</a:t>
             </a:fld>
             <a:endParaRPr kumimoji="0" lang="zh-CN" altLang="en-US" sz="1200" b="0" i="0" u="none" strike="noStrike" kern="1200" cap="none" spc="0" normalizeH="0" baseline="0" noProof="0" dirty="0">
               <a:ln>
@@ -4651,7 +4651,7 @@
             <a:fld id="{8C5BEB32-F9B7-4A26-A503-E0A0BBE82DBD}" type="datetimeFigureOut">
               <a:rPr lang="zh-CN" altLang="en-US" smtClean="0"/>
               <a:pPr/>
-              <a:t>2015/5/27</a:t>
+              <a:t>2015/9/24</a:t>
             </a:fld>
             <a:endParaRPr lang="zh-CN" altLang="en-US"/>
           </a:p>
@@ -5269,7 +5269,7 @@
               <a:pPr>
                 <a:defRPr/>
               </a:pPr>
-              <a:t>2015/5/27</a:t>
+              <a:t>2015/9/24</a:t>
             </a:fld>
             <a:endParaRPr lang="zh-CN" altLang="en-US" sz="1200" dirty="0">
               <a:solidFill>
@@ -5417,7 +5417,7 @@
       </p:sp>
       <p:pic>
         <p:nvPicPr>
-          <p:cNvPr id="5" name="图片 4"/>
+          <p:cNvPr id="4" name="图片 3"/>
           <p:cNvPicPr>
             <a:picLocks noChangeAspect="1"/>
           </p:cNvPicPr>
@@ -5431,8 +5431,8 @@
         </p:blipFill>
         <p:spPr>
           <a:xfrm>
-            <a:off x="1331640" y="2276872"/>
-            <a:ext cx="6440311" cy="2997938"/>
+            <a:off x="1259632" y="2435018"/>
+            <a:ext cx="6480720" cy="3226229"/>
           </a:xfrm>
           <a:prstGeom prst="rect">
             <a:avLst/>
@@ -5722,7 +5722,7 @@
       </p:sp>
       <p:pic>
         <p:nvPicPr>
-          <p:cNvPr id="8" name="图片 7"/>
+          <p:cNvPr id="3" name="图片 2"/>
           <p:cNvPicPr>
             <a:picLocks noChangeAspect="1"/>
           </p:cNvPicPr>
@@ -5736,8 +5736,8 @@
         </p:blipFill>
         <p:spPr>
           <a:xfrm>
-            <a:off x="1331640" y="2276872"/>
-            <a:ext cx="6440311" cy="3925266"/>
+            <a:off x="781942" y="2363011"/>
+            <a:ext cx="7456788" cy="3773179"/>
           </a:xfrm>
           <a:prstGeom prst="rect">
             <a:avLst/>
@@ -11762,7 +11762,7 @@
         <a:srgbClr val="2F2F2F"/>
       </a:dk1>
       <a:lt1>
-        <a:sysClr val="window" lastClr="C0C0C0"/>
+        <a:sysClr val="window" lastClr="FFFFFF"/>
       </a:lt1>
       <a:dk2>
         <a:srgbClr val="5F5F5F"/>
@@ -12069,7 +12069,7 @@
         <a:sysClr val="windowText" lastClr="000000"/>
       </a:dk1>
       <a:lt1>
-        <a:sysClr val="window" lastClr="C0C0C0"/>
+        <a:sysClr val="window" lastClr="FFFFFF"/>
       </a:lt1>
       <a:dk2>
         <a:srgbClr val="1F497D"/>

</xml_diff>

<commit_message>
move acl_master from lib_acl for xcode project
</commit_message>
<xml_diff>
--- a/doc/redis_cluster.pptx
+++ b/doc/redis_cluster.pptx
@@ -231,7 +231,7 @@
             <a:fld id="{22280FE6-A104-468D-880C-8FA3CB8840D3}" type="datetimeFigureOut">
               <a:rPr lang="zh-CN" altLang="en-US" smtClean="0"/>
               <a:pPr/>
-              <a:t>2015/9/24</a:t>
+              <a:t>2017/6/14</a:t>
             </a:fld>
             <a:endParaRPr lang="zh-CN" altLang="en-US"/>
           </a:p>
@@ -904,7 +904,7 @@
               <a:pPr>
                 <a:defRPr/>
               </a:pPr>
-              <a:t>2015/9/24</a:t>
+              <a:t>2017/6/14</a:t>
             </a:fld>
             <a:endParaRPr lang="zh-CN" altLang="en-US" sz="1200" dirty="0">
               <a:solidFill>
@@ -986,7 +986,7 @@
             <a:fld id="{8C5BEB32-F9B7-4A26-A503-E0A0BBE82DBD}" type="datetimeFigureOut">
               <a:rPr lang="zh-CN" altLang="en-US" smtClean="0"/>
               <a:pPr/>
-              <a:t>2015/9/24</a:t>
+              <a:t>2017/6/14</a:t>
             </a:fld>
             <a:endParaRPr lang="zh-CN" altLang="en-US"/>
           </a:p>
@@ -1076,7 +1076,7 @@
                 <a:tabLst/>
                 <a:defRPr/>
               </a:pPr>
-              <a:t>2015/9/24</a:t>
+              <a:t>2017/6/14</a:t>
             </a:fld>
             <a:endParaRPr kumimoji="0" lang="zh-CN" altLang="en-US" sz="1200" b="0" i="0" u="none" strike="noStrike" kern="1200" cap="none" spc="0" normalizeH="0" baseline="0" noProof="0" dirty="0">
               <a:ln>
@@ -1400,7 +1400,7 @@
                 <a:tabLst/>
                 <a:defRPr/>
               </a:pPr>
-              <a:t>2015/9/24</a:t>
+              <a:t>2017/6/14</a:t>
             </a:fld>
             <a:endParaRPr kumimoji="0" lang="zh-CN" altLang="en-US" sz="1200" b="0" i="0" u="none" strike="noStrike" kern="1200" cap="none" spc="0" normalizeH="0" baseline="0" noProof="0" dirty="0">
               <a:ln>
@@ -1969,7 +1969,7 @@
                 <a:tabLst/>
                 <a:defRPr/>
               </a:pPr>
-              <a:t>2015/9/24</a:t>
+              <a:t>2017/6/14</a:t>
             </a:fld>
             <a:endParaRPr kumimoji="0" lang="zh-CN" altLang="en-US" sz="1200" b="0" i="0" u="none" strike="noStrike" kern="1200" cap="none" spc="0" normalizeH="0" baseline="0" noProof="0" dirty="0">
               <a:ln>
@@ -2521,7 +2521,7 @@
                 <a:tabLst/>
                 <a:defRPr/>
               </a:pPr>
-              <a:t>2015/9/24</a:t>
+              <a:t>2017/6/14</a:t>
             </a:fld>
             <a:endParaRPr kumimoji="0" lang="zh-CN" altLang="en-US" sz="1200" b="0" i="0" u="none" strike="noStrike" kern="1200" cap="none" spc="0" normalizeH="0" baseline="0" noProof="0" dirty="0">
               <a:ln>
@@ -2787,7 +2787,7 @@
             <a:fld id="{8C5BEB32-F9B7-4A26-A503-E0A0BBE82DBD}" type="datetimeFigureOut">
               <a:rPr lang="zh-CN" altLang="en-US" smtClean="0"/>
               <a:pPr/>
-              <a:t>2015/9/24</a:t>
+              <a:t>2017/6/14</a:t>
             </a:fld>
             <a:endParaRPr lang="zh-CN" altLang="en-US"/>
           </a:p>
@@ -3027,7 +3027,7 @@
                 <a:tabLst/>
                 <a:defRPr/>
               </a:pPr>
-              <a:t>2015/9/24</a:t>
+              <a:t>2017/6/14</a:t>
             </a:fld>
             <a:endParaRPr kumimoji="0" lang="zh-CN" altLang="en-US" sz="1200" b="0" i="0" u="none" strike="noStrike" kern="1200" cap="none" spc="0" normalizeH="0" baseline="0" noProof="0" dirty="0">
               <a:ln>
@@ -3213,7 +3213,7 @@
             <a:fld id="{8C5BEB32-F9B7-4A26-A503-E0A0BBE82DBD}" type="datetimeFigureOut">
               <a:rPr lang="zh-CN" altLang="en-US" smtClean="0"/>
               <a:pPr/>
-              <a:t>2015/9/24</a:t>
+              <a:t>2017/6/14</a:t>
             </a:fld>
             <a:endParaRPr lang="zh-CN" altLang="en-US"/>
           </a:p>
@@ -3453,7 +3453,7 @@
                 <a:tabLst/>
                 <a:defRPr/>
               </a:pPr>
-              <a:t>2015/9/24</a:t>
+              <a:t>2017/6/14</a:t>
             </a:fld>
             <a:endParaRPr kumimoji="0" lang="zh-CN" altLang="en-US" sz="1200" b="0" i="0" u="none" strike="noStrike" kern="1200" cap="none" spc="0" normalizeH="0" baseline="0" noProof="0" dirty="0">
               <a:ln>
@@ -3615,7 +3615,7 @@
             <a:fld id="{8C5BEB32-F9B7-4A26-A503-E0A0BBE82DBD}" type="datetimeFigureOut">
               <a:rPr lang="zh-CN" altLang="en-US" smtClean="0"/>
               <a:pPr/>
-              <a:t>2015/9/24</a:t>
+              <a:t>2017/6/14</a:t>
             </a:fld>
             <a:endParaRPr lang="zh-CN" altLang="en-US"/>
           </a:p>
@@ -3956,7 +3956,7 @@
                 <a:tabLst/>
                 <a:defRPr/>
               </a:pPr>
-              <a:t>2015/9/24</a:t>
+              <a:t>2017/6/14</a:t>
             </a:fld>
             <a:endParaRPr kumimoji="0" lang="zh-CN" altLang="en-US" sz="1200" b="0" i="0" u="none" strike="noStrike" kern="1200" cap="none" spc="0" normalizeH="0" baseline="0" noProof="0" dirty="0">
               <a:ln>
@@ -4118,7 +4118,7 @@
             <a:fld id="{8C5BEB32-F9B7-4A26-A503-E0A0BBE82DBD}" type="datetimeFigureOut">
               <a:rPr lang="zh-CN" altLang="en-US" smtClean="0"/>
               <a:pPr/>
-              <a:t>2015/9/24</a:t>
+              <a:t>2017/6/14</a:t>
             </a:fld>
             <a:endParaRPr lang="zh-CN" altLang="en-US"/>
           </a:p>
@@ -4346,7 +4346,7 @@
                 <a:tabLst/>
                 <a:defRPr/>
               </a:pPr>
-              <a:t>2015/9/24</a:t>
+              <a:t>2017/6/14</a:t>
             </a:fld>
             <a:endParaRPr kumimoji="0" lang="zh-CN" altLang="en-US" sz="1200" b="0" i="0" u="none" strike="noStrike" kern="1200" cap="none" spc="0" normalizeH="0" baseline="0" noProof="0" dirty="0">
               <a:ln>
@@ -4651,7 +4651,7 @@
             <a:fld id="{8C5BEB32-F9B7-4A26-A503-E0A0BBE82DBD}" type="datetimeFigureOut">
               <a:rPr lang="zh-CN" altLang="en-US" smtClean="0"/>
               <a:pPr/>
-              <a:t>2015/9/24</a:t>
+              <a:t>2017/6/14</a:t>
             </a:fld>
             <a:endParaRPr lang="zh-CN" altLang="en-US"/>
           </a:p>
@@ -5269,7 +5269,7 @@
               <a:pPr>
                 <a:defRPr/>
               </a:pPr>
-              <a:t>2015/9/24</a:t>
+              <a:t>2017/6/14</a:t>
             </a:fld>
             <a:endParaRPr lang="zh-CN" altLang="en-US" sz="1200" dirty="0">
               <a:solidFill>
@@ -6814,14 +6814,41 @@
             </a:r>
             <a:r>
               <a:rPr lang="zh-CN" altLang="en-US" sz="1800" dirty="0" smtClean="0"/>
-              <a:t>要差好几个数量级</a:t>
+              <a:t>要差好几个</a:t>
+            </a:r>
+            <a:r>
+              <a:rPr lang="zh-CN" altLang="en-US" sz="1800" dirty="0" smtClean="0"/>
+              <a:t>数量级</a:t>
             </a:r>
             <a:endParaRPr lang="en-US" altLang="zh-CN" sz="1800" dirty="0" smtClean="0"/>
           </a:p>
           <a:p>
             <a:r>
-              <a:rPr lang="en-US" altLang="zh-CN" sz="1800" dirty="0"/>
+              <a:rPr lang="en-US" altLang="zh-CN" sz="1800" dirty="0" smtClean="0"/>
               <a:t>8</a:t>
+            </a:r>
+            <a:r>
+              <a:rPr lang="zh-CN" altLang="en-US" sz="1800" dirty="0" smtClean="0"/>
+              <a:t>、</a:t>
+            </a:r>
+            <a:r>
+              <a:rPr lang="en-US" altLang="zh-CN" sz="1800" dirty="0" err="1" smtClean="0"/>
+              <a:t>redis</a:t>
+            </a:r>
+            <a:r>
+              <a:rPr lang="en-US" altLang="zh-CN" sz="1800" dirty="0" smtClean="0"/>
+              <a:t> </a:t>
+            </a:r>
+            <a:r>
+              <a:rPr lang="zh-CN" altLang="en-US" sz="1800" dirty="0" smtClean="0"/>
+              <a:t>的事务和数据库的概念上是不同的</a:t>
+            </a:r>
+            <a:endParaRPr lang="en-US" altLang="zh-CN" sz="1800" dirty="0" smtClean="0"/>
+          </a:p>
+          <a:p>
+            <a:r>
+              <a:rPr lang="en-US" altLang="zh-CN" sz="1800" dirty="0" smtClean="0"/>
+              <a:t>9</a:t>
             </a:r>
             <a:r>
               <a:rPr lang="zh-CN" altLang="en-US" sz="1800" dirty="0" smtClean="0"/>

</xml_diff>

<commit_message>
modify ppt about redis-cluster
</commit_message>
<xml_diff>
--- a/doc/redis_cluster.pptx
+++ b/doc/redis_cluster.pptx
@@ -150,6 +150,9 @@
         </p15:guide>
       </p15:sldGuideLst>
     </p:ext>
+    <p:ext uri="{2D200454-40CA-4A62-9FC3-DE9A4176ACB9}">
+      <p15:notesGuideLst xmlns:p15="http://schemas.microsoft.com/office/powerpoint/2012/main"/>
+    </p:ext>
   </p:extLst>
 </p:presentation>
 </file>
@@ -237,7 +240,7 @@
             <a:fld id="{22280FE6-A104-468D-880C-8FA3CB8840D3}" type="datetimeFigureOut">
               <a:rPr lang="zh-CN" altLang="en-US" smtClean="0"/>
               <a:pPr/>
-              <a:t>2017/6/18</a:t>
+              <a:t>2017/6/20</a:t>
             </a:fld>
             <a:endParaRPr lang="zh-CN" altLang="en-US"/>
           </a:p>
@@ -886,7 +889,7 @@
               <a:pPr>
                 <a:defRPr/>
               </a:pPr>
-              <a:t>2017/6/18</a:t>
+              <a:t>2017/6/20</a:t>
             </a:fld>
             <a:endParaRPr lang="zh-CN" altLang="en-US" sz="1200" dirty="0">
               <a:solidFill>
@@ -968,7 +971,7 @@
             <a:fld id="{8C5BEB32-F9B7-4A26-A503-E0A0BBE82DBD}" type="datetimeFigureOut">
               <a:rPr lang="zh-CN" altLang="en-US" smtClean="0"/>
               <a:pPr/>
-              <a:t>2017/6/18</a:t>
+              <a:t>2017/6/20</a:t>
             </a:fld>
             <a:endParaRPr lang="zh-CN" altLang="en-US"/>
           </a:p>
@@ -1058,7 +1061,7 @@
                 <a:tabLst/>
                 <a:defRPr/>
               </a:pPr>
-              <a:t>2017/6/18</a:t>
+              <a:t>2017/6/20</a:t>
             </a:fld>
             <a:endParaRPr kumimoji="0" lang="zh-CN" altLang="en-US" sz="1200" b="0" i="0" u="none" strike="noStrike" kern="1200" cap="none" spc="0" normalizeH="0" baseline="0" noProof="0" dirty="0">
               <a:ln>
@@ -1350,7 +1353,7 @@
                 <a:tabLst/>
                 <a:defRPr/>
               </a:pPr>
-              <a:t>2017/6/18</a:t>
+              <a:t>2017/6/20</a:t>
             </a:fld>
             <a:endParaRPr kumimoji="0" lang="zh-CN" altLang="en-US" sz="1200" b="0" i="0" u="none" strike="noStrike" kern="1200" cap="none" spc="0" normalizeH="0" baseline="0" noProof="0" dirty="0">
               <a:ln>
@@ -1919,7 +1922,7 @@
                 <a:tabLst/>
                 <a:defRPr/>
               </a:pPr>
-              <a:t>2017/6/18</a:t>
+              <a:t>2017/6/20</a:t>
             </a:fld>
             <a:endParaRPr kumimoji="0" lang="zh-CN" altLang="en-US" sz="1200" b="0" i="0" u="none" strike="noStrike" kern="1200" cap="none" spc="0" normalizeH="0" baseline="0" noProof="0" dirty="0">
               <a:ln>
@@ -2471,7 +2474,7 @@
                 <a:tabLst/>
                 <a:defRPr/>
               </a:pPr>
-              <a:t>2017/6/18</a:t>
+              <a:t>2017/6/20</a:t>
             </a:fld>
             <a:endParaRPr kumimoji="0" lang="zh-CN" altLang="en-US" sz="1200" b="0" i="0" u="none" strike="noStrike" kern="1200" cap="none" spc="0" normalizeH="0" baseline="0" noProof="0" dirty="0">
               <a:ln>
@@ -2737,7 +2740,7 @@
             <a:fld id="{8C5BEB32-F9B7-4A26-A503-E0A0BBE82DBD}" type="datetimeFigureOut">
               <a:rPr lang="zh-CN" altLang="en-US" smtClean="0"/>
               <a:pPr/>
-              <a:t>2017/6/18</a:t>
+              <a:t>2017/6/20</a:t>
             </a:fld>
             <a:endParaRPr lang="zh-CN" altLang="en-US"/>
           </a:p>
@@ -2977,7 +2980,7 @@
                 <a:tabLst/>
                 <a:defRPr/>
               </a:pPr>
-              <a:t>2017/6/18</a:t>
+              <a:t>2017/6/20</a:t>
             </a:fld>
             <a:endParaRPr kumimoji="0" lang="zh-CN" altLang="en-US" sz="1200" b="0" i="0" u="none" strike="noStrike" kern="1200" cap="none" spc="0" normalizeH="0" baseline="0" noProof="0" dirty="0">
               <a:ln>
@@ -3163,7 +3166,7 @@
             <a:fld id="{8C5BEB32-F9B7-4A26-A503-E0A0BBE82DBD}" type="datetimeFigureOut">
               <a:rPr lang="zh-CN" altLang="en-US" smtClean="0"/>
               <a:pPr/>
-              <a:t>2017/6/18</a:t>
+              <a:t>2017/6/20</a:t>
             </a:fld>
             <a:endParaRPr lang="zh-CN" altLang="en-US"/>
           </a:p>
@@ -3403,7 +3406,7 @@
                 <a:tabLst/>
                 <a:defRPr/>
               </a:pPr>
-              <a:t>2017/6/18</a:t>
+              <a:t>2017/6/20</a:t>
             </a:fld>
             <a:endParaRPr kumimoji="0" lang="zh-CN" altLang="en-US" sz="1200" b="0" i="0" u="none" strike="noStrike" kern="1200" cap="none" spc="0" normalizeH="0" baseline="0" noProof="0" dirty="0">
               <a:ln>
@@ -3565,7 +3568,7 @@
             <a:fld id="{8C5BEB32-F9B7-4A26-A503-E0A0BBE82DBD}" type="datetimeFigureOut">
               <a:rPr lang="zh-CN" altLang="en-US" smtClean="0"/>
               <a:pPr/>
-              <a:t>2017/6/18</a:t>
+              <a:t>2017/6/20</a:t>
             </a:fld>
             <a:endParaRPr lang="zh-CN" altLang="en-US"/>
           </a:p>
@@ -3874,7 +3877,7 @@
                 <a:tabLst/>
                 <a:defRPr/>
               </a:pPr>
-              <a:t>2017/6/18</a:t>
+              <a:t>2017/6/20</a:t>
             </a:fld>
             <a:endParaRPr kumimoji="0" lang="zh-CN" altLang="en-US" sz="1200" b="0" i="0" u="none" strike="noStrike" kern="1200" cap="none" spc="0" normalizeH="0" baseline="0" noProof="0" dirty="0">
               <a:ln>
@@ -4036,7 +4039,7 @@
             <a:fld id="{8C5BEB32-F9B7-4A26-A503-E0A0BBE82DBD}" type="datetimeFigureOut">
               <a:rPr lang="zh-CN" altLang="en-US" smtClean="0"/>
               <a:pPr/>
-              <a:t>2017/6/18</a:t>
+              <a:t>2017/6/20</a:t>
             </a:fld>
             <a:endParaRPr lang="zh-CN" altLang="en-US"/>
           </a:p>
@@ -4232,7 +4235,7 @@
                 <a:tabLst/>
                 <a:defRPr/>
               </a:pPr>
-              <a:t>2017/6/18</a:t>
+              <a:t>2017/6/20</a:t>
             </a:fld>
             <a:endParaRPr kumimoji="0" lang="zh-CN" altLang="en-US" sz="1200" b="0" i="0" u="none" strike="noStrike" kern="1200" cap="none" spc="0" normalizeH="0" baseline="0" noProof="0" dirty="0">
               <a:ln>
@@ -4537,7 +4540,7 @@
             <a:fld id="{8C5BEB32-F9B7-4A26-A503-E0A0BBE82DBD}" type="datetimeFigureOut">
               <a:rPr lang="zh-CN" altLang="en-US" smtClean="0"/>
               <a:pPr/>
-              <a:t>2017/6/18</a:t>
+              <a:t>2017/6/20</a:t>
             </a:fld>
             <a:endParaRPr lang="zh-CN" altLang="en-US"/>
           </a:p>
@@ -5115,7 +5118,7 @@
               <a:pPr>
                 <a:defRPr/>
               </a:pPr>
-              <a:t>2017/6/18</a:t>
+              <a:t>2017/6/20</a:t>
             </a:fld>
             <a:endParaRPr lang="zh-CN" altLang="en-US" sz="1200" dirty="0">
               <a:solidFill>
@@ -6529,10 +6532,15 @@
             <p:ph idx="1"/>
           </p:nvPr>
         </p:nvSpPr>
-        <p:spPr/>
+        <p:spPr>
+          <a:xfrm>
+            <a:off x="428596" y="1047733"/>
+            <a:ext cx="8607900" cy="5143536"/>
+          </a:xfrm>
+        </p:spPr>
         <p:txBody>
           <a:bodyPr>
-            <a:normAutofit lnSpcReduction="10000"/>
+            <a:normAutofit fontScale="92500" lnSpcReduction="10000"/>
           </a:bodyPr>
           <a:lstStyle/>
           <a:p>
@@ -6683,11 +6691,7 @@
             </a:r>
             <a:r>
               <a:rPr lang="zh-CN" altLang="en-US" sz="1800" dirty="0" smtClean="0"/>
-              <a:t>的事务和数据库的概念上是不同</a:t>
-            </a:r>
-            <a:r>
-              <a:rPr lang="zh-CN" altLang="en-US" sz="1800" dirty="0" smtClean="0"/>
-              <a:t>的</a:t>
+              <a:t>的事务和数据库的概念上是不同的</a:t>
             </a:r>
             <a:endParaRPr lang="en-US" altLang="zh-CN" sz="1800" dirty="0" smtClean="0"/>
           </a:p>
@@ -6793,7 +6797,11 @@
             </a:r>
             <a:r>
               <a:rPr lang="zh-CN" altLang="en-US" sz="1800" dirty="0" smtClean="0"/>
-              <a:t>、不同的集群设置不同的密码，防止数据乱写</a:t>
+              <a:t>、不同的集群设置不同的密码，防止数据乱</a:t>
+            </a:r>
+            <a:r>
+              <a:rPr lang="zh-CN" altLang="en-US" sz="1800" dirty="0" smtClean="0"/>
+              <a:t>写</a:t>
             </a:r>
             <a:endParaRPr lang="en-US" altLang="zh-CN" sz="1800" dirty="0" smtClean="0"/>
           </a:p>
@@ -6803,7 +6811,50 @@
               <a:t>14</a:t>
             </a:r>
             <a:r>
+              <a:rPr lang="zh-CN" altLang="en-US" sz="1800" dirty="0"/>
+              <a:t> </a:t>
+            </a:r>
+            <a:r>
               <a:rPr lang="zh-CN" altLang="en-US" sz="1800" dirty="0" smtClean="0"/>
+              <a:t>、通过 </a:t>
+            </a:r>
+            <a:r>
+              <a:rPr lang="en-US" altLang="zh-CN" sz="1800" dirty="0" smtClean="0"/>
+              <a:t>rename-command </a:t>
+            </a:r>
+            <a:r>
+              <a:rPr lang="zh-CN" altLang="en-US" sz="1800" dirty="0" smtClean="0"/>
+              <a:t>配置项禁止 </a:t>
+            </a:r>
+            <a:r>
+              <a:rPr lang="en-US" altLang="zh-CN" sz="1800" dirty="0" err="1" smtClean="0"/>
+              <a:t>flushdb</a:t>
+            </a:r>
+            <a:r>
+              <a:rPr lang="en-US" altLang="zh-CN" sz="1800" dirty="0" smtClean="0"/>
+              <a:t>/</a:t>
+            </a:r>
+            <a:r>
+              <a:rPr lang="en-US" altLang="zh-CN" sz="1800" dirty="0" err="1" smtClean="0"/>
+              <a:t>flushall</a:t>
+            </a:r>
+            <a:r>
+              <a:rPr lang="en-US" altLang="zh-CN" sz="1800" dirty="0" smtClean="0"/>
+              <a:t>/shutdown </a:t>
+            </a:r>
+            <a:r>
+              <a:rPr lang="zh-CN" altLang="en-US" sz="1800" dirty="0" smtClean="0"/>
+              <a:t>等危险命令</a:t>
+            </a:r>
+            <a:endParaRPr lang="en-US" altLang="zh-CN" sz="1800" dirty="0" smtClean="0"/>
+          </a:p>
+          <a:p>
+            <a:r>
+              <a:rPr lang="en-US" altLang="zh-CN" sz="1800" smtClean="0"/>
+              <a:t>15</a:t>
+            </a:r>
+            <a:r>
+              <a:rPr lang="zh-CN" altLang="en-US" sz="1800" smtClean="0"/>
               <a:t>、</a:t>
             </a:r>
             <a:r>
@@ -8627,22 +8678,14 @@
           <a:p>
             <a:r>
               <a:rPr lang="zh-CN" altLang="en-US" dirty="0" smtClean="0"/>
-              <a:t>客户端</a:t>
-            </a:r>
-            <a:r>
-              <a:rPr lang="zh-CN" altLang="en-US" dirty="0" smtClean="0"/>
-              <a:t>要求</a:t>
+              <a:t>客户端要求</a:t>
             </a:r>
             <a:endParaRPr lang="en-US" altLang="zh-CN" dirty="0" smtClean="0"/>
           </a:p>
           <a:p>
             <a:r>
               <a:rPr lang="en-US" altLang="zh-CN" dirty="0" err="1" smtClean="0"/>
-              <a:t>redis_build</a:t>
-            </a:r>
-            <a:r>
-              <a:rPr lang="en-US" altLang="zh-CN" dirty="0" err="1" smtClean="0"/>
-              <a:t>er</a:t>
+              <a:t>redis_builder</a:t>
             </a:r>
             <a:r>
               <a:rPr lang="en-US" altLang="zh-CN" dirty="0" smtClean="0"/>
@@ -9290,11 +9333,7 @@
             </a:r>
             <a:r>
               <a:rPr lang="zh-CN" altLang="en-US" sz="1800" dirty="0" smtClean="0"/>
-              <a:t>、官方</a:t>
-            </a:r>
-            <a:r>
-              <a:rPr lang="zh-CN" altLang="en-US" sz="1800" dirty="0" smtClean="0"/>
-              <a:t>网站：</a:t>
+              <a:t>、官方网站：</a:t>
             </a:r>
             <a:r>
               <a:rPr lang="en-US" altLang="zh-CN" sz="1800" dirty="0" smtClean="0">
@@ -9311,11 +9350,7 @@
             </a:r>
             <a:r>
               <a:rPr lang="zh-CN" altLang="en-US" sz="1800" dirty="0" smtClean="0"/>
-              <a:t>、中文</a:t>
-            </a:r>
-            <a:r>
-              <a:rPr lang="zh-CN" altLang="en-US" sz="1800" dirty="0" smtClean="0"/>
-              <a:t>翻译网站：</a:t>
+              <a:t>、中文翻译网站：</a:t>
             </a:r>
             <a:r>
               <a:rPr lang="en-US" altLang="zh-CN" sz="1800" dirty="0">
@@ -9385,19 +9420,11 @@
             </a:r>
             <a:r>
               <a:rPr lang="en-US" altLang="zh-CN" sz="1800" dirty="0" smtClean="0"/>
-              <a:t>C</a:t>
-            </a:r>
-            <a:r>
-              <a:rPr lang="en-US" altLang="zh-CN" sz="1800" dirty="0" smtClean="0"/>
-              <a:t>++</a:t>
+              <a:t>C++</a:t>
             </a:r>
             <a:r>
               <a:rPr lang="zh-CN" altLang="en-US" sz="1800" dirty="0" smtClean="0"/>
-              <a:t>客户端库</a:t>
-            </a:r>
-            <a:r>
-              <a:rPr lang="zh-CN" altLang="en-US" sz="1800" dirty="0" smtClean="0"/>
-              <a:t>：</a:t>
+              <a:t>客户端库：</a:t>
             </a:r>
             <a:endParaRPr lang="en-US" altLang="zh-CN" sz="1800" dirty="0" smtClean="0"/>
           </a:p>
@@ -9427,11 +9454,7 @@
             </a:r>
             <a:r>
               <a:rPr lang="en-US" altLang="zh-CN" sz="1800" dirty="0" smtClean="0"/>
-              <a:t>Redis</a:t>
-            </a:r>
-            <a:r>
-              <a:rPr lang="en-US" altLang="zh-CN" sz="1800" dirty="0" smtClean="0"/>
-              <a:t>builder</a:t>
+              <a:t>Redisbuilder</a:t>
             </a:r>
             <a:r>
               <a:rPr lang="zh-CN" altLang="en-US" sz="1800" dirty="0" smtClean="0"/>

</xml_diff>

<commit_message>
add content in ppt
</commit_message>
<xml_diff>
--- a/doc/redis_cluster.pptx
+++ b/doc/redis_cluster.pptx
@@ -5,7 +5,7 @@
     <p:sldMasterId id="2147483648" r:id="rId1"/>
   </p:sldMasterIdLst>
   <p:notesMasterIdLst>
-    <p:notesMasterId r:id="rId33"/>
+    <p:notesMasterId r:id="rId34"/>
   </p:notesMasterIdLst>
   <p:sldIdLst>
     <p:sldId id="256" r:id="rId2"/>
@@ -26,19 +26,20 @@
     <p:sldId id="345" r:id="rId17"/>
     <p:sldId id="346" r:id="rId18"/>
     <p:sldId id="363" r:id="rId19"/>
-    <p:sldId id="362" r:id="rId20"/>
-    <p:sldId id="359" r:id="rId21"/>
-    <p:sldId id="365" r:id="rId22"/>
-    <p:sldId id="364" r:id="rId23"/>
-    <p:sldId id="360" r:id="rId24"/>
-    <p:sldId id="350" r:id="rId25"/>
-    <p:sldId id="351" r:id="rId26"/>
-    <p:sldId id="352" r:id="rId27"/>
-    <p:sldId id="355" r:id="rId28"/>
-    <p:sldId id="354" r:id="rId29"/>
-    <p:sldId id="357" r:id="rId30"/>
-    <p:sldId id="353" r:id="rId31"/>
-    <p:sldId id="349" r:id="rId32"/>
+    <p:sldId id="366" r:id="rId20"/>
+    <p:sldId id="362" r:id="rId21"/>
+    <p:sldId id="359" r:id="rId22"/>
+    <p:sldId id="365" r:id="rId23"/>
+    <p:sldId id="364" r:id="rId24"/>
+    <p:sldId id="360" r:id="rId25"/>
+    <p:sldId id="350" r:id="rId26"/>
+    <p:sldId id="351" r:id="rId27"/>
+    <p:sldId id="352" r:id="rId28"/>
+    <p:sldId id="355" r:id="rId29"/>
+    <p:sldId id="354" r:id="rId30"/>
+    <p:sldId id="357" r:id="rId31"/>
+    <p:sldId id="353" r:id="rId32"/>
+    <p:sldId id="349" r:id="rId33"/>
   </p:sldIdLst>
   <p:sldSz cx="9144000" cy="6858000" type="screen4x3"/>
   <p:notesSz cx="6858000" cy="9144000"/>
@@ -247,7 +248,7 @@
             <a:fld id="{22280FE6-A104-468D-880C-8FA3CB8840D3}" type="datetimeFigureOut">
               <a:rPr lang="zh-CN" altLang="en-US" smtClean="0"/>
               <a:pPr/>
-              <a:t>2021/8/24</a:t>
+              <a:t>2021/8/25</a:t>
             </a:fld>
             <a:endParaRPr lang="zh-CN" altLang="en-US"/>
           </a:p>
@@ -895,7 +896,7 @@
               <a:pPr>
                 <a:defRPr/>
               </a:pPr>
-              <a:t>2021/8/24</a:t>
+              <a:t>2021/8/25</a:t>
             </a:fld>
             <a:endParaRPr lang="zh-CN" altLang="en-US" sz="1200" dirty="0">
               <a:solidFill>
@@ -977,7 +978,7 @@
             <a:fld id="{8C5BEB32-F9B7-4A26-A503-E0A0BBE82DBD}" type="datetimeFigureOut">
               <a:rPr lang="zh-CN" altLang="en-US" smtClean="0"/>
               <a:pPr/>
-              <a:t>2021/8/24</a:t>
+              <a:t>2021/8/25</a:t>
             </a:fld>
             <a:endParaRPr lang="zh-CN" altLang="en-US"/>
           </a:p>
@@ -1067,7 +1068,7 @@
                 <a:tabLst/>
                 <a:defRPr/>
               </a:pPr>
-              <a:t>2021/8/24</a:t>
+              <a:t>2021/8/25</a:t>
             </a:fld>
             <a:endParaRPr kumimoji="0" lang="zh-CN" altLang="en-US" sz="1200" b="0" i="0" u="none" strike="noStrike" kern="1200" cap="none" spc="0" normalizeH="0" baseline="0" noProof="0" dirty="0">
               <a:ln>
@@ -1359,7 +1360,7 @@
                 <a:tabLst/>
                 <a:defRPr/>
               </a:pPr>
-              <a:t>2021/8/24</a:t>
+              <a:t>2021/8/25</a:t>
             </a:fld>
             <a:endParaRPr kumimoji="0" lang="zh-CN" altLang="en-US" sz="1200" b="0" i="0" u="none" strike="noStrike" kern="1200" cap="none" spc="0" normalizeH="0" baseline="0" noProof="0" dirty="0">
               <a:ln>
@@ -1928,7 +1929,7 @@
                 <a:tabLst/>
                 <a:defRPr/>
               </a:pPr>
-              <a:t>2021/8/24</a:t>
+              <a:t>2021/8/25</a:t>
             </a:fld>
             <a:endParaRPr kumimoji="0" lang="zh-CN" altLang="en-US" sz="1200" b="0" i="0" u="none" strike="noStrike" kern="1200" cap="none" spc="0" normalizeH="0" baseline="0" noProof="0" dirty="0">
               <a:ln>
@@ -2480,7 +2481,7 @@
                 <a:tabLst/>
                 <a:defRPr/>
               </a:pPr>
-              <a:t>2021/8/24</a:t>
+              <a:t>2021/8/25</a:t>
             </a:fld>
             <a:endParaRPr kumimoji="0" lang="zh-CN" altLang="en-US" sz="1200" b="0" i="0" u="none" strike="noStrike" kern="1200" cap="none" spc="0" normalizeH="0" baseline="0" noProof="0" dirty="0">
               <a:ln>
@@ -2746,7 +2747,7 @@
             <a:fld id="{8C5BEB32-F9B7-4A26-A503-E0A0BBE82DBD}" type="datetimeFigureOut">
               <a:rPr lang="zh-CN" altLang="en-US" smtClean="0"/>
               <a:pPr/>
-              <a:t>2021/8/24</a:t>
+              <a:t>2021/8/25</a:t>
             </a:fld>
             <a:endParaRPr lang="zh-CN" altLang="en-US"/>
           </a:p>
@@ -2986,7 +2987,7 @@
                 <a:tabLst/>
                 <a:defRPr/>
               </a:pPr>
-              <a:t>2021/8/24</a:t>
+              <a:t>2021/8/25</a:t>
             </a:fld>
             <a:endParaRPr kumimoji="0" lang="zh-CN" altLang="en-US" sz="1200" b="0" i="0" u="none" strike="noStrike" kern="1200" cap="none" spc="0" normalizeH="0" baseline="0" noProof="0" dirty="0">
               <a:ln>
@@ -3172,7 +3173,7 @@
             <a:fld id="{8C5BEB32-F9B7-4A26-A503-E0A0BBE82DBD}" type="datetimeFigureOut">
               <a:rPr lang="zh-CN" altLang="en-US" smtClean="0"/>
               <a:pPr/>
-              <a:t>2021/8/24</a:t>
+              <a:t>2021/8/25</a:t>
             </a:fld>
             <a:endParaRPr lang="zh-CN" altLang="en-US"/>
           </a:p>
@@ -3412,7 +3413,7 @@
                 <a:tabLst/>
                 <a:defRPr/>
               </a:pPr>
-              <a:t>2021/8/24</a:t>
+              <a:t>2021/8/25</a:t>
             </a:fld>
             <a:endParaRPr kumimoji="0" lang="zh-CN" altLang="en-US" sz="1200" b="0" i="0" u="none" strike="noStrike" kern="1200" cap="none" spc="0" normalizeH="0" baseline="0" noProof="0" dirty="0">
               <a:ln>
@@ -3574,7 +3575,7 @@
             <a:fld id="{8C5BEB32-F9B7-4A26-A503-E0A0BBE82DBD}" type="datetimeFigureOut">
               <a:rPr lang="zh-CN" altLang="en-US" smtClean="0"/>
               <a:pPr/>
-              <a:t>2021/8/24</a:t>
+              <a:t>2021/8/25</a:t>
             </a:fld>
             <a:endParaRPr lang="zh-CN" altLang="en-US"/>
           </a:p>
@@ -3883,7 +3884,7 @@
                 <a:tabLst/>
                 <a:defRPr/>
               </a:pPr>
-              <a:t>2021/8/24</a:t>
+              <a:t>2021/8/25</a:t>
             </a:fld>
             <a:endParaRPr kumimoji="0" lang="zh-CN" altLang="en-US" sz="1200" b="0" i="0" u="none" strike="noStrike" kern="1200" cap="none" spc="0" normalizeH="0" baseline="0" noProof="0" dirty="0">
               <a:ln>
@@ -4045,7 +4046,7 @@
             <a:fld id="{8C5BEB32-F9B7-4A26-A503-E0A0BBE82DBD}" type="datetimeFigureOut">
               <a:rPr lang="zh-CN" altLang="en-US" smtClean="0"/>
               <a:pPr/>
-              <a:t>2021/8/24</a:t>
+              <a:t>2021/8/25</a:t>
             </a:fld>
             <a:endParaRPr lang="zh-CN" altLang="en-US"/>
           </a:p>
@@ -4241,7 +4242,7 @@
                 <a:tabLst/>
                 <a:defRPr/>
               </a:pPr>
-              <a:t>2021/8/24</a:t>
+              <a:t>2021/8/25</a:t>
             </a:fld>
             <a:endParaRPr kumimoji="0" lang="zh-CN" altLang="en-US" sz="1200" b="0" i="0" u="none" strike="noStrike" kern="1200" cap="none" spc="0" normalizeH="0" baseline="0" noProof="0" dirty="0">
               <a:ln>
@@ -4544,7 +4545,7 @@
             <a:fld id="{8C5BEB32-F9B7-4A26-A503-E0A0BBE82DBD}" type="datetimeFigureOut">
               <a:rPr lang="zh-CN" altLang="en-US" smtClean="0"/>
               <a:pPr/>
-              <a:t>2021/8/24</a:t>
+              <a:t>2021/8/25</a:t>
             </a:fld>
             <a:endParaRPr lang="zh-CN" altLang="en-US"/>
           </a:p>
@@ -4941,12 +4942,8 @@
               <a:t>集群 </a:t>
             </a:r>
             <a:r>
-              <a:rPr lang="en-US" altLang="zh-CN" dirty="0" err="1"/>
-              <a:t>Redis</a:t>
-            </a:r>
-            <a:r>
               <a:rPr lang="en-US" altLang="zh-CN" dirty="0"/>
-              <a:t> </a:t>
+              <a:t>Redis </a:t>
             </a:r>
             <a:r>
               <a:rPr lang="zh-CN" altLang="en-US" dirty="0"/>
@@ -5117,7 +5114,7 @@
               <a:pPr>
                 <a:defRPr/>
               </a:pPr>
-              <a:t>2021/8/24</a:t>
+              <a:t>2021/8/25</a:t>
             </a:fld>
             <a:endParaRPr lang="zh-CN" altLang="en-US" sz="1200" dirty="0">
               <a:solidFill>
@@ -6951,8 +6948,73 @@
               <a:t>、与直接操作本机内存相比，</a:t>
             </a:r>
             <a:r>
+              <a:rPr lang="en-US" altLang="zh-CN" sz="1800" dirty="0"/>
+              <a:t>redis </a:t>
+            </a:r>
+            <a:r>
+              <a:rPr lang="zh-CN" altLang="en-US" sz="1800" dirty="0"/>
+              <a:t>要差好几个数量级</a:t>
+            </a:r>
+            <a:endParaRPr lang="en-US" altLang="zh-CN" sz="1800" dirty="0"/>
+          </a:p>
+          <a:p>
+            <a:r>
+              <a:rPr lang="en-US" altLang="zh-CN" sz="1800" dirty="0"/>
+              <a:t>8</a:t>
+            </a:r>
+            <a:r>
+              <a:rPr lang="zh-CN" altLang="en-US" sz="1800" dirty="0"/>
+              <a:t>、</a:t>
+            </a:r>
+            <a:r>
+              <a:rPr lang="en-US" altLang="zh-CN" sz="1800" dirty="0"/>
+              <a:t>redis </a:t>
+            </a:r>
+            <a:r>
+              <a:rPr lang="zh-CN" altLang="en-US" sz="1800" dirty="0"/>
+              <a:t>的事务和数据库的概念上是不同的</a:t>
+            </a:r>
+            <a:endParaRPr lang="en-US" altLang="zh-CN" sz="1800" dirty="0"/>
+          </a:p>
+          <a:p>
+            <a:r>
+              <a:rPr lang="en-US" altLang="zh-CN" sz="1800" dirty="0"/>
+              <a:t>9</a:t>
+            </a:r>
+            <a:r>
+              <a:rPr lang="zh-CN" altLang="en-US" sz="1800" dirty="0"/>
+              <a:t>、单节点数据量不应过大（</a:t>
+            </a:r>
+            <a:r>
+              <a:rPr lang="en-US" altLang="zh-CN" sz="1800" dirty="0"/>
+              <a:t>5—10G</a:t>
+            </a:r>
+            <a:r>
+              <a:rPr lang="zh-CN" altLang="en-US" sz="1800" dirty="0"/>
+              <a:t>）：哈希查询效率、持久化 </a:t>
+            </a:r>
+            <a:r>
+              <a:rPr lang="en-US" altLang="zh-CN" sz="1800" dirty="0"/>
+              <a:t>IO </a:t>
+            </a:r>
+            <a:r>
+              <a:rPr lang="zh-CN" altLang="en-US" sz="1800" dirty="0"/>
+              <a:t>瓶颈</a:t>
+            </a:r>
+            <a:endParaRPr lang="en-US" altLang="zh-CN" sz="1800" dirty="0"/>
+          </a:p>
+          <a:p>
+            <a:r>
+              <a:rPr lang="en-US" altLang="zh-CN" sz="1800" dirty="0"/>
+              <a:t>10</a:t>
+            </a:r>
+            <a:r>
+              <a:rPr lang="zh-CN" altLang="en-US" sz="1800" dirty="0"/>
+              <a:t>、必须设置 </a:t>
+            </a:r>
+            <a:r>
               <a:rPr lang="en-US" altLang="zh-CN" sz="1800" dirty="0" err="1"/>
-              <a:t>redis</a:t>
+              <a:t>maxmemory</a:t>
             </a:r>
             <a:r>
               <a:rPr lang="en-US" altLang="zh-CN" sz="1800" dirty="0"/>
@@ -6960,193 +7022,116 @@
             </a:r>
             <a:r>
               <a:rPr lang="zh-CN" altLang="en-US" sz="1800" dirty="0"/>
-              <a:t>要差好几个数量级</a:t>
+              <a:t>值，防止使用 </a:t>
+            </a:r>
+            <a:r>
+              <a:rPr lang="en-US" altLang="zh-CN" sz="1800" dirty="0"/>
+              <a:t>swap</a:t>
+            </a:r>
+          </a:p>
+          <a:p>
+            <a:r>
+              <a:rPr lang="en-US" altLang="zh-CN" sz="1800" dirty="0"/>
+              <a:t>11</a:t>
+            </a:r>
+            <a:r>
+              <a:rPr lang="zh-CN" altLang="en-US" sz="1800" dirty="0"/>
+              <a:t>、慎重选择合适的 </a:t>
+            </a:r>
+            <a:r>
+              <a:rPr lang="en-US" altLang="zh-CN" sz="1800" dirty="0"/>
+              <a:t>save </a:t>
+            </a:r>
+            <a:r>
+              <a:rPr lang="zh-CN" altLang="en-US" sz="1800" dirty="0"/>
+              <a:t>配置：既要减少数据丢失、又要防止磁盘 </a:t>
+            </a:r>
+            <a:r>
+              <a:rPr lang="en-US" altLang="zh-CN" sz="1800" dirty="0"/>
+              <a:t>IO</a:t>
+            </a:r>
+            <a:r>
+              <a:rPr lang="zh-CN" altLang="en-US" sz="1800" dirty="0"/>
+              <a:t>瓶颈</a:t>
             </a:r>
             <a:endParaRPr lang="en-US" altLang="zh-CN" sz="1800" dirty="0"/>
           </a:p>
           <a:p>
             <a:r>
               <a:rPr lang="en-US" altLang="zh-CN" sz="1800" dirty="0"/>
-              <a:t>8</a:t>
+              <a:t>12</a:t>
+            </a:r>
+            <a:r>
+              <a:rPr lang="zh-CN" altLang="en-US" sz="1800" dirty="0"/>
+              <a:t>、禁止监听外网</a:t>
+            </a:r>
+            <a:r>
+              <a:rPr lang="en-US" altLang="zh-CN" sz="1800" dirty="0"/>
+              <a:t>IP</a:t>
+            </a:r>
+          </a:p>
+          <a:p>
+            <a:r>
+              <a:rPr lang="en-US" altLang="zh-CN" sz="1800" dirty="0"/>
+              <a:t>13</a:t>
+            </a:r>
+            <a:r>
+              <a:rPr lang="zh-CN" altLang="en-US" sz="1800" dirty="0"/>
+              <a:t>、不同的集群设置不同的密码，防止数据乱写</a:t>
+            </a:r>
+            <a:endParaRPr lang="en-US" altLang="zh-CN" sz="1800" dirty="0"/>
+          </a:p>
+          <a:p>
+            <a:r>
+              <a:rPr lang="en-US" altLang="zh-CN" sz="1800" dirty="0"/>
+              <a:t>14</a:t>
+            </a:r>
+            <a:r>
+              <a:rPr lang="zh-CN" altLang="en-US" sz="1800" dirty="0"/>
+              <a:t> 、通过 </a:t>
+            </a:r>
+            <a:r>
+              <a:rPr lang="en-US" altLang="zh-CN" sz="1800" dirty="0"/>
+              <a:t>rename-command </a:t>
+            </a:r>
+            <a:r>
+              <a:rPr lang="zh-CN" altLang="en-US" sz="1800" dirty="0"/>
+              <a:t>配置项禁止 </a:t>
+            </a:r>
+            <a:r>
+              <a:rPr lang="en-US" altLang="zh-CN" sz="1800" dirty="0" err="1"/>
+              <a:t>flushdb</a:t>
+            </a:r>
+            <a:r>
+              <a:rPr lang="en-US" altLang="zh-CN" sz="1800" dirty="0"/>
+              <a:t>/</a:t>
+            </a:r>
+            <a:r>
+              <a:rPr lang="en-US" altLang="zh-CN" sz="1800" dirty="0" err="1"/>
+              <a:t>flushall</a:t>
+            </a:r>
+            <a:r>
+              <a:rPr lang="en-US" altLang="zh-CN" sz="1800" dirty="0"/>
+              <a:t>/shutdown </a:t>
+            </a:r>
+            <a:r>
+              <a:rPr lang="zh-CN" altLang="en-US" sz="1800" dirty="0"/>
+              <a:t>等危险命令</a:t>
+            </a:r>
+            <a:endParaRPr lang="en-US" altLang="zh-CN" sz="1800" dirty="0"/>
+          </a:p>
+          <a:p>
+            <a:r>
+              <a:rPr lang="en-US" altLang="zh-CN" sz="1800" dirty="0"/>
+              <a:t>15</a:t>
             </a:r>
             <a:r>
               <a:rPr lang="zh-CN" altLang="en-US" sz="1800" dirty="0"/>
               <a:t>、</a:t>
             </a:r>
             <a:r>
-              <a:rPr lang="en-US" altLang="zh-CN" sz="1800" dirty="0" err="1"/>
-              <a:t>redis</a:t>
-            </a:r>
-            <a:r>
               <a:rPr lang="en-US" altLang="zh-CN" sz="1800" dirty="0"/>
-              <a:t> </a:t>
-            </a:r>
-            <a:r>
-              <a:rPr lang="zh-CN" altLang="en-US" sz="1800" dirty="0"/>
-              <a:t>的事务和数据库的概念上是不同的</a:t>
-            </a:r>
-            <a:endParaRPr lang="en-US" altLang="zh-CN" sz="1800" dirty="0"/>
-          </a:p>
-          <a:p>
-            <a:r>
-              <a:rPr lang="en-US" altLang="zh-CN" sz="1800" dirty="0"/>
-              <a:t>9</a:t>
-            </a:r>
-            <a:r>
-              <a:rPr lang="zh-CN" altLang="en-US" sz="1800" dirty="0"/>
-              <a:t>、单节点数据量不应过大（</a:t>
-            </a:r>
-            <a:r>
-              <a:rPr lang="en-US" altLang="zh-CN" sz="1800" dirty="0"/>
-              <a:t>5—10G</a:t>
-            </a:r>
-            <a:r>
-              <a:rPr lang="zh-CN" altLang="en-US" sz="1800" dirty="0"/>
-              <a:t>）：哈希查询效率、持久化 </a:t>
-            </a:r>
-            <a:r>
-              <a:rPr lang="en-US" altLang="zh-CN" sz="1800" dirty="0"/>
-              <a:t>IO </a:t>
-            </a:r>
-            <a:r>
-              <a:rPr lang="zh-CN" altLang="en-US" sz="1800" dirty="0"/>
-              <a:t>瓶颈</a:t>
-            </a:r>
-            <a:endParaRPr lang="en-US" altLang="zh-CN" sz="1800" dirty="0"/>
-          </a:p>
-          <a:p>
-            <a:r>
-              <a:rPr lang="en-US" altLang="zh-CN" sz="1800" dirty="0"/>
-              <a:t>10</a:t>
-            </a:r>
-            <a:r>
-              <a:rPr lang="zh-CN" altLang="en-US" sz="1800" dirty="0"/>
-              <a:t>、必须设置 </a:t>
-            </a:r>
-            <a:r>
-              <a:rPr lang="en-US" altLang="zh-CN" sz="1800" dirty="0" err="1"/>
-              <a:t>maxmemory</a:t>
-            </a:r>
-            <a:r>
-              <a:rPr lang="en-US" altLang="zh-CN" sz="1800" dirty="0"/>
-              <a:t> </a:t>
-            </a:r>
-            <a:r>
-              <a:rPr lang="zh-CN" altLang="en-US" sz="1800" dirty="0"/>
-              <a:t>值，防止使用 </a:t>
-            </a:r>
-            <a:r>
-              <a:rPr lang="en-US" altLang="zh-CN" sz="1800" dirty="0"/>
-              <a:t>swap</a:t>
-            </a:r>
-          </a:p>
-          <a:p>
-            <a:r>
-              <a:rPr lang="en-US" altLang="zh-CN" sz="1800" dirty="0"/>
-              <a:t>11</a:t>
-            </a:r>
-            <a:r>
-              <a:rPr lang="zh-CN" altLang="en-US" sz="1800" dirty="0"/>
-              <a:t>、慎重选择合适的 </a:t>
-            </a:r>
-            <a:r>
-              <a:rPr lang="en-US" altLang="zh-CN" sz="1800" dirty="0"/>
-              <a:t>save </a:t>
-            </a:r>
-            <a:r>
-              <a:rPr lang="zh-CN" altLang="en-US" sz="1800" dirty="0"/>
-              <a:t>配置：既要减少数据丢失、又要防止磁盘 </a:t>
-            </a:r>
-            <a:r>
-              <a:rPr lang="en-US" altLang="zh-CN" sz="1800" dirty="0"/>
-              <a:t>IO</a:t>
-            </a:r>
-            <a:r>
-              <a:rPr lang="zh-CN" altLang="en-US" sz="1800" dirty="0"/>
-              <a:t>瓶颈</a:t>
-            </a:r>
-            <a:endParaRPr lang="en-US" altLang="zh-CN" sz="1800" dirty="0"/>
-          </a:p>
-          <a:p>
-            <a:r>
-              <a:rPr lang="en-US" altLang="zh-CN" sz="1800" dirty="0"/>
-              <a:t>12</a:t>
-            </a:r>
-            <a:r>
-              <a:rPr lang="zh-CN" altLang="en-US" sz="1800" dirty="0"/>
-              <a:t>、禁止监听外网</a:t>
-            </a:r>
-            <a:r>
-              <a:rPr lang="en-US" altLang="zh-CN" sz="1800" dirty="0"/>
-              <a:t>IP</a:t>
-            </a:r>
-          </a:p>
-          <a:p>
-            <a:r>
-              <a:rPr lang="en-US" altLang="zh-CN" sz="1800" dirty="0"/>
-              <a:t>13</a:t>
-            </a:r>
-            <a:r>
-              <a:rPr lang="zh-CN" altLang="en-US" sz="1800" dirty="0"/>
-              <a:t>、不同的集群设置不同的密码，防止数据乱写</a:t>
-            </a:r>
-            <a:endParaRPr lang="en-US" altLang="zh-CN" sz="1800" dirty="0"/>
-          </a:p>
-          <a:p>
-            <a:r>
-              <a:rPr lang="en-US" altLang="zh-CN" sz="1800" dirty="0"/>
-              <a:t>14</a:t>
-            </a:r>
-            <a:r>
-              <a:rPr lang="zh-CN" altLang="en-US" sz="1800" dirty="0"/>
-              <a:t> 、通过 </a:t>
-            </a:r>
-            <a:r>
-              <a:rPr lang="en-US" altLang="zh-CN" sz="1800" dirty="0"/>
-              <a:t>rename-command </a:t>
-            </a:r>
-            <a:r>
-              <a:rPr lang="zh-CN" altLang="en-US" sz="1800" dirty="0"/>
-              <a:t>配置项禁止 </a:t>
-            </a:r>
-            <a:r>
-              <a:rPr lang="en-US" altLang="zh-CN" sz="1800" dirty="0" err="1"/>
-              <a:t>flushdb</a:t>
-            </a:r>
-            <a:r>
-              <a:rPr lang="en-US" altLang="zh-CN" sz="1800" dirty="0"/>
-              <a:t>/</a:t>
-            </a:r>
-            <a:r>
-              <a:rPr lang="en-US" altLang="zh-CN" sz="1800" dirty="0" err="1"/>
-              <a:t>flushall</a:t>
-            </a:r>
-            <a:r>
-              <a:rPr lang="en-US" altLang="zh-CN" sz="1800" dirty="0"/>
-              <a:t>/shutdown </a:t>
-            </a:r>
-            <a:r>
-              <a:rPr lang="zh-CN" altLang="en-US" sz="1800" dirty="0"/>
-              <a:t>等危险命令</a:t>
-            </a:r>
-            <a:endParaRPr lang="en-US" altLang="zh-CN" sz="1800" dirty="0"/>
-          </a:p>
-          <a:p>
-            <a:r>
-              <a:rPr lang="en-US" altLang="zh-CN" sz="1800" dirty="0"/>
-              <a:t>15</a:t>
-            </a:r>
-            <a:r>
-              <a:rPr lang="zh-CN" altLang="en-US" sz="1800" dirty="0"/>
-              <a:t>、</a:t>
-            </a:r>
-            <a:r>
-              <a:rPr lang="en-US" altLang="zh-CN" sz="1800" dirty="0" err="1"/>
-              <a:t>Redis</a:t>
-            </a:r>
-            <a:r>
-              <a:rPr lang="en-US" altLang="zh-CN" sz="1800" dirty="0"/>
-              <a:t> </a:t>
+              <a:t>Redis </a:t>
             </a:r>
             <a:r>
               <a:rPr lang="zh-CN" altLang="en-US" sz="1800" dirty="0"/>
@@ -7202,12 +7187,8 @@
           <a:lstStyle/>
           <a:p>
             <a:r>
-              <a:rPr lang="en-US" altLang="zh-CN" dirty="0" err="1"/>
-              <a:t>Redis</a:t>
-            </a:r>
-            <a:r>
               <a:rPr lang="en-US" altLang="zh-CN" dirty="0"/>
-              <a:t> </a:t>
+              <a:t>Redis </a:t>
             </a:r>
             <a:r>
               <a:rPr lang="zh-CN" altLang="en-US" dirty="0"/>
@@ -7667,7 +7648,7 @@
           <p:cNvPr id="2" name="标题 1">
             <a:extLst>
               <a:ext uri="{FF2B5EF4-FFF2-40B4-BE49-F238E27FC236}">
-                <a16:creationId xmlns:a16="http://schemas.microsoft.com/office/drawing/2014/main" id="{2A88D221-36EC-1C4A-86A7-23994D948939}"/>
+                <a16:creationId xmlns:a16="http://schemas.microsoft.com/office/drawing/2014/main" id="{023461AD-9164-614A-B168-CFDC7F9BFDFB}"/>
               </a:ext>
             </a:extLst>
           </p:cNvPr>
@@ -7684,72 +7665,2220 @@
           <a:lstStyle/>
           <a:p>
             <a:r>
+              <a:rPr kumimoji="1" lang="en-US" altLang="zh-CN" dirty="0"/>
+              <a:t>Acl Redis</a:t>
+            </a:r>
+            <a:r>
               <a:rPr kumimoji="1" lang="zh-CN" altLang="en-US" dirty="0"/>
-              <a:t>使用</a:t>
-            </a:r>
-            <a:r>
-              <a:rPr kumimoji="1" lang="en-US" altLang="zh-CN" dirty="0"/>
-              <a:t>Acl</a:t>
-            </a:r>
-            <a:r>
-              <a:rPr kumimoji="1" lang="zh-CN" altLang="en-US" dirty="0"/>
-              <a:t> </a:t>
-            </a:r>
-            <a:r>
-              <a:rPr kumimoji="1" lang="en-US" altLang="zh-CN" dirty="0"/>
-              <a:t>Redis</a:t>
-            </a:r>
-            <a:r>
-              <a:rPr kumimoji="1" lang="zh-CN" altLang="en-US" dirty="0"/>
-              <a:t>库轻松编写</a:t>
-            </a:r>
-            <a:r>
-              <a:rPr kumimoji="1" lang="en-US" altLang="zh-CN" dirty="0"/>
-              <a:t>Redis</a:t>
-            </a:r>
-            <a:r>
-              <a:rPr kumimoji="1" lang="zh-CN" altLang="en-US" dirty="0"/>
-              <a:t>应用</a:t>
+              <a:t>库类关系图谱</a:t>
             </a:r>
           </a:p>
         </p:txBody>
       </p:sp>
-      <p:pic>
-        <p:nvPicPr>
-          <p:cNvPr id="10" name="内容占位符 9">
+      <p:sp>
+        <p:nvSpPr>
+          <p:cNvPr id="4" name="矩形 3">
             <a:extLst>
               <a:ext uri="{FF2B5EF4-FFF2-40B4-BE49-F238E27FC236}">
-                <a16:creationId xmlns:a16="http://schemas.microsoft.com/office/drawing/2014/main" id="{F05670E7-C3CD-C64F-BE30-4EBF74CF1CB5}"/>
+                <a16:creationId xmlns:a16="http://schemas.microsoft.com/office/drawing/2014/main" id="{0E67DD62-A1C6-674A-90C0-157BB873F9F5}"/>
               </a:ext>
             </a:extLst>
           </p:cNvPr>
-          <p:cNvPicPr>
-            <a:picLocks noGrp="1" noChangeAspect="1"/>
-          </p:cNvPicPr>
-          <p:nvPr>
-            <p:ph idx="1"/>
-          </p:nvPr>
-        </p:nvPicPr>
-        <p:blipFill>
-          <a:blip r:embed="rId2"/>
-          <a:stretch>
-            <a:fillRect/>
-          </a:stretch>
-        </p:blipFill>
-        <p:spPr>
-          <a:xfrm>
-            <a:off x="323528" y="1047750"/>
-            <a:ext cx="8424935" cy="5143500"/>
+          <p:cNvSpPr/>
+          <p:nvPr/>
+        </p:nvSpPr>
+        <p:spPr>
+          <a:xfrm>
+            <a:off x="467544" y="3465672"/>
+            <a:ext cx="1656184" cy="432048"/>
           </a:xfrm>
           <a:prstGeom prst="rect">
             <a:avLst/>
           </a:prstGeom>
-        </p:spPr>
-      </p:pic>
+          <a:ln w="9525"/>
+        </p:spPr>
+        <p:style>
+          <a:lnRef idx="2">
+            <a:schemeClr val="accent6"/>
+          </a:lnRef>
+          <a:fillRef idx="1">
+            <a:schemeClr val="lt1"/>
+          </a:fillRef>
+          <a:effectRef idx="0">
+            <a:schemeClr val="accent6"/>
+          </a:effectRef>
+          <a:fontRef idx="minor">
+            <a:schemeClr val="dk1"/>
+          </a:fontRef>
+        </p:style>
+        <p:txBody>
+          <a:bodyPr rtlCol="0" anchor="ctr"/>
+          <a:lstStyle/>
+          <a:p>
+            <a:pPr algn="ctr"/>
+            <a:r>
+              <a:rPr kumimoji="1" lang="en-US" altLang="zh-CN" sz="1400" dirty="0"/>
+              <a:t>acl::redis_command</a:t>
+            </a:r>
+            <a:endParaRPr kumimoji="1" lang="zh-CN" altLang="en-US" sz="1400" dirty="0"/>
+          </a:p>
+        </p:txBody>
+      </p:sp>
+      <p:sp>
+        <p:nvSpPr>
+          <p:cNvPr id="5" name="矩形 4">
+            <a:extLst>
+              <a:ext uri="{FF2B5EF4-FFF2-40B4-BE49-F238E27FC236}">
+                <a16:creationId xmlns:a16="http://schemas.microsoft.com/office/drawing/2014/main" id="{0D1FDE18-450E-4D43-8F7D-8E161B9B8CFC}"/>
+              </a:ext>
+            </a:extLst>
+          </p:cNvPr>
+          <p:cNvSpPr/>
+          <p:nvPr/>
+        </p:nvSpPr>
+        <p:spPr>
+          <a:xfrm>
+            <a:off x="3646995" y="1125542"/>
+            <a:ext cx="1933117" cy="332674"/>
+          </a:xfrm>
+          <a:prstGeom prst="rect">
+            <a:avLst/>
+          </a:prstGeom>
+          <a:ln w="9525"/>
+        </p:spPr>
+        <p:style>
+          <a:lnRef idx="2">
+            <a:schemeClr val="accent6"/>
+          </a:lnRef>
+          <a:fillRef idx="1">
+            <a:schemeClr val="lt1"/>
+          </a:fillRef>
+          <a:effectRef idx="0">
+            <a:schemeClr val="accent6"/>
+          </a:effectRef>
+          <a:fontRef idx="minor">
+            <a:schemeClr val="dk1"/>
+          </a:fontRef>
+        </p:style>
+        <p:txBody>
+          <a:bodyPr rtlCol="0" anchor="ctr"/>
+          <a:lstStyle/>
+          <a:p>
+            <a:r>
+              <a:rPr kumimoji="1" lang="en-US" altLang="zh-CN" sz="1400" dirty="0"/>
+              <a:t>acl:: redis_key</a:t>
+            </a:r>
+            <a:endParaRPr kumimoji="1" lang="zh-CN" altLang="en-US" sz="1400" dirty="0"/>
+          </a:p>
+        </p:txBody>
+      </p:sp>
+      <p:sp>
+        <p:nvSpPr>
+          <p:cNvPr id="6" name="矩形 5">
+            <a:extLst>
+              <a:ext uri="{FF2B5EF4-FFF2-40B4-BE49-F238E27FC236}">
+                <a16:creationId xmlns:a16="http://schemas.microsoft.com/office/drawing/2014/main" id="{6C912FDC-4194-4440-BC25-79D37748E694}"/>
+              </a:ext>
+            </a:extLst>
+          </p:cNvPr>
+          <p:cNvSpPr/>
+          <p:nvPr/>
+        </p:nvSpPr>
+        <p:spPr>
+          <a:xfrm>
+            <a:off x="3646995" y="1530224"/>
+            <a:ext cx="1933117" cy="332674"/>
+          </a:xfrm>
+          <a:prstGeom prst="rect">
+            <a:avLst/>
+          </a:prstGeom>
+          <a:ln w="9525"/>
+        </p:spPr>
+        <p:style>
+          <a:lnRef idx="2">
+            <a:schemeClr val="accent6"/>
+          </a:lnRef>
+          <a:fillRef idx="1">
+            <a:schemeClr val="lt1"/>
+          </a:fillRef>
+          <a:effectRef idx="0">
+            <a:schemeClr val="accent6"/>
+          </a:effectRef>
+          <a:fontRef idx="minor">
+            <a:schemeClr val="dk1"/>
+          </a:fontRef>
+        </p:style>
+        <p:txBody>
+          <a:bodyPr rtlCol="0" anchor="ctr"/>
+          <a:lstStyle/>
+          <a:p>
+            <a:r>
+              <a:rPr kumimoji="1" lang="en-US" altLang="zh-CN" sz="1400" dirty="0"/>
+              <a:t>acl:: redis_transaction</a:t>
+            </a:r>
+            <a:endParaRPr kumimoji="1" lang="zh-CN" altLang="en-US" sz="1400" dirty="0"/>
+          </a:p>
+        </p:txBody>
+      </p:sp>
+      <p:sp>
+        <p:nvSpPr>
+          <p:cNvPr id="7" name="矩形 6">
+            <a:extLst>
+              <a:ext uri="{FF2B5EF4-FFF2-40B4-BE49-F238E27FC236}">
+                <a16:creationId xmlns:a16="http://schemas.microsoft.com/office/drawing/2014/main" id="{9F20E4CB-11CD-4D4A-A27A-4A5D2BBF2D7D}"/>
+              </a:ext>
+            </a:extLst>
+          </p:cNvPr>
+          <p:cNvSpPr/>
+          <p:nvPr/>
+        </p:nvSpPr>
+        <p:spPr>
+          <a:xfrm>
+            <a:off x="3646995" y="1931904"/>
+            <a:ext cx="1933117" cy="332674"/>
+          </a:xfrm>
+          <a:prstGeom prst="rect">
+            <a:avLst/>
+          </a:prstGeom>
+          <a:ln w="9525"/>
+        </p:spPr>
+        <p:style>
+          <a:lnRef idx="2">
+            <a:schemeClr val="accent6"/>
+          </a:lnRef>
+          <a:fillRef idx="1">
+            <a:schemeClr val="lt1"/>
+          </a:fillRef>
+          <a:effectRef idx="0">
+            <a:schemeClr val="accent6"/>
+          </a:effectRef>
+          <a:fontRef idx="minor">
+            <a:schemeClr val="dk1"/>
+          </a:fontRef>
+        </p:style>
+        <p:txBody>
+          <a:bodyPr rtlCol="0" anchor="ctr"/>
+          <a:lstStyle/>
+          <a:p>
+            <a:r>
+              <a:rPr kumimoji="1" lang="en-US" altLang="zh-CN" sz="1400" dirty="0"/>
+              <a:t>acl:: redis_string</a:t>
+            </a:r>
+            <a:endParaRPr kumimoji="1" lang="zh-CN" altLang="en-US" sz="1400" dirty="0"/>
+          </a:p>
+        </p:txBody>
+      </p:sp>
+      <p:sp>
+        <p:nvSpPr>
+          <p:cNvPr id="8" name="矩形 7">
+            <a:extLst>
+              <a:ext uri="{FF2B5EF4-FFF2-40B4-BE49-F238E27FC236}">
+                <a16:creationId xmlns:a16="http://schemas.microsoft.com/office/drawing/2014/main" id="{FEF89E22-6CC8-6143-A05D-5295070EB747}"/>
+              </a:ext>
+            </a:extLst>
+          </p:cNvPr>
+          <p:cNvSpPr/>
+          <p:nvPr/>
+        </p:nvSpPr>
+        <p:spPr>
+          <a:xfrm>
+            <a:off x="3646995" y="2332544"/>
+            <a:ext cx="1933117" cy="332674"/>
+          </a:xfrm>
+          <a:prstGeom prst="rect">
+            <a:avLst/>
+          </a:prstGeom>
+          <a:ln w="9525"/>
+        </p:spPr>
+        <p:style>
+          <a:lnRef idx="2">
+            <a:schemeClr val="accent6"/>
+          </a:lnRef>
+          <a:fillRef idx="1">
+            <a:schemeClr val="lt1"/>
+          </a:fillRef>
+          <a:effectRef idx="0">
+            <a:schemeClr val="accent6"/>
+          </a:effectRef>
+          <a:fontRef idx="minor">
+            <a:schemeClr val="dk1"/>
+          </a:fontRef>
+        </p:style>
+        <p:txBody>
+          <a:bodyPr rtlCol="0" anchor="ctr"/>
+          <a:lstStyle/>
+          <a:p>
+            <a:r>
+              <a:rPr kumimoji="1" lang="en-US" altLang="zh-CN" sz="1400" dirty="0"/>
+              <a:t>acl:: redis_hash</a:t>
+            </a:r>
+            <a:endParaRPr kumimoji="1" lang="zh-CN" altLang="en-US" sz="1400" dirty="0"/>
+          </a:p>
+        </p:txBody>
+      </p:sp>
+      <p:sp>
+        <p:nvSpPr>
+          <p:cNvPr id="9" name="矩形 8">
+            <a:extLst>
+              <a:ext uri="{FF2B5EF4-FFF2-40B4-BE49-F238E27FC236}">
+                <a16:creationId xmlns:a16="http://schemas.microsoft.com/office/drawing/2014/main" id="{03FE2BE6-B921-464D-9ED9-476B2E3E3F0D}"/>
+              </a:ext>
+            </a:extLst>
+          </p:cNvPr>
+          <p:cNvSpPr/>
+          <p:nvPr/>
+        </p:nvSpPr>
+        <p:spPr>
+          <a:xfrm>
+            <a:off x="3642698" y="2733184"/>
+            <a:ext cx="1933117" cy="332674"/>
+          </a:xfrm>
+          <a:prstGeom prst="rect">
+            <a:avLst/>
+          </a:prstGeom>
+          <a:ln w="9525"/>
+        </p:spPr>
+        <p:style>
+          <a:lnRef idx="2">
+            <a:schemeClr val="accent6"/>
+          </a:lnRef>
+          <a:fillRef idx="1">
+            <a:schemeClr val="lt1"/>
+          </a:fillRef>
+          <a:effectRef idx="0">
+            <a:schemeClr val="accent6"/>
+          </a:effectRef>
+          <a:fontRef idx="minor">
+            <a:schemeClr val="dk1"/>
+          </a:fontRef>
+        </p:style>
+        <p:txBody>
+          <a:bodyPr rtlCol="0" anchor="ctr"/>
+          <a:lstStyle/>
+          <a:p>
+            <a:r>
+              <a:rPr kumimoji="1" lang="en-US" altLang="zh-CN" sz="1400" dirty="0"/>
+              <a:t>acl:: redis_list</a:t>
+            </a:r>
+            <a:endParaRPr kumimoji="1" lang="zh-CN" altLang="en-US" sz="1400" dirty="0"/>
+          </a:p>
+        </p:txBody>
+      </p:sp>
+      <p:sp>
+        <p:nvSpPr>
+          <p:cNvPr id="10" name="矩形 9">
+            <a:extLst>
+              <a:ext uri="{FF2B5EF4-FFF2-40B4-BE49-F238E27FC236}">
+                <a16:creationId xmlns:a16="http://schemas.microsoft.com/office/drawing/2014/main" id="{B9824C68-503D-0344-9D29-AFD9F3C0CF28}"/>
+              </a:ext>
+            </a:extLst>
+          </p:cNvPr>
+          <p:cNvSpPr/>
+          <p:nvPr/>
+        </p:nvSpPr>
+        <p:spPr>
+          <a:xfrm>
+            <a:off x="3645393" y="3129519"/>
+            <a:ext cx="1933117" cy="332674"/>
+          </a:xfrm>
+          <a:prstGeom prst="rect">
+            <a:avLst/>
+          </a:prstGeom>
+          <a:ln w="9525"/>
+        </p:spPr>
+        <p:style>
+          <a:lnRef idx="2">
+            <a:schemeClr val="accent6"/>
+          </a:lnRef>
+          <a:fillRef idx="1">
+            <a:schemeClr val="lt1"/>
+          </a:fillRef>
+          <a:effectRef idx="0">
+            <a:schemeClr val="accent6"/>
+          </a:effectRef>
+          <a:fontRef idx="minor">
+            <a:schemeClr val="dk1"/>
+          </a:fontRef>
+        </p:style>
+        <p:txBody>
+          <a:bodyPr rtlCol="0" anchor="ctr"/>
+          <a:lstStyle/>
+          <a:p>
+            <a:r>
+              <a:rPr kumimoji="1" lang="en-US" altLang="zh-CN" sz="1400" dirty="0"/>
+              <a:t>acl:: redis_set</a:t>
+            </a:r>
+            <a:endParaRPr kumimoji="1" lang="zh-CN" altLang="en-US" sz="1400" dirty="0"/>
+          </a:p>
+        </p:txBody>
+      </p:sp>
+      <p:sp>
+        <p:nvSpPr>
+          <p:cNvPr id="11" name="矩形 10">
+            <a:extLst>
+              <a:ext uri="{FF2B5EF4-FFF2-40B4-BE49-F238E27FC236}">
+                <a16:creationId xmlns:a16="http://schemas.microsoft.com/office/drawing/2014/main" id="{408C3829-D57E-3849-8B25-DFAC34DD2B36}"/>
+              </a:ext>
+            </a:extLst>
+          </p:cNvPr>
+          <p:cNvSpPr/>
+          <p:nvPr/>
+        </p:nvSpPr>
+        <p:spPr>
+          <a:xfrm>
+            <a:off x="3642698" y="3525300"/>
+            <a:ext cx="1933117" cy="332674"/>
+          </a:xfrm>
+          <a:prstGeom prst="rect">
+            <a:avLst/>
+          </a:prstGeom>
+          <a:ln w="9525"/>
+        </p:spPr>
+        <p:style>
+          <a:lnRef idx="2">
+            <a:schemeClr val="accent6"/>
+          </a:lnRef>
+          <a:fillRef idx="1">
+            <a:schemeClr val="lt1"/>
+          </a:fillRef>
+          <a:effectRef idx="0">
+            <a:schemeClr val="accent6"/>
+          </a:effectRef>
+          <a:fontRef idx="minor">
+            <a:schemeClr val="dk1"/>
+          </a:fontRef>
+        </p:style>
+        <p:txBody>
+          <a:bodyPr rtlCol="0" anchor="ctr"/>
+          <a:lstStyle/>
+          <a:p>
+            <a:r>
+              <a:rPr kumimoji="1" lang="en-US" altLang="zh-CN" sz="1400" dirty="0"/>
+              <a:t>acl:: redis_zset</a:t>
+            </a:r>
+            <a:endParaRPr kumimoji="1" lang="zh-CN" altLang="en-US" sz="1400" dirty="0"/>
+          </a:p>
+        </p:txBody>
+      </p:sp>
+      <p:sp>
+        <p:nvSpPr>
+          <p:cNvPr id="12" name="矩形 11">
+            <a:extLst>
+              <a:ext uri="{FF2B5EF4-FFF2-40B4-BE49-F238E27FC236}">
+                <a16:creationId xmlns:a16="http://schemas.microsoft.com/office/drawing/2014/main" id="{7FE3890C-113B-B346-ABA8-8660550772CE}"/>
+              </a:ext>
+            </a:extLst>
+          </p:cNvPr>
+          <p:cNvSpPr/>
+          <p:nvPr/>
+        </p:nvSpPr>
+        <p:spPr>
+          <a:xfrm>
+            <a:off x="3644188" y="3926494"/>
+            <a:ext cx="1933117" cy="332674"/>
+          </a:xfrm>
+          <a:prstGeom prst="rect">
+            <a:avLst/>
+          </a:prstGeom>
+          <a:ln w="9525"/>
+        </p:spPr>
+        <p:style>
+          <a:lnRef idx="2">
+            <a:schemeClr val="accent6"/>
+          </a:lnRef>
+          <a:fillRef idx="1">
+            <a:schemeClr val="lt1"/>
+          </a:fillRef>
+          <a:effectRef idx="0">
+            <a:schemeClr val="accent6"/>
+          </a:effectRef>
+          <a:fontRef idx="minor">
+            <a:schemeClr val="dk1"/>
+          </a:fontRef>
+        </p:style>
+        <p:txBody>
+          <a:bodyPr rtlCol="0" anchor="ctr"/>
+          <a:lstStyle/>
+          <a:p>
+            <a:r>
+              <a:rPr kumimoji="1" lang="en-US" altLang="zh-CN" sz="1400" dirty="0"/>
+              <a:t>acl:: redis_geo</a:t>
+            </a:r>
+            <a:endParaRPr kumimoji="1" lang="zh-CN" altLang="en-US" sz="1400" dirty="0"/>
+          </a:p>
+        </p:txBody>
+      </p:sp>
+      <p:sp>
+        <p:nvSpPr>
+          <p:cNvPr id="13" name="矩形 12">
+            <a:extLst>
+              <a:ext uri="{FF2B5EF4-FFF2-40B4-BE49-F238E27FC236}">
+                <a16:creationId xmlns:a16="http://schemas.microsoft.com/office/drawing/2014/main" id="{142C0A92-7B34-724A-80F7-658F31820F5F}"/>
+              </a:ext>
+            </a:extLst>
+          </p:cNvPr>
+          <p:cNvSpPr/>
+          <p:nvPr/>
+        </p:nvSpPr>
+        <p:spPr>
+          <a:xfrm>
+            <a:off x="3642698" y="4327134"/>
+            <a:ext cx="1933117" cy="332674"/>
+          </a:xfrm>
+          <a:prstGeom prst="rect">
+            <a:avLst/>
+          </a:prstGeom>
+          <a:ln w="9525"/>
+        </p:spPr>
+        <p:style>
+          <a:lnRef idx="2">
+            <a:schemeClr val="accent6"/>
+          </a:lnRef>
+          <a:fillRef idx="1">
+            <a:schemeClr val="lt1"/>
+          </a:fillRef>
+          <a:effectRef idx="0">
+            <a:schemeClr val="accent6"/>
+          </a:effectRef>
+          <a:fontRef idx="minor">
+            <a:schemeClr val="dk1"/>
+          </a:fontRef>
+        </p:style>
+        <p:txBody>
+          <a:bodyPr rtlCol="0" anchor="ctr"/>
+          <a:lstStyle/>
+          <a:p>
+            <a:r>
+              <a:rPr kumimoji="1" lang="en-US" altLang="zh-CN" sz="1400" dirty="0"/>
+              <a:t>acl:: redis_pubsub</a:t>
+            </a:r>
+            <a:endParaRPr kumimoji="1" lang="zh-CN" altLang="en-US" sz="1400" dirty="0"/>
+          </a:p>
+        </p:txBody>
+      </p:sp>
+      <p:sp>
+        <p:nvSpPr>
+          <p:cNvPr id="14" name="矩形 13">
+            <a:extLst>
+              <a:ext uri="{FF2B5EF4-FFF2-40B4-BE49-F238E27FC236}">
+                <a16:creationId xmlns:a16="http://schemas.microsoft.com/office/drawing/2014/main" id="{9F9ADB8E-216C-4244-B065-D6AE973E6A6F}"/>
+              </a:ext>
+            </a:extLst>
+          </p:cNvPr>
+          <p:cNvSpPr/>
+          <p:nvPr/>
+        </p:nvSpPr>
+        <p:spPr>
+          <a:xfrm>
+            <a:off x="3642698" y="4727774"/>
+            <a:ext cx="1933117" cy="332674"/>
+          </a:xfrm>
+          <a:prstGeom prst="rect">
+            <a:avLst/>
+          </a:prstGeom>
+          <a:ln w="9525"/>
+        </p:spPr>
+        <p:style>
+          <a:lnRef idx="2">
+            <a:schemeClr val="accent6"/>
+          </a:lnRef>
+          <a:fillRef idx="1">
+            <a:schemeClr val="lt1"/>
+          </a:fillRef>
+          <a:effectRef idx="0">
+            <a:schemeClr val="accent6"/>
+          </a:effectRef>
+          <a:fontRef idx="minor">
+            <a:schemeClr val="dk1"/>
+          </a:fontRef>
+        </p:style>
+        <p:txBody>
+          <a:bodyPr rtlCol="0" anchor="ctr"/>
+          <a:lstStyle/>
+          <a:p>
+            <a:r>
+              <a:rPr kumimoji="1" lang="en-US" altLang="zh-CN" sz="1400" dirty="0"/>
+              <a:t>acl:: redis_hyperloglog</a:t>
+            </a:r>
+            <a:endParaRPr kumimoji="1" lang="zh-CN" altLang="en-US" sz="1400" dirty="0"/>
+          </a:p>
+        </p:txBody>
+      </p:sp>
+      <p:sp>
+        <p:nvSpPr>
+          <p:cNvPr id="15" name="矩形 14">
+            <a:extLst>
+              <a:ext uri="{FF2B5EF4-FFF2-40B4-BE49-F238E27FC236}">
+                <a16:creationId xmlns:a16="http://schemas.microsoft.com/office/drawing/2014/main" id="{BE9E0542-0E65-0C49-9897-5B49DB30ACE7}"/>
+              </a:ext>
+            </a:extLst>
+          </p:cNvPr>
+          <p:cNvSpPr/>
+          <p:nvPr/>
+        </p:nvSpPr>
+        <p:spPr>
+          <a:xfrm>
+            <a:off x="3642698" y="5130002"/>
+            <a:ext cx="1933117" cy="332674"/>
+          </a:xfrm>
+          <a:prstGeom prst="rect">
+            <a:avLst/>
+          </a:prstGeom>
+          <a:ln w="9525"/>
+        </p:spPr>
+        <p:style>
+          <a:lnRef idx="2">
+            <a:schemeClr val="accent6"/>
+          </a:lnRef>
+          <a:fillRef idx="1">
+            <a:schemeClr val="lt1"/>
+          </a:fillRef>
+          <a:effectRef idx="0">
+            <a:schemeClr val="accent6"/>
+          </a:effectRef>
+          <a:fontRef idx="minor">
+            <a:schemeClr val="dk1"/>
+          </a:fontRef>
+        </p:style>
+        <p:txBody>
+          <a:bodyPr rtlCol="0" anchor="ctr"/>
+          <a:lstStyle/>
+          <a:p>
+            <a:r>
+              <a:rPr kumimoji="1" lang="en-US" altLang="zh-CN" sz="1400" dirty="0"/>
+              <a:t>acl:: redis_script</a:t>
+            </a:r>
+            <a:endParaRPr kumimoji="1" lang="zh-CN" altLang="en-US" sz="1400" dirty="0"/>
+          </a:p>
+        </p:txBody>
+      </p:sp>
+      <p:sp>
+        <p:nvSpPr>
+          <p:cNvPr id="16" name="矩形 15">
+            <a:extLst>
+              <a:ext uri="{FF2B5EF4-FFF2-40B4-BE49-F238E27FC236}">
+                <a16:creationId xmlns:a16="http://schemas.microsoft.com/office/drawing/2014/main" id="{FB1F89AB-9D87-FE41-9E20-DEC247268486}"/>
+              </a:ext>
+            </a:extLst>
+          </p:cNvPr>
+          <p:cNvSpPr/>
+          <p:nvPr/>
+        </p:nvSpPr>
+        <p:spPr>
+          <a:xfrm>
+            <a:off x="3642698" y="5532230"/>
+            <a:ext cx="1933117" cy="332674"/>
+          </a:xfrm>
+          <a:prstGeom prst="rect">
+            <a:avLst/>
+          </a:prstGeom>
+          <a:ln w="9525"/>
+        </p:spPr>
+        <p:style>
+          <a:lnRef idx="2">
+            <a:schemeClr val="accent6"/>
+          </a:lnRef>
+          <a:fillRef idx="1">
+            <a:schemeClr val="lt1"/>
+          </a:fillRef>
+          <a:effectRef idx="0">
+            <a:schemeClr val="accent6"/>
+          </a:effectRef>
+          <a:fontRef idx="minor">
+            <a:schemeClr val="dk1"/>
+          </a:fontRef>
+        </p:style>
+        <p:txBody>
+          <a:bodyPr rtlCol="0" anchor="ctr"/>
+          <a:lstStyle/>
+          <a:p>
+            <a:r>
+              <a:rPr kumimoji="1" lang="en-US" altLang="zh-CN" sz="1400" dirty="0"/>
+              <a:t>acl:: redis_server</a:t>
+            </a:r>
+            <a:endParaRPr kumimoji="1" lang="zh-CN" altLang="en-US" sz="1400" dirty="0"/>
+          </a:p>
+        </p:txBody>
+      </p:sp>
+      <p:sp>
+        <p:nvSpPr>
+          <p:cNvPr id="17" name="矩形 16">
+            <a:extLst>
+              <a:ext uri="{FF2B5EF4-FFF2-40B4-BE49-F238E27FC236}">
+                <a16:creationId xmlns:a16="http://schemas.microsoft.com/office/drawing/2014/main" id="{D101354C-A6C8-8442-981F-0E6D586BED2E}"/>
+              </a:ext>
+            </a:extLst>
+          </p:cNvPr>
+          <p:cNvSpPr/>
+          <p:nvPr/>
+        </p:nvSpPr>
+        <p:spPr>
+          <a:xfrm>
+            <a:off x="3642698" y="5934458"/>
+            <a:ext cx="1933117" cy="332674"/>
+          </a:xfrm>
+          <a:prstGeom prst="rect">
+            <a:avLst/>
+          </a:prstGeom>
+          <a:ln w="9525"/>
+        </p:spPr>
+        <p:style>
+          <a:lnRef idx="2">
+            <a:schemeClr val="accent6"/>
+          </a:lnRef>
+          <a:fillRef idx="1">
+            <a:schemeClr val="lt1"/>
+          </a:fillRef>
+          <a:effectRef idx="0">
+            <a:schemeClr val="accent6"/>
+          </a:effectRef>
+          <a:fontRef idx="minor">
+            <a:schemeClr val="dk1"/>
+          </a:fontRef>
+        </p:style>
+        <p:txBody>
+          <a:bodyPr rtlCol="0" anchor="ctr"/>
+          <a:lstStyle/>
+          <a:p>
+            <a:r>
+              <a:rPr kumimoji="1" lang="en-US" altLang="zh-CN" sz="1400" dirty="0"/>
+              <a:t>acl:: redis_cluster</a:t>
+            </a:r>
+            <a:endParaRPr kumimoji="1" lang="zh-CN" altLang="en-US" sz="1400" dirty="0"/>
+          </a:p>
+        </p:txBody>
+      </p:sp>
+      <p:sp>
+        <p:nvSpPr>
+          <p:cNvPr id="18" name="矩形 17">
+            <a:extLst>
+              <a:ext uri="{FF2B5EF4-FFF2-40B4-BE49-F238E27FC236}">
+                <a16:creationId xmlns:a16="http://schemas.microsoft.com/office/drawing/2014/main" id="{F132503C-32EB-4C41-9236-6B1D210698B6}"/>
+              </a:ext>
+            </a:extLst>
+          </p:cNvPr>
+          <p:cNvSpPr/>
+          <p:nvPr/>
+        </p:nvSpPr>
+        <p:spPr>
+          <a:xfrm>
+            <a:off x="3642698" y="6336686"/>
+            <a:ext cx="1933117" cy="332674"/>
+          </a:xfrm>
+          <a:prstGeom prst="rect">
+            <a:avLst/>
+          </a:prstGeom>
+          <a:ln w="9525"/>
+        </p:spPr>
+        <p:style>
+          <a:lnRef idx="2">
+            <a:schemeClr val="accent6"/>
+          </a:lnRef>
+          <a:fillRef idx="1">
+            <a:schemeClr val="lt1"/>
+          </a:fillRef>
+          <a:effectRef idx="0">
+            <a:schemeClr val="accent6"/>
+          </a:effectRef>
+          <a:fontRef idx="minor">
+            <a:schemeClr val="dk1"/>
+          </a:fontRef>
+        </p:style>
+        <p:txBody>
+          <a:bodyPr rtlCol="0" anchor="ctr"/>
+          <a:lstStyle/>
+          <a:p>
+            <a:r>
+              <a:rPr kumimoji="1" lang="en-US" altLang="zh-CN" sz="1400" dirty="0"/>
+              <a:t>acl:: redis_connection</a:t>
+            </a:r>
+            <a:endParaRPr kumimoji="1" lang="zh-CN" altLang="en-US" sz="1400" dirty="0"/>
+          </a:p>
+        </p:txBody>
+      </p:sp>
+      <p:sp>
+        <p:nvSpPr>
+          <p:cNvPr id="19" name="矩形 18">
+            <a:extLst>
+              <a:ext uri="{FF2B5EF4-FFF2-40B4-BE49-F238E27FC236}">
+                <a16:creationId xmlns:a16="http://schemas.microsoft.com/office/drawing/2014/main" id="{1ED79F22-CDCC-B440-B254-02725A2A48DB}"/>
+              </a:ext>
+            </a:extLst>
+          </p:cNvPr>
+          <p:cNvSpPr/>
+          <p:nvPr/>
+        </p:nvSpPr>
+        <p:spPr>
+          <a:xfrm>
+            <a:off x="7158928" y="3462193"/>
+            <a:ext cx="1512168" cy="432048"/>
+          </a:xfrm>
+          <a:prstGeom prst="rect">
+            <a:avLst/>
+          </a:prstGeom>
+          <a:ln w="9525"/>
+        </p:spPr>
+        <p:style>
+          <a:lnRef idx="2">
+            <a:schemeClr val="accent6"/>
+          </a:lnRef>
+          <a:fillRef idx="1">
+            <a:schemeClr val="lt1"/>
+          </a:fillRef>
+          <a:effectRef idx="0">
+            <a:schemeClr val="accent6"/>
+          </a:effectRef>
+          <a:fontRef idx="minor">
+            <a:schemeClr val="dk1"/>
+          </a:fontRef>
+        </p:style>
+        <p:txBody>
+          <a:bodyPr rtlCol="0" anchor="ctr"/>
+          <a:lstStyle/>
+          <a:p>
+            <a:pPr algn="ctr"/>
+            <a:r>
+              <a:rPr kumimoji="1" lang="en-US" altLang="zh-CN" sz="1400" dirty="0"/>
+              <a:t>acl::redis</a:t>
+            </a:r>
+            <a:endParaRPr kumimoji="1" lang="zh-CN" altLang="en-US" sz="1400" dirty="0"/>
+          </a:p>
+        </p:txBody>
+      </p:sp>
+      <p:cxnSp>
+        <p:nvCxnSpPr>
+          <p:cNvPr id="21" name="曲线连接符 20">
+            <a:extLst>
+              <a:ext uri="{FF2B5EF4-FFF2-40B4-BE49-F238E27FC236}">
+                <a16:creationId xmlns:a16="http://schemas.microsoft.com/office/drawing/2014/main" id="{A5C3159D-5DE0-AB40-B24D-1FEC97E8414B}"/>
+              </a:ext>
+            </a:extLst>
+          </p:cNvPr>
+          <p:cNvCxnSpPr>
+            <a:stCxn id="5" idx="1"/>
+            <a:endCxn id="4" idx="3"/>
+          </p:cNvCxnSpPr>
+          <p:nvPr/>
+        </p:nvCxnSpPr>
+        <p:spPr>
+          <a:xfrm rot="10800000" flipV="1">
+            <a:off x="2123729" y="1291878"/>
+            <a:ext cx="1523267" cy="2389817"/>
+          </a:xfrm>
+          <a:prstGeom prst="curvedConnector3">
+            <a:avLst/>
+          </a:prstGeom>
+          <a:ln>
+            <a:solidFill>
+              <a:srgbClr val="00B0F0"/>
+            </a:solidFill>
+            <a:tailEnd type="triangle"/>
+          </a:ln>
+        </p:spPr>
+        <p:style>
+          <a:lnRef idx="1">
+            <a:schemeClr val="accent1"/>
+          </a:lnRef>
+          <a:fillRef idx="0">
+            <a:schemeClr val="accent1"/>
+          </a:fillRef>
+          <a:effectRef idx="0">
+            <a:schemeClr val="accent1"/>
+          </a:effectRef>
+          <a:fontRef idx="minor">
+            <a:schemeClr val="tx1"/>
+          </a:fontRef>
+        </p:style>
+      </p:cxnSp>
+      <p:cxnSp>
+        <p:nvCxnSpPr>
+          <p:cNvPr id="23" name="曲线连接符 22">
+            <a:extLst>
+              <a:ext uri="{FF2B5EF4-FFF2-40B4-BE49-F238E27FC236}">
+                <a16:creationId xmlns:a16="http://schemas.microsoft.com/office/drawing/2014/main" id="{E9D1C3CE-5FC8-6441-8ECF-1BA6A9673FB5}"/>
+              </a:ext>
+            </a:extLst>
+          </p:cNvPr>
+          <p:cNvCxnSpPr>
+            <a:cxnSpLocks/>
+            <a:stCxn id="6" idx="1"/>
+            <a:endCxn id="4" idx="3"/>
+          </p:cNvCxnSpPr>
+          <p:nvPr/>
+        </p:nvCxnSpPr>
+        <p:spPr>
+          <a:xfrm rot="10800000" flipV="1">
+            <a:off x="2123729" y="1696560"/>
+            <a:ext cx="1523267" cy="1985135"/>
+          </a:xfrm>
+          <a:prstGeom prst="curvedConnector3">
+            <a:avLst>
+              <a:gd name="adj1" fmla="val 50000"/>
+            </a:avLst>
+          </a:prstGeom>
+          <a:ln>
+            <a:solidFill>
+              <a:srgbClr val="00B0F0"/>
+            </a:solidFill>
+            <a:tailEnd type="triangle"/>
+          </a:ln>
+        </p:spPr>
+        <p:style>
+          <a:lnRef idx="1">
+            <a:schemeClr val="accent1"/>
+          </a:lnRef>
+          <a:fillRef idx="0">
+            <a:schemeClr val="accent1"/>
+          </a:fillRef>
+          <a:effectRef idx="0">
+            <a:schemeClr val="accent1"/>
+          </a:effectRef>
+          <a:fontRef idx="minor">
+            <a:schemeClr val="tx1"/>
+          </a:fontRef>
+        </p:style>
+      </p:cxnSp>
+      <p:cxnSp>
+        <p:nvCxnSpPr>
+          <p:cNvPr id="27" name="曲线连接符 26">
+            <a:extLst>
+              <a:ext uri="{FF2B5EF4-FFF2-40B4-BE49-F238E27FC236}">
+                <a16:creationId xmlns:a16="http://schemas.microsoft.com/office/drawing/2014/main" id="{73295EC8-4B9B-D14B-9276-C4718864671F}"/>
+              </a:ext>
+            </a:extLst>
+          </p:cNvPr>
+          <p:cNvCxnSpPr>
+            <a:stCxn id="7" idx="1"/>
+            <a:endCxn id="4" idx="3"/>
+          </p:cNvCxnSpPr>
+          <p:nvPr/>
+        </p:nvCxnSpPr>
+        <p:spPr>
+          <a:xfrm rot="10800000" flipV="1">
+            <a:off x="2123729" y="2098240"/>
+            <a:ext cx="1523267" cy="1583455"/>
+          </a:xfrm>
+          <a:prstGeom prst="curvedConnector3">
+            <a:avLst/>
+          </a:prstGeom>
+          <a:ln>
+            <a:solidFill>
+              <a:srgbClr val="00B0F0"/>
+            </a:solidFill>
+            <a:tailEnd type="triangle"/>
+          </a:ln>
+        </p:spPr>
+        <p:style>
+          <a:lnRef idx="1">
+            <a:schemeClr val="accent1"/>
+          </a:lnRef>
+          <a:fillRef idx="0">
+            <a:schemeClr val="accent1"/>
+          </a:fillRef>
+          <a:effectRef idx="0">
+            <a:schemeClr val="accent1"/>
+          </a:effectRef>
+          <a:fontRef idx="minor">
+            <a:schemeClr val="tx1"/>
+          </a:fontRef>
+        </p:style>
+      </p:cxnSp>
+      <p:cxnSp>
+        <p:nvCxnSpPr>
+          <p:cNvPr id="29" name="曲线连接符 28">
+            <a:extLst>
+              <a:ext uri="{FF2B5EF4-FFF2-40B4-BE49-F238E27FC236}">
+                <a16:creationId xmlns:a16="http://schemas.microsoft.com/office/drawing/2014/main" id="{392CB0E9-35D7-F148-91BE-D3312EED2E96}"/>
+              </a:ext>
+            </a:extLst>
+          </p:cNvPr>
+          <p:cNvCxnSpPr>
+            <a:stCxn id="8" idx="1"/>
+            <a:endCxn id="4" idx="3"/>
+          </p:cNvCxnSpPr>
+          <p:nvPr/>
+        </p:nvCxnSpPr>
+        <p:spPr>
+          <a:xfrm rot="10800000" flipV="1">
+            <a:off x="2123729" y="2498880"/>
+            <a:ext cx="1523267" cy="1182815"/>
+          </a:xfrm>
+          <a:prstGeom prst="curvedConnector3">
+            <a:avLst/>
+          </a:prstGeom>
+          <a:ln>
+            <a:solidFill>
+              <a:srgbClr val="00B0F0"/>
+            </a:solidFill>
+            <a:tailEnd type="triangle"/>
+          </a:ln>
+        </p:spPr>
+        <p:style>
+          <a:lnRef idx="1">
+            <a:schemeClr val="accent1"/>
+          </a:lnRef>
+          <a:fillRef idx="0">
+            <a:schemeClr val="accent1"/>
+          </a:fillRef>
+          <a:effectRef idx="0">
+            <a:schemeClr val="accent1"/>
+          </a:effectRef>
+          <a:fontRef idx="minor">
+            <a:schemeClr val="tx1"/>
+          </a:fontRef>
+        </p:style>
+      </p:cxnSp>
+      <p:cxnSp>
+        <p:nvCxnSpPr>
+          <p:cNvPr id="31" name="曲线连接符 30">
+            <a:extLst>
+              <a:ext uri="{FF2B5EF4-FFF2-40B4-BE49-F238E27FC236}">
+                <a16:creationId xmlns:a16="http://schemas.microsoft.com/office/drawing/2014/main" id="{338819BA-E24A-FB4C-9CE2-9FA614E2BA50}"/>
+              </a:ext>
+            </a:extLst>
+          </p:cNvPr>
+          <p:cNvCxnSpPr>
+            <a:stCxn id="9" idx="1"/>
+            <a:endCxn id="4" idx="3"/>
+          </p:cNvCxnSpPr>
+          <p:nvPr/>
+        </p:nvCxnSpPr>
+        <p:spPr>
+          <a:xfrm rot="10800000" flipV="1">
+            <a:off x="2123728" y="2899520"/>
+            <a:ext cx="1518970" cy="782175"/>
+          </a:xfrm>
+          <a:prstGeom prst="curvedConnector3">
+            <a:avLst/>
+          </a:prstGeom>
+          <a:ln>
+            <a:solidFill>
+              <a:srgbClr val="00B0F0"/>
+            </a:solidFill>
+            <a:tailEnd type="triangle"/>
+          </a:ln>
+        </p:spPr>
+        <p:style>
+          <a:lnRef idx="1">
+            <a:schemeClr val="accent1"/>
+          </a:lnRef>
+          <a:fillRef idx="0">
+            <a:schemeClr val="accent1"/>
+          </a:fillRef>
+          <a:effectRef idx="0">
+            <a:schemeClr val="accent1"/>
+          </a:effectRef>
+          <a:fontRef idx="minor">
+            <a:schemeClr val="tx1"/>
+          </a:fontRef>
+        </p:style>
+      </p:cxnSp>
+      <p:cxnSp>
+        <p:nvCxnSpPr>
+          <p:cNvPr id="33" name="曲线连接符 32">
+            <a:extLst>
+              <a:ext uri="{FF2B5EF4-FFF2-40B4-BE49-F238E27FC236}">
+                <a16:creationId xmlns:a16="http://schemas.microsoft.com/office/drawing/2014/main" id="{A2F81280-0887-B544-BE31-5394BD32581D}"/>
+              </a:ext>
+            </a:extLst>
+          </p:cNvPr>
+          <p:cNvCxnSpPr>
+            <a:stCxn id="10" idx="1"/>
+            <a:endCxn id="4" idx="3"/>
+          </p:cNvCxnSpPr>
+          <p:nvPr/>
+        </p:nvCxnSpPr>
+        <p:spPr>
+          <a:xfrm rot="10800000" flipV="1">
+            <a:off x="2123729" y="3295856"/>
+            <a:ext cx="1521665" cy="385840"/>
+          </a:xfrm>
+          <a:prstGeom prst="curvedConnector3">
+            <a:avLst/>
+          </a:prstGeom>
+          <a:ln>
+            <a:solidFill>
+              <a:srgbClr val="00B0F0"/>
+            </a:solidFill>
+            <a:tailEnd type="triangle"/>
+          </a:ln>
+        </p:spPr>
+        <p:style>
+          <a:lnRef idx="1">
+            <a:schemeClr val="accent1"/>
+          </a:lnRef>
+          <a:fillRef idx="0">
+            <a:schemeClr val="accent1"/>
+          </a:fillRef>
+          <a:effectRef idx="0">
+            <a:schemeClr val="accent1"/>
+          </a:effectRef>
+          <a:fontRef idx="minor">
+            <a:schemeClr val="tx1"/>
+          </a:fontRef>
+        </p:style>
+      </p:cxnSp>
+      <p:cxnSp>
+        <p:nvCxnSpPr>
+          <p:cNvPr id="35" name="曲线连接符 34">
+            <a:extLst>
+              <a:ext uri="{FF2B5EF4-FFF2-40B4-BE49-F238E27FC236}">
+                <a16:creationId xmlns:a16="http://schemas.microsoft.com/office/drawing/2014/main" id="{59154EB4-7E33-E547-A84C-C6CDFFF3F2FC}"/>
+              </a:ext>
+            </a:extLst>
+          </p:cNvPr>
+          <p:cNvCxnSpPr>
+            <a:stCxn id="11" idx="1"/>
+            <a:endCxn id="4" idx="3"/>
+          </p:cNvCxnSpPr>
+          <p:nvPr/>
+        </p:nvCxnSpPr>
+        <p:spPr>
+          <a:xfrm rot="10800000">
+            <a:off x="2123728" y="3681697"/>
+            <a:ext cx="1518970" cy="9941"/>
+          </a:xfrm>
+          <a:prstGeom prst="curvedConnector3">
+            <a:avLst/>
+          </a:prstGeom>
+          <a:ln>
+            <a:solidFill>
+              <a:srgbClr val="00B0F0"/>
+            </a:solidFill>
+            <a:tailEnd type="triangle"/>
+          </a:ln>
+        </p:spPr>
+        <p:style>
+          <a:lnRef idx="1">
+            <a:schemeClr val="accent1"/>
+          </a:lnRef>
+          <a:fillRef idx="0">
+            <a:schemeClr val="accent1"/>
+          </a:fillRef>
+          <a:effectRef idx="0">
+            <a:schemeClr val="accent1"/>
+          </a:effectRef>
+          <a:fontRef idx="minor">
+            <a:schemeClr val="tx1"/>
+          </a:fontRef>
+        </p:style>
+      </p:cxnSp>
+      <p:cxnSp>
+        <p:nvCxnSpPr>
+          <p:cNvPr id="37" name="曲线连接符 36">
+            <a:extLst>
+              <a:ext uri="{FF2B5EF4-FFF2-40B4-BE49-F238E27FC236}">
+                <a16:creationId xmlns:a16="http://schemas.microsoft.com/office/drawing/2014/main" id="{EC1CE670-E14E-0F4F-88AF-77B8C065ED0D}"/>
+              </a:ext>
+            </a:extLst>
+          </p:cNvPr>
+          <p:cNvCxnSpPr>
+            <a:stCxn id="12" idx="1"/>
+            <a:endCxn id="4" idx="3"/>
+          </p:cNvCxnSpPr>
+          <p:nvPr/>
+        </p:nvCxnSpPr>
+        <p:spPr>
+          <a:xfrm rot="10800000">
+            <a:off x="2123728" y="3681697"/>
+            <a:ext cx="1520460" cy="411135"/>
+          </a:xfrm>
+          <a:prstGeom prst="curvedConnector3">
+            <a:avLst/>
+          </a:prstGeom>
+          <a:ln>
+            <a:solidFill>
+              <a:srgbClr val="00B0F0"/>
+            </a:solidFill>
+            <a:tailEnd type="triangle"/>
+          </a:ln>
+        </p:spPr>
+        <p:style>
+          <a:lnRef idx="1">
+            <a:schemeClr val="accent1"/>
+          </a:lnRef>
+          <a:fillRef idx="0">
+            <a:schemeClr val="accent1"/>
+          </a:fillRef>
+          <a:effectRef idx="0">
+            <a:schemeClr val="accent1"/>
+          </a:effectRef>
+          <a:fontRef idx="minor">
+            <a:schemeClr val="tx1"/>
+          </a:fontRef>
+        </p:style>
+      </p:cxnSp>
+      <p:cxnSp>
+        <p:nvCxnSpPr>
+          <p:cNvPr id="39" name="曲线连接符 38">
+            <a:extLst>
+              <a:ext uri="{FF2B5EF4-FFF2-40B4-BE49-F238E27FC236}">
+                <a16:creationId xmlns:a16="http://schemas.microsoft.com/office/drawing/2014/main" id="{06B01F20-3A0C-AF4E-A523-EC86D4960B31}"/>
+              </a:ext>
+            </a:extLst>
+          </p:cNvPr>
+          <p:cNvCxnSpPr>
+            <a:stCxn id="13" idx="1"/>
+            <a:endCxn id="4" idx="3"/>
+          </p:cNvCxnSpPr>
+          <p:nvPr/>
+        </p:nvCxnSpPr>
+        <p:spPr>
+          <a:xfrm rot="10800000">
+            <a:off x="2123728" y="3681697"/>
+            <a:ext cx="1518970" cy="811775"/>
+          </a:xfrm>
+          <a:prstGeom prst="curvedConnector3">
+            <a:avLst/>
+          </a:prstGeom>
+          <a:ln>
+            <a:solidFill>
+              <a:srgbClr val="00B0F0"/>
+            </a:solidFill>
+            <a:tailEnd type="triangle"/>
+          </a:ln>
+        </p:spPr>
+        <p:style>
+          <a:lnRef idx="1">
+            <a:schemeClr val="accent1"/>
+          </a:lnRef>
+          <a:fillRef idx="0">
+            <a:schemeClr val="accent1"/>
+          </a:fillRef>
+          <a:effectRef idx="0">
+            <a:schemeClr val="accent1"/>
+          </a:effectRef>
+          <a:fontRef idx="minor">
+            <a:schemeClr val="tx1"/>
+          </a:fontRef>
+        </p:style>
+      </p:cxnSp>
+      <p:cxnSp>
+        <p:nvCxnSpPr>
+          <p:cNvPr id="41" name="曲线连接符 40">
+            <a:extLst>
+              <a:ext uri="{FF2B5EF4-FFF2-40B4-BE49-F238E27FC236}">
+                <a16:creationId xmlns:a16="http://schemas.microsoft.com/office/drawing/2014/main" id="{AC5F469A-51C8-324F-A209-7B5D7AEA8C3D}"/>
+              </a:ext>
+            </a:extLst>
+          </p:cNvPr>
+          <p:cNvCxnSpPr>
+            <a:stCxn id="14" idx="1"/>
+            <a:endCxn id="4" idx="3"/>
+          </p:cNvCxnSpPr>
+          <p:nvPr/>
+        </p:nvCxnSpPr>
+        <p:spPr>
+          <a:xfrm rot="10800000">
+            <a:off x="2123728" y="3681697"/>
+            <a:ext cx="1518970" cy="1212415"/>
+          </a:xfrm>
+          <a:prstGeom prst="curvedConnector3">
+            <a:avLst/>
+          </a:prstGeom>
+          <a:ln>
+            <a:solidFill>
+              <a:srgbClr val="00B0F0"/>
+            </a:solidFill>
+            <a:tailEnd type="triangle"/>
+          </a:ln>
+        </p:spPr>
+        <p:style>
+          <a:lnRef idx="1">
+            <a:schemeClr val="accent1"/>
+          </a:lnRef>
+          <a:fillRef idx="0">
+            <a:schemeClr val="accent1"/>
+          </a:fillRef>
+          <a:effectRef idx="0">
+            <a:schemeClr val="accent1"/>
+          </a:effectRef>
+          <a:fontRef idx="minor">
+            <a:schemeClr val="tx1"/>
+          </a:fontRef>
+        </p:style>
+      </p:cxnSp>
+      <p:cxnSp>
+        <p:nvCxnSpPr>
+          <p:cNvPr id="43" name="曲线连接符 42">
+            <a:extLst>
+              <a:ext uri="{FF2B5EF4-FFF2-40B4-BE49-F238E27FC236}">
+                <a16:creationId xmlns:a16="http://schemas.microsoft.com/office/drawing/2014/main" id="{B6E6AD5C-73B7-074F-AD5E-10C4D54EEC17}"/>
+              </a:ext>
+            </a:extLst>
+          </p:cNvPr>
+          <p:cNvCxnSpPr>
+            <a:stCxn id="15" idx="1"/>
+            <a:endCxn id="4" idx="3"/>
+          </p:cNvCxnSpPr>
+          <p:nvPr/>
+        </p:nvCxnSpPr>
+        <p:spPr>
+          <a:xfrm rot="10800000">
+            <a:off x="2123728" y="3681697"/>
+            <a:ext cx="1518970" cy="1614643"/>
+          </a:xfrm>
+          <a:prstGeom prst="curvedConnector3">
+            <a:avLst/>
+          </a:prstGeom>
+          <a:ln>
+            <a:solidFill>
+              <a:srgbClr val="00B0F0"/>
+            </a:solidFill>
+            <a:tailEnd type="triangle"/>
+          </a:ln>
+        </p:spPr>
+        <p:style>
+          <a:lnRef idx="1">
+            <a:schemeClr val="accent1"/>
+          </a:lnRef>
+          <a:fillRef idx="0">
+            <a:schemeClr val="accent1"/>
+          </a:fillRef>
+          <a:effectRef idx="0">
+            <a:schemeClr val="accent1"/>
+          </a:effectRef>
+          <a:fontRef idx="minor">
+            <a:schemeClr val="tx1"/>
+          </a:fontRef>
+        </p:style>
+      </p:cxnSp>
+      <p:cxnSp>
+        <p:nvCxnSpPr>
+          <p:cNvPr id="45" name="曲线连接符 44">
+            <a:extLst>
+              <a:ext uri="{FF2B5EF4-FFF2-40B4-BE49-F238E27FC236}">
+                <a16:creationId xmlns:a16="http://schemas.microsoft.com/office/drawing/2014/main" id="{D9448B00-76F6-564E-BE3A-35861463EF68}"/>
+              </a:ext>
+            </a:extLst>
+          </p:cNvPr>
+          <p:cNvCxnSpPr>
+            <a:stCxn id="16" idx="1"/>
+            <a:endCxn id="4" idx="3"/>
+          </p:cNvCxnSpPr>
+          <p:nvPr/>
+        </p:nvCxnSpPr>
+        <p:spPr>
+          <a:xfrm rot="10800000">
+            <a:off x="2123728" y="3681697"/>
+            <a:ext cx="1518970" cy="2016871"/>
+          </a:xfrm>
+          <a:prstGeom prst="curvedConnector3">
+            <a:avLst/>
+          </a:prstGeom>
+          <a:ln>
+            <a:solidFill>
+              <a:srgbClr val="00B0F0"/>
+            </a:solidFill>
+            <a:tailEnd type="triangle"/>
+          </a:ln>
+        </p:spPr>
+        <p:style>
+          <a:lnRef idx="1">
+            <a:schemeClr val="accent1"/>
+          </a:lnRef>
+          <a:fillRef idx="0">
+            <a:schemeClr val="accent1"/>
+          </a:fillRef>
+          <a:effectRef idx="0">
+            <a:schemeClr val="accent1"/>
+          </a:effectRef>
+          <a:fontRef idx="minor">
+            <a:schemeClr val="tx1"/>
+          </a:fontRef>
+        </p:style>
+      </p:cxnSp>
+      <p:cxnSp>
+        <p:nvCxnSpPr>
+          <p:cNvPr id="47" name="曲线连接符 46">
+            <a:extLst>
+              <a:ext uri="{FF2B5EF4-FFF2-40B4-BE49-F238E27FC236}">
+                <a16:creationId xmlns:a16="http://schemas.microsoft.com/office/drawing/2014/main" id="{71D01BD2-94A1-254B-8FC3-035C7FAF65A2}"/>
+              </a:ext>
+            </a:extLst>
+          </p:cNvPr>
+          <p:cNvCxnSpPr>
+            <a:stCxn id="17" idx="1"/>
+            <a:endCxn id="4" idx="3"/>
+          </p:cNvCxnSpPr>
+          <p:nvPr/>
+        </p:nvCxnSpPr>
+        <p:spPr>
+          <a:xfrm rot="10800000">
+            <a:off x="2123728" y="3681697"/>
+            <a:ext cx="1518970" cy="2419099"/>
+          </a:xfrm>
+          <a:prstGeom prst="curvedConnector3">
+            <a:avLst/>
+          </a:prstGeom>
+          <a:ln>
+            <a:solidFill>
+              <a:srgbClr val="00B0F0"/>
+            </a:solidFill>
+            <a:tailEnd type="triangle"/>
+          </a:ln>
+        </p:spPr>
+        <p:style>
+          <a:lnRef idx="1">
+            <a:schemeClr val="accent1"/>
+          </a:lnRef>
+          <a:fillRef idx="0">
+            <a:schemeClr val="accent1"/>
+          </a:fillRef>
+          <a:effectRef idx="0">
+            <a:schemeClr val="accent1"/>
+          </a:effectRef>
+          <a:fontRef idx="minor">
+            <a:schemeClr val="tx1"/>
+          </a:fontRef>
+        </p:style>
+      </p:cxnSp>
+      <p:cxnSp>
+        <p:nvCxnSpPr>
+          <p:cNvPr id="49" name="曲线连接符 48">
+            <a:extLst>
+              <a:ext uri="{FF2B5EF4-FFF2-40B4-BE49-F238E27FC236}">
+                <a16:creationId xmlns:a16="http://schemas.microsoft.com/office/drawing/2014/main" id="{6EC30C5C-EF72-7A40-94B4-B1D8D9175074}"/>
+              </a:ext>
+            </a:extLst>
+          </p:cNvPr>
+          <p:cNvCxnSpPr>
+            <a:stCxn id="18" idx="1"/>
+            <a:endCxn id="4" idx="3"/>
+          </p:cNvCxnSpPr>
+          <p:nvPr/>
+        </p:nvCxnSpPr>
+        <p:spPr>
+          <a:xfrm rot="10800000">
+            <a:off x="2123728" y="3681697"/>
+            <a:ext cx="1518970" cy="2821327"/>
+          </a:xfrm>
+          <a:prstGeom prst="curvedConnector3">
+            <a:avLst/>
+          </a:prstGeom>
+          <a:ln>
+            <a:solidFill>
+              <a:srgbClr val="00B0F0"/>
+            </a:solidFill>
+            <a:tailEnd type="triangle"/>
+          </a:ln>
+        </p:spPr>
+        <p:style>
+          <a:lnRef idx="1">
+            <a:schemeClr val="accent1"/>
+          </a:lnRef>
+          <a:fillRef idx="0">
+            <a:schemeClr val="accent1"/>
+          </a:fillRef>
+          <a:effectRef idx="0">
+            <a:schemeClr val="accent1"/>
+          </a:effectRef>
+          <a:fontRef idx="minor">
+            <a:schemeClr val="tx1"/>
+          </a:fontRef>
+        </p:style>
+      </p:cxnSp>
+      <p:cxnSp>
+        <p:nvCxnSpPr>
+          <p:cNvPr id="51" name="曲线连接符 50">
+            <a:extLst>
+              <a:ext uri="{FF2B5EF4-FFF2-40B4-BE49-F238E27FC236}">
+                <a16:creationId xmlns:a16="http://schemas.microsoft.com/office/drawing/2014/main" id="{E3A8538F-E757-894A-ABC9-F4121AA6981A}"/>
+              </a:ext>
+            </a:extLst>
+          </p:cNvPr>
+          <p:cNvCxnSpPr>
+            <a:stCxn id="5" idx="3"/>
+            <a:endCxn id="19" idx="1"/>
+          </p:cNvCxnSpPr>
+          <p:nvPr/>
+        </p:nvCxnSpPr>
+        <p:spPr>
+          <a:xfrm>
+            <a:off x="5580112" y="1291879"/>
+            <a:ext cx="1578816" cy="2386338"/>
+          </a:xfrm>
+          <a:prstGeom prst="curvedConnector3">
+            <a:avLst/>
+          </a:prstGeom>
+          <a:ln>
+            <a:solidFill>
+              <a:srgbClr val="00B050"/>
+            </a:solidFill>
+            <a:headEnd type="triangle"/>
+            <a:tailEnd type="none"/>
+          </a:ln>
+        </p:spPr>
+        <p:style>
+          <a:lnRef idx="1">
+            <a:schemeClr val="accent1"/>
+          </a:lnRef>
+          <a:fillRef idx="0">
+            <a:schemeClr val="accent1"/>
+          </a:fillRef>
+          <a:effectRef idx="0">
+            <a:schemeClr val="accent1"/>
+          </a:effectRef>
+          <a:fontRef idx="minor">
+            <a:schemeClr val="tx1"/>
+          </a:fontRef>
+        </p:style>
+      </p:cxnSp>
+      <p:cxnSp>
+        <p:nvCxnSpPr>
+          <p:cNvPr id="53" name="曲线连接符 52">
+            <a:extLst>
+              <a:ext uri="{FF2B5EF4-FFF2-40B4-BE49-F238E27FC236}">
+                <a16:creationId xmlns:a16="http://schemas.microsoft.com/office/drawing/2014/main" id="{96C83C94-F33C-EE44-BE57-8A5867A7E42C}"/>
+              </a:ext>
+            </a:extLst>
+          </p:cNvPr>
+          <p:cNvCxnSpPr>
+            <a:stCxn id="6" idx="3"/>
+            <a:endCxn id="19" idx="1"/>
+          </p:cNvCxnSpPr>
+          <p:nvPr/>
+        </p:nvCxnSpPr>
+        <p:spPr>
+          <a:xfrm>
+            <a:off x="5580112" y="1696561"/>
+            <a:ext cx="1578816" cy="1981656"/>
+          </a:xfrm>
+          <a:prstGeom prst="curvedConnector3">
+            <a:avLst/>
+          </a:prstGeom>
+          <a:ln>
+            <a:solidFill>
+              <a:srgbClr val="00B050"/>
+            </a:solidFill>
+            <a:headEnd type="triangle"/>
+            <a:tailEnd type="none"/>
+          </a:ln>
+        </p:spPr>
+        <p:style>
+          <a:lnRef idx="1">
+            <a:schemeClr val="accent1"/>
+          </a:lnRef>
+          <a:fillRef idx="0">
+            <a:schemeClr val="accent1"/>
+          </a:fillRef>
+          <a:effectRef idx="0">
+            <a:schemeClr val="accent1"/>
+          </a:effectRef>
+          <a:fontRef idx="minor">
+            <a:schemeClr val="tx1"/>
+          </a:fontRef>
+        </p:style>
+      </p:cxnSp>
+      <p:cxnSp>
+        <p:nvCxnSpPr>
+          <p:cNvPr id="55" name="曲线连接符 54">
+            <a:extLst>
+              <a:ext uri="{FF2B5EF4-FFF2-40B4-BE49-F238E27FC236}">
+                <a16:creationId xmlns:a16="http://schemas.microsoft.com/office/drawing/2014/main" id="{E95038F5-2D3F-0F47-A908-5C11962E6770}"/>
+              </a:ext>
+            </a:extLst>
+          </p:cNvPr>
+          <p:cNvCxnSpPr>
+            <a:stCxn id="8" idx="3"/>
+            <a:endCxn id="19" idx="1"/>
+          </p:cNvCxnSpPr>
+          <p:nvPr/>
+        </p:nvCxnSpPr>
+        <p:spPr>
+          <a:xfrm>
+            <a:off x="5580112" y="2498881"/>
+            <a:ext cx="1578816" cy="1179336"/>
+          </a:xfrm>
+          <a:prstGeom prst="curvedConnector3">
+            <a:avLst/>
+          </a:prstGeom>
+          <a:ln>
+            <a:solidFill>
+              <a:srgbClr val="00B050"/>
+            </a:solidFill>
+            <a:headEnd type="triangle"/>
+            <a:tailEnd type="none"/>
+          </a:ln>
+        </p:spPr>
+        <p:style>
+          <a:lnRef idx="1">
+            <a:schemeClr val="accent1"/>
+          </a:lnRef>
+          <a:fillRef idx="0">
+            <a:schemeClr val="accent1"/>
+          </a:fillRef>
+          <a:effectRef idx="0">
+            <a:schemeClr val="accent1"/>
+          </a:effectRef>
+          <a:fontRef idx="minor">
+            <a:schemeClr val="tx1"/>
+          </a:fontRef>
+        </p:style>
+      </p:cxnSp>
+      <p:cxnSp>
+        <p:nvCxnSpPr>
+          <p:cNvPr id="57" name="曲线连接符 56">
+            <a:extLst>
+              <a:ext uri="{FF2B5EF4-FFF2-40B4-BE49-F238E27FC236}">
+                <a16:creationId xmlns:a16="http://schemas.microsoft.com/office/drawing/2014/main" id="{CF192EBD-D514-B349-B51C-BECE26CC9F55}"/>
+              </a:ext>
+            </a:extLst>
+          </p:cNvPr>
+          <p:cNvCxnSpPr>
+            <a:cxnSpLocks/>
+            <a:stCxn id="7" idx="3"/>
+            <a:endCxn id="19" idx="1"/>
+          </p:cNvCxnSpPr>
+          <p:nvPr/>
+        </p:nvCxnSpPr>
+        <p:spPr>
+          <a:xfrm>
+            <a:off x="5580112" y="2098241"/>
+            <a:ext cx="1578816" cy="1579976"/>
+          </a:xfrm>
+          <a:prstGeom prst="curvedConnector3">
+            <a:avLst/>
+          </a:prstGeom>
+          <a:ln>
+            <a:solidFill>
+              <a:srgbClr val="00B050"/>
+            </a:solidFill>
+            <a:headEnd type="triangle"/>
+            <a:tailEnd type="none"/>
+          </a:ln>
+        </p:spPr>
+        <p:style>
+          <a:lnRef idx="1">
+            <a:schemeClr val="accent1"/>
+          </a:lnRef>
+          <a:fillRef idx="0">
+            <a:schemeClr val="accent1"/>
+          </a:fillRef>
+          <a:effectRef idx="0">
+            <a:schemeClr val="accent1"/>
+          </a:effectRef>
+          <a:fontRef idx="minor">
+            <a:schemeClr val="tx1"/>
+          </a:fontRef>
+        </p:style>
+      </p:cxnSp>
+      <p:cxnSp>
+        <p:nvCxnSpPr>
+          <p:cNvPr id="59" name="曲线连接符 58">
+            <a:extLst>
+              <a:ext uri="{FF2B5EF4-FFF2-40B4-BE49-F238E27FC236}">
+                <a16:creationId xmlns:a16="http://schemas.microsoft.com/office/drawing/2014/main" id="{7015675C-9207-CE4A-A731-C8DA928220ED}"/>
+              </a:ext>
+            </a:extLst>
+          </p:cNvPr>
+          <p:cNvCxnSpPr>
+            <a:stCxn id="10" idx="3"/>
+            <a:endCxn id="19" idx="1"/>
+          </p:cNvCxnSpPr>
+          <p:nvPr/>
+        </p:nvCxnSpPr>
+        <p:spPr>
+          <a:xfrm>
+            <a:off x="5578510" y="3295856"/>
+            <a:ext cx="1580418" cy="382361"/>
+          </a:xfrm>
+          <a:prstGeom prst="curvedConnector3">
+            <a:avLst/>
+          </a:prstGeom>
+          <a:ln>
+            <a:solidFill>
+              <a:srgbClr val="00B050"/>
+            </a:solidFill>
+            <a:headEnd type="triangle"/>
+            <a:tailEnd type="none"/>
+          </a:ln>
+        </p:spPr>
+        <p:style>
+          <a:lnRef idx="1">
+            <a:schemeClr val="accent1"/>
+          </a:lnRef>
+          <a:fillRef idx="0">
+            <a:schemeClr val="accent1"/>
+          </a:fillRef>
+          <a:effectRef idx="0">
+            <a:schemeClr val="accent1"/>
+          </a:effectRef>
+          <a:fontRef idx="minor">
+            <a:schemeClr val="tx1"/>
+          </a:fontRef>
+        </p:style>
+      </p:cxnSp>
+      <p:cxnSp>
+        <p:nvCxnSpPr>
+          <p:cNvPr id="61" name="曲线连接符 60">
+            <a:extLst>
+              <a:ext uri="{FF2B5EF4-FFF2-40B4-BE49-F238E27FC236}">
+                <a16:creationId xmlns:a16="http://schemas.microsoft.com/office/drawing/2014/main" id="{998402C7-DA0B-F645-A57E-A4F63F433802}"/>
+              </a:ext>
+            </a:extLst>
+          </p:cNvPr>
+          <p:cNvCxnSpPr>
+            <a:stCxn id="11" idx="3"/>
+            <a:endCxn id="19" idx="1"/>
+          </p:cNvCxnSpPr>
+          <p:nvPr/>
+        </p:nvCxnSpPr>
+        <p:spPr>
+          <a:xfrm flipV="1">
+            <a:off x="5575815" y="3678217"/>
+            <a:ext cx="1583113" cy="13420"/>
+          </a:xfrm>
+          <a:prstGeom prst="curvedConnector3">
+            <a:avLst/>
+          </a:prstGeom>
+          <a:ln>
+            <a:solidFill>
+              <a:srgbClr val="00B050"/>
+            </a:solidFill>
+            <a:headEnd type="triangle"/>
+            <a:tailEnd type="none"/>
+          </a:ln>
+        </p:spPr>
+        <p:style>
+          <a:lnRef idx="1">
+            <a:schemeClr val="accent1"/>
+          </a:lnRef>
+          <a:fillRef idx="0">
+            <a:schemeClr val="accent1"/>
+          </a:fillRef>
+          <a:effectRef idx="0">
+            <a:schemeClr val="accent1"/>
+          </a:effectRef>
+          <a:fontRef idx="minor">
+            <a:schemeClr val="tx1"/>
+          </a:fontRef>
+        </p:style>
+      </p:cxnSp>
+      <p:cxnSp>
+        <p:nvCxnSpPr>
+          <p:cNvPr id="63" name="曲线连接符 62">
+            <a:extLst>
+              <a:ext uri="{FF2B5EF4-FFF2-40B4-BE49-F238E27FC236}">
+                <a16:creationId xmlns:a16="http://schemas.microsoft.com/office/drawing/2014/main" id="{FFB5AC18-30A9-744C-A938-31FD876F88D8}"/>
+              </a:ext>
+            </a:extLst>
+          </p:cNvPr>
+          <p:cNvCxnSpPr>
+            <a:stCxn id="12" idx="3"/>
+            <a:endCxn id="19" idx="1"/>
+          </p:cNvCxnSpPr>
+          <p:nvPr/>
+        </p:nvCxnSpPr>
+        <p:spPr>
+          <a:xfrm flipV="1">
+            <a:off x="5577305" y="3678217"/>
+            <a:ext cx="1581623" cy="414614"/>
+          </a:xfrm>
+          <a:prstGeom prst="curvedConnector3">
+            <a:avLst/>
+          </a:prstGeom>
+          <a:ln>
+            <a:solidFill>
+              <a:srgbClr val="00B050"/>
+            </a:solidFill>
+            <a:headEnd type="triangle"/>
+            <a:tailEnd type="none"/>
+          </a:ln>
+        </p:spPr>
+        <p:style>
+          <a:lnRef idx="1">
+            <a:schemeClr val="accent1"/>
+          </a:lnRef>
+          <a:fillRef idx="0">
+            <a:schemeClr val="accent1"/>
+          </a:fillRef>
+          <a:effectRef idx="0">
+            <a:schemeClr val="accent1"/>
+          </a:effectRef>
+          <a:fontRef idx="minor">
+            <a:schemeClr val="tx1"/>
+          </a:fontRef>
+        </p:style>
+      </p:cxnSp>
+      <p:cxnSp>
+        <p:nvCxnSpPr>
+          <p:cNvPr id="65" name="曲线连接符 64">
+            <a:extLst>
+              <a:ext uri="{FF2B5EF4-FFF2-40B4-BE49-F238E27FC236}">
+                <a16:creationId xmlns:a16="http://schemas.microsoft.com/office/drawing/2014/main" id="{09D82ADF-151E-6D4E-A2A8-27655ACC5B43}"/>
+              </a:ext>
+            </a:extLst>
+          </p:cNvPr>
+          <p:cNvCxnSpPr>
+            <a:stCxn id="13" idx="3"/>
+            <a:endCxn id="19" idx="1"/>
+          </p:cNvCxnSpPr>
+          <p:nvPr/>
+        </p:nvCxnSpPr>
+        <p:spPr>
+          <a:xfrm flipV="1">
+            <a:off x="5575815" y="3678217"/>
+            <a:ext cx="1583113" cy="815254"/>
+          </a:xfrm>
+          <a:prstGeom prst="curvedConnector3">
+            <a:avLst/>
+          </a:prstGeom>
+          <a:ln>
+            <a:solidFill>
+              <a:srgbClr val="00B050"/>
+            </a:solidFill>
+            <a:headEnd type="triangle"/>
+            <a:tailEnd type="none"/>
+          </a:ln>
+        </p:spPr>
+        <p:style>
+          <a:lnRef idx="1">
+            <a:schemeClr val="accent1"/>
+          </a:lnRef>
+          <a:fillRef idx="0">
+            <a:schemeClr val="accent1"/>
+          </a:fillRef>
+          <a:effectRef idx="0">
+            <a:schemeClr val="accent1"/>
+          </a:effectRef>
+          <a:fontRef idx="minor">
+            <a:schemeClr val="tx1"/>
+          </a:fontRef>
+        </p:style>
+      </p:cxnSp>
+      <p:cxnSp>
+        <p:nvCxnSpPr>
+          <p:cNvPr id="67" name="曲线连接符 66">
+            <a:extLst>
+              <a:ext uri="{FF2B5EF4-FFF2-40B4-BE49-F238E27FC236}">
+                <a16:creationId xmlns:a16="http://schemas.microsoft.com/office/drawing/2014/main" id="{0A79295B-18B8-CC41-8BCA-E66C454F6F18}"/>
+              </a:ext>
+            </a:extLst>
+          </p:cNvPr>
+          <p:cNvCxnSpPr>
+            <a:stCxn id="14" idx="3"/>
+            <a:endCxn id="19" idx="1"/>
+          </p:cNvCxnSpPr>
+          <p:nvPr/>
+        </p:nvCxnSpPr>
+        <p:spPr>
+          <a:xfrm flipV="1">
+            <a:off x="5575815" y="3678217"/>
+            <a:ext cx="1583113" cy="1215894"/>
+          </a:xfrm>
+          <a:prstGeom prst="curvedConnector3">
+            <a:avLst/>
+          </a:prstGeom>
+          <a:ln>
+            <a:solidFill>
+              <a:srgbClr val="00B050"/>
+            </a:solidFill>
+            <a:headEnd type="triangle"/>
+            <a:tailEnd type="none"/>
+          </a:ln>
+        </p:spPr>
+        <p:style>
+          <a:lnRef idx="1">
+            <a:schemeClr val="accent1"/>
+          </a:lnRef>
+          <a:fillRef idx="0">
+            <a:schemeClr val="accent1"/>
+          </a:fillRef>
+          <a:effectRef idx="0">
+            <a:schemeClr val="accent1"/>
+          </a:effectRef>
+          <a:fontRef idx="minor">
+            <a:schemeClr val="tx1"/>
+          </a:fontRef>
+        </p:style>
+      </p:cxnSp>
+      <p:cxnSp>
+        <p:nvCxnSpPr>
+          <p:cNvPr id="69" name="曲线连接符 68">
+            <a:extLst>
+              <a:ext uri="{FF2B5EF4-FFF2-40B4-BE49-F238E27FC236}">
+                <a16:creationId xmlns:a16="http://schemas.microsoft.com/office/drawing/2014/main" id="{9BED2651-BD8E-0243-BC1D-11D53B35EFB4}"/>
+              </a:ext>
+            </a:extLst>
+          </p:cNvPr>
+          <p:cNvCxnSpPr>
+            <a:stCxn id="15" idx="3"/>
+            <a:endCxn id="19" idx="1"/>
+          </p:cNvCxnSpPr>
+          <p:nvPr/>
+        </p:nvCxnSpPr>
+        <p:spPr>
+          <a:xfrm flipV="1">
+            <a:off x="5575815" y="3678217"/>
+            <a:ext cx="1583113" cy="1618122"/>
+          </a:xfrm>
+          <a:prstGeom prst="curvedConnector3">
+            <a:avLst/>
+          </a:prstGeom>
+          <a:ln>
+            <a:solidFill>
+              <a:srgbClr val="00B050"/>
+            </a:solidFill>
+            <a:headEnd type="triangle"/>
+            <a:tailEnd type="none"/>
+          </a:ln>
+        </p:spPr>
+        <p:style>
+          <a:lnRef idx="1">
+            <a:schemeClr val="accent1"/>
+          </a:lnRef>
+          <a:fillRef idx="0">
+            <a:schemeClr val="accent1"/>
+          </a:fillRef>
+          <a:effectRef idx="0">
+            <a:schemeClr val="accent1"/>
+          </a:effectRef>
+          <a:fontRef idx="minor">
+            <a:schemeClr val="tx1"/>
+          </a:fontRef>
+        </p:style>
+      </p:cxnSp>
+      <p:cxnSp>
+        <p:nvCxnSpPr>
+          <p:cNvPr id="71" name="曲线连接符 70">
+            <a:extLst>
+              <a:ext uri="{FF2B5EF4-FFF2-40B4-BE49-F238E27FC236}">
+                <a16:creationId xmlns:a16="http://schemas.microsoft.com/office/drawing/2014/main" id="{3C483E98-E275-FF4D-B431-5D516FDFAC6D}"/>
+              </a:ext>
+            </a:extLst>
+          </p:cNvPr>
+          <p:cNvCxnSpPr>
+            <a:stCxn id="16" idx="3"/>
+            <a:endCxn id="19" idx="1"/>
+          </p:cNvCxnSpPr>
+          <p:nvPr/>
+        </p:nvCxnSpPr>
+        <p:spPr>
+          <a:xfrm flipV="1">
+            <a:off x="5575815" y="3678217"/>
+            <a:ext cx="1583113" cy="2020350"/>
+          </a:xfrm>
+          <a:prstGeom prst="curvedConnector3">
+            <a:avLst/>
+          </a:prstGeom>
+          <a:ln>
+            <a:solidFill>
+              <a:srgbClr val="00B050"/>
+            </a:solidFill>
+            <a:headEnd type="triangle"/>
+            <a:tailEnd type="none"/>
+          </a:ln>
+        </p:spPr>
+        <p:style>
+          <a:lnRef idx="1">
+            <a:schemeClr val="accent1"/>
+          </a:lnRef>
+          <a:fillRef idx="0">
+            <a:schemeClr val="accent1"/>
+          </a:fillRef>
+          <a:effectRef idx="0">
+            <a:schemeClr val="accent1"/>
+          </a:effectRef>
+          <a:fontRef idx="minor">
+            <a:schemeClr val="tx1"/>
+          </a:fontRef>
+        </p:style>
+      </p:cxnSp>
+      <p:cxnSp>
+        <p:nvCxnSpPr>
+          <p:cNvPr id="73" name="曲线连接符 72">
+            <a:extLst>
+              <a:ext uri="{FF2B5EF4-FFF2-40B4-BE49-F238E27FC236}">
+                <a16:creationId xmlns:a16="http://schemas.microsoft.com/office/drawing/2014/main" id="{9E9326D5-6274-5449-906F-453F925977E1}"/>
+              </a:ext>
+            </a:extLst>
+          </p:cNvPr>
+          <p:cNvCxnSpPr>
+            <a:stCxn id="17" idx="3"/>
+            <a:endCxn id="19" idx="1"/>
+          </p:cNvCxnSpPr>
+          <p:nvPr/>
+        </p:nvCxnSpPr>
+        <p:spPr>
+          <a:xfrm flipV="1">
+            <a:off x="5575815" y="3678217"/>
+            <a:ext cx="1583113" cy="2422578"/>
+          </a:xfrm>
+          <a:prstGeom prst="curvedConnector3">
+            <a:avLst/>
+          </a:prstGeom>
+          <a:ln>
+            <a:solidFill>
+              <a:srgbClr val="00B050"/>
+            </a:solidFill>
+            <a:headEnd type="triangle"/>
+            <a:tailEnd type="none"/>
+          </a:ln>
+        </p:spPr>
+        <p:style>
+          <a:lnRef idx="1">
+            <a:schemeClr val="accent1"/>
+          </a:lnRef>
+          <a:fillRef idx="0">
+            <a:schemeClr val="accent1"/>
+          </a:fillRef>
+          <a:effectRef idx="0">
+            <a:schemeClr val="accent1"/>
+          </a:effectRef>
+          <a:fontRef idx="minor">
+            <a:schemeClr val="tx1"/>
+          </a:fontRef>
+        </p:style>
+      </p:cxnSp>
+      <p:cxnSp>
+        <p:nvCxnSpPr>
+          <p:cNvPr id="75" name="曲线连接符 74">
+            <a:extLst>
+              <a:ext uri="{FF2B5EF4-FFF2-40B4-BE49-F238E27FC236}">
+                <a16:creationId xmlns:a16="http://schemas.microsoft.com/office/drawing/2014/main" id="{9C33A6D2-CA9D-034C-87E6-4094234B3D75}"/>
+              </a:ext>
+            </a:extLst>
+          </p:cNvPr>
+          <p:cNvCxnSpPr>
+            <a:stCxn id="18" idx="3"/>
+            <a:endCxn id="19" idx="1"/>
+          </p:cNvCxnSpPr>
+          <p:nvPr/>
+        </p:nvCxnSpPr>
+        <p:spPr>
+          <a:xfrm flipV="1">
+            <a:off x="5575815" y="3678217"/>
+            <a:ext cx="1583113" cy="2824806"/>
+          </a:xfrm>
+          <a:prstGeom prst="curvedConnector3">
+            <a:avLst/>
+          </a:prstGeom>
+          <a:ln>
+            <a:solidFill>
+              <a:srgbClr val="00B050"/>
+            </a:solidFill>
+            <a:headEnd type="triangle"/>
+            <a:tailEnd type="none"/>
+          </a:ln>
+        </p:spPr>
+        <p:style>
+          <a:lnRef idx="1">
+            <a:schemeClr val="accent1"/>
+          </a:lnRef>
+          <a:fillRef idx="0">
+            <a:schemeClr val="accent1"/>
+          </a:fillRef>
+          <a:effectRef idx="0">
+            <a:schemeClr val="accent1"/>
+          </a:effectRef>
+          <a:fontRef idx="minor">
+            <a:schemeClr val="tx1"/>
+          </a:fontRef>
+        </p:style>
+      </p:cxnSp>
+      <p:cxnSp>
+        <p:nvCxnSpPr>
+          <p:cNvPr id="90" name="曲线连接符 89">
+            <a:extLst>
+              <a:ext uri="{FF2B5EF4-FFF2-40B4-BE49-F238E27FC236}">
+                <a16:creationId xmlns:a16="http://schemas.microsoft.com/office/drawing/2014/main" id="{F66F1394-A879-3C44-B19E-D79C6C855D37}"/>
+              </a:ext>
+            </a:extLst>
+          </p:cNvPr>
+          <p:cNvCxnSpPr>
+            <a:stCxn id="9" idx="3"/>
+            <a:endCxn id="19" idx="1"/>
+          </p:cNvCxnSpPr>
+          <p:nvPr/>
+        </p:nvCxnSpPr>
+        <p:spPr>
+          <a:xfrm>
+            <a:off x="5575815" y="2899521"/>
+            <a:ext cx="1583113" cy="778696"/>
+          </a:xfrm>
+          <a:prstGeom prst="curvedConnector3">
+            <a:avLst/>
+          </a:prstGeom>
+          <a:ln>
+            <a:solidFill>
+              <a:srgbClr val="00B050"/>
+            </a:solidFill>
+            <a:headEnd type="triangle"/>
+            <a:tailEnd type="none"/>
+          </a:ln>
+        </p:spPr>
+        <p:style>
+          <a:lnRef idx="1">
+            <a:schemeClr val="accent1"/>
+          </a:lnRef>
+          <a:fillRef idx="0">
+            <a:schemeClr val="accent1"/>
+          </a:fillRef>
+          <a:effectRef idx="0">
+            <a:schemeClr val="accent1"/>
+          </a:effectRef>
+          <a:fontRef idx="minor">
+            <a:schemeClr val="tx1"/>
+          </a:fontRef>
+        </p:style>
+      </p:cxnSp>
+      <p:sp>
+        <p:nvSpPr>
+          <p:cNvPr id="105" name="文本框 104">
+            <a:extLst>
+              <a:ext uri="{FF2B5EF4-FFF2-40B4-BE49-F238E27FC236}">
+                <a16:creationId xmlns:a16="http://schemas.microsoft.com/office/drawing/2014/main" id="{99B96D05-FAB1-0C44-B0D2-DA08D4466622}"/>
+              </a:ext>
+            </a:extLst>
+          </p:cNvPr>
+          <p:cNvSpPr txBox="1"/>
+          <p:nvPr/>
+        </p:nvSpPr>
+        <p:spPr>
+          <a:xfrm>
+            <a:off x="622659" y="1548685"/>
+            <a:ext cx="1445520" cy="646331"/>
+          </a:xfrm>
+          <a:prstGeom prst="rect">
+            <a:avLst/>
+          </a:prstGeom>
+          <a:noFill/>
+        </p:spPr>
+        <p:txBody>
+          <a:bodyPr wrap="square" rtlCol="0">
+            <a:spAutoFit/>
+          </a:bodyPr>
+          <a:lstStyle/>
+          <a:p>
+            <a:r>
+              <a:rPr kumimoji="1" lang="en-US" altLang="zh-CN" dirty="0"/>
+              <a:t>Redis</a:t>
+            </a:r>
+            <a:r>
+              <a:rPr kumimoji="1" lang="zh-CN" altLang="en-US" dirty="0"/>
+              <a:t>命令类映射关系图</a:t>
+            </a:r>
+          </a:p>
+        </p:txBody>
+      </p:sp>
+      <p:sp>
+        <p:nvSpPr>
+          <p:cNvPr id="106" name="文本框 105">
+            <a:extLst>
+              <a:ext uri="{FF2B5EF4-FFF2-40B4-BE49-F238E27FC236}">
+                <a16:creationId xmlns:a16="http://schemas.microsoft.com/office/drawing/2014/main" id="{7EA4C7A3-115E-FE41-A2CA-48608AB97BD3}"/>
+              </a:ext>
+            </a:extLst>
+          </p:cNvPr>
+          <p:cNvSpPr txBox="1"/>
+          <p:nvPr/>
+        </p:nvSpPr>
+        <p:spPr>
+          <a:xfrm>
+            <a:off x="6732240" y="1467730"/>
+            <a:ext cx="1938855" cy="923330"/>
+          </a:xfrm>
+          <a:prstGeom prst="rect">
+            <a:avLst/>
+          </a:prstGeom>
+          <a:noFill/>
+        </p:spPr>
+        <p:txBody>
+          <a:bodyPr wrap="square" rtlCol="0">
+            <a:spAutoFit/>
+          </a:bodyPr>
+          <a:lstStyle/>
+          <a:p>
+            <a:r>
+              <a:rPr kumimoji="1" lang="zh-CN" altLang="en-US" dirty="0"/>
+              <a:t>每个</a:t>
+            </a:r>
+            <a:r>
+              <a:rPr kumimoji="1" lang="en-US" altLang="zh-CN" dirty="0"/>
+              <a:t>Redis</a:t>
+            </a:r>
+            <a:r>
+              <a:rPr kumimoji="1" lang="zh-CN" altLang="en-US" dirty="0"/>
+              <a:t>命令在类内部对应一个或多个方法接口</a:t>
+            </a:r>
+          </a:p>
+        </p:txBody>
+      </p:sp>
+      <p:sp>
+        <p:nvSpPr>
+          <p:cNvPr id="107" name="文本框 106">
+            <a:extLst>
+              <a:ext uri="{FF2B5EF4-FFF2-40B4-BE49-F238E27FC236}">
+                <a16:creationId xmlns:a16="http://schemas.microsoft.com/office/drawing/2014/main" id="{E5381406-EB5E-E548-89C0-2E9B45C7D1E0}"/>
+              </a:ext>
+            </a:extLst>
+          </p:cNvPr>
+          <p:cNvSpPr txBox="1"/>
+          <p:nvPr/>
+        </p:nvSpPr>
+        <p:spPr>
+          <a:xfrm>
+            <a:off x="457202" y="4907828"/>
+            <a:ext cx="1810542" cy="646331"/>
+          </a:xfrm>
+          <a:prstGeom prst="rect">
+            <a:avLst/>
+          </a:prstGeom>
+          <a:noFill/>
+        </p:spPr>
+        <p:txBody>
+          <a:bodyPr wrap="square" rtlCol="0">
+            <a:spAutoFit/>
+          </a:bodyPr>
+          <a:lstStyle/>
+          <a:p>
+            <a:r>
+              <a:rPr kumimoji="1" lang="zh-CN" altLang="en-US" dirty="0"/>
+              <a:t>所有的类都继承于同一个基类</a:t>
+            </a:r>
+          </a:p>
+        </p:txBody>
+      </p:sp>
+      <p:sp>
+        <p:nvSpPr>
+          <p:cNvPr id="108" name="文本框 107">
+            <a:extLst>
+              <a:ext uri="{FF2B5EF4-FFF2-40B4-BE49-F238E27FC236}">
+                <a16:creationId xmlns:a16="http://schemas.microsoft.com/office/drawing/2014/main" id="{87BE67E6-212A-8544-ACA8-4DF1AC2CB284}"/>
+              </a:ext>
+            </a:extLst>
+          </p:cNvPr>
+          <p:cNvSpPr txBox="1"/>
+          <p:nvPr/>
+        </p:nvSpPr>
+        <p:spPr>
+          <a:xfrm>
+            <a:off x="6732240" y="4965374"/>
+            <a:ext cx="2072530" cy="646331"/>
+          </a:xfrm>
+          <a:prstGeom prst="rect">
+            <a:avLst/>
+          </a:prstGeom>
+          <a:noFill/>
+        </p:spPr>
+        <p:txBody>
+          <a:bodyPr wrap="square" rtlCol="0">
+            <a:spAutoFit/>
+          </a:bodyPr>
+          <a:lstStyle/>
+          <a:p>
+            <a:r>
+              <a:rPr kumimoji="1" lang="zh-CN" altLang="en-US" dirty="0"/>
+              <a:t>一个统一的子类继承了所有命令类</a:t>
+            </a:r>
+          </a:p>
+        </p:txBody>
+      </p:sp>
     </p:spTree>
     <p:extLst>
       <p:ext uri="{BB962C8B-B14F-4D97-AF65-F5344CB8AC3E}">
-        <p14:creationId xmlns:p14="http://schemas.microsoft.com/office/powerpoint/2010/main" val="4034950950"/>
+        <p14:creationId xmlns:p14="http://schemas.microsoft.com/office/powerpoint/2010/main" val="95693272"/>
       </p:ext>
     </p:extLst>
   </p:cSld>
@@ -7997,6 +10126,120 @@
           <p:cNvPr id="2" name="标题 1">
             <a:extLst>
               <a:ext uri="{FF2B5EF4-FFF2-40B4-BE49-F238E27FC236}">
+                <a16:creationId xmlns:a16="http://schemas.microsoft.com/office/drawing/2014/main" id="{2A88D221-36EC-1C4A-86A7-23994D948939}"/>
+              </a:ext>
+            </a:extLst>
+          </p:cNvPr>
+          <p:cNvSpPr>
+            <a:spLocks noGrp="1"/>
+          </p:cNvSpPr>
+          <p:nvPr>
+            <p:ph type="title"/>
+          </p:nvPr>
+        </p:nvSpPr>
+        <p:spPr/>
+        <p:txBody>
+          <a:bodyPr/>
+          <a:lstStyle/>
+          <a:p>
+            <a:r>
+              <a:rPr kumimoji="1" lang="zh-CN" altLang="en-US" dirty="0"/>
+              <a:t>使用</a:t>
+            </a:r>
+            <a:r>
+              <a:rPr kumimoji="1" lang="en-US" altLang="zh-CN" dirty="0"/>
+              <a:t>Acl</a:t>
+            </a:r>
+            <a:r>
+              <a:rPr kumimoji="1" lang="zh-CN" altLang="en-US" dirty="0"/>
+              <a:t> </a:t>
+            </a:r>
+            <a:r>
+              <a:rPr kumimoji="1" lang="en-US" altLang="zh-CN" dirty="0"/>
+              <a:t>Redis</a:t>
+            </a:r>
+            <a:r>
+              <a:rPr kumimoji="1" lang="zh-CN" altLang="en-US" dirty="0"/>
+              <a:t>库轻松编写</a:t>
+            </a:r>
+            <a:r>
+              <a:rPr kumimoji="1" lang="en-US" altLang="zh-CN" dirty="0"/>
+              <a:t>Redis</a:t>
+            </a:r>
+            <a:r>
+              <a:rPr kumimoji="1" lang="zh-CN" altLang="en-US" dirty="0"/>
+              <a:t>应用</a:t>
+            </a:r>
+          </a:p>
+        </p:txBody>
+      </p:sp>
+      <p:pic>
+        <p:nvPicPr>
+          <p:cNvPr id="10" name="内容占位符 9">
+            <a:extLst>
+              <a:ext uri="{FF2B5EF4-FFF2-40B4-BE49-F238E27FC236}">
+                <a16:creationId xmlns:a16="http://schemas.microsoft.com/office/drawing/2014/main" id="{F05670E7-C3CD-C64F-BE30-4EBF74CF1CB5}"/>
+              </a:ext>
+            </a:extLst>
+          </p:cNvPr>
+          <p:cNvPicPr>
+            <a:picLocks noGrp="1" noChangeAspect="1"/>
+          </p:cNvPicPr>
+          <p:nvPr>
+            <p:ph idx="1"/>
+          </p:nvPr>
+        </p:nvPicPr>
+        <p:blipFill>
+          <a:blip r:embed="rId2"/>
+          <a:stretch>
+            <a:fillRect/>
+          </a:stretch>
+        </p:blipFill>
+        <p:spPr>
+          <a:xfrm>
+            <a:off x="323528" y="1047750"/>
+            <a:ext cx="8424935" cy="5143500"/>
+          </a:xfrm>
+          <a:prstGeom prst="rect">
+            <a:avLst/>
+          </a:prstGeom>
+        </p:spPr>
+      </p:pic>
+    </p:spTree>
+    <p:extLst>
+      <p:ext uri="{BB962C8B-B14F-4D97-AF65-F5344CB8AC3E}">
+        <p14:creationId xmlns:p14="http://schemas.microsoft.com/office/powerpoint/2010/main" val="4034950950"/>
+      </p:ext>
+    </p:extLst>
+  </p:cSld>
+  <p:clrMapOvr>
+    <a:masterClrMapping/>
+  </p:clrMapOvr>
+</p:sld>
+</file>
+
+<file path=ppt/slides/slide21.xml><?xml version="1.0" encoding="utf-8"?>
+<p:sld xmlns:a="http://schemas.openxmlformats.org/drawingml/2006/main" xmlns:r="http://schemas.openxmlformats.org/officeDocument/2006/relationships" xmlns:p="http://schemas.openxmlformats.org/presentationml/2006/main">
+  <p:cSld>
+    <p:spTree>
+      <p:nvGrpSpPr>
+        <p:cNvPr id="1" name=""/>
+        <p:cNvGrpSpPr/>
+        <p:nvPr/>
+      </p:nvGrpSpPr>
+      <p:grpSpPr>
+        <a:xfrm>
+          <a:off x="0" y="0"/>
+          <a:ext cx="0" cy="0"/>
+          <a:chOff x="0" y="0"/>
+          <a:chExt cx="0" cy="0"/>
+        </a:xfrm>
+      </p:grpSpPr>
+      <p:sp>
+        <p:nvSpPr>
+          <p:cNvPr id="2" name="标题 1">
+            <a:extLst>
+              <a:ext uri="{FF2B5EF4-FFF2-40B4-BE49-F238E27FC236}">
                 <a16:creationId xmlns:a16="http://schemas.microsoft.com/office/drawing/2014/main" id="{3E212908-A92E-B14B-827A-7E53A1157DF5}"/>
               </a:ext>
             </a:extLst>
@@ -8419,7 +10662,7 @@
 </p:sld>
 </file>
 
-<file path=ppt/slides/slide21.xml><?xml version="1.0" encoding="utf-8"?>
+<file path=ppt/slides/slide22.xml><?xml version="1.0" encoding="utf-8"?>
 <p:sld xmlns:a="http://schemas.openxmlformats.org/drawingml/2006/main" xmlns:r="http://schemas.openxmlformats.org/officeDocument/2006/relationships" xmlns:p="http://schemas.openxmlformats.org/presentationml/2006/main">
   <p:cSld>
     <p:spTree>
@@ -9970,7 +12213,7 @@
 </p:sld>
 </file>
 
-<file path=ppt/slides/slide22.xml><?xml version="1.0" encoding="utf-8"?>
+<file path=ppt/slides/slide23.xml><?xml version="1.0" encoding="utf-8"?>
 <p:sld xmlns:a="http://schemas.openxmlformats.org/drawingml/2006/main" xmlns:r="http://schemas.openxmlformats.org/officeDocument/2006/relationships" xmlns:p="http://schemas.openxmlformats.org/presentationml/2006/main">
   <p:cSld>
     <p:spTree>
@@ -10084,7 +12327,7 @@
 </p:sld>
 </file>
 
-<file path=ppt/slides/slide23.xml><?xml version="1.0" encoding="utf-8"?>
+<file path=ppt/slides/slide24.xml><?xml version="1.0" encoding="utf-8"?>
 <p:sld xmlns:a="http://schemas.openxmlformats.org/drawingml/2006/main" xmlns:r="http://schemas.openxmlformats.org/officeDocument/2006/relationships" xmlns:p="http://schemas.openxmlformats.org/presentationml/2006/main">
   <p:cSld>
     <p:spTree>
@@ -10476,195 +12719,6 @@
     <p:extLst>
       <p:ext uri="{BB962C8B-B14F-4D97-AF65-F5344CB8AC3E}">
         <p14:creationId xmlns:p14="http://schemas.microsoft.com/office/powerpoint/2010/main" val="3891656050"/>
-      </p:ext>
-    </p:extLst>
-  </p:cSld>
-  <p:clrMapOvr>
-    <a:masterClrMapping/>
-  </p:clrMapOvr>
-</p:sld>
-</file>
-
-<file path=ppt/slides/slide24.xml><?xml version="1.0" encoding="utf-8"?>
-<p:sld xmlns:a="http://schemas.openxmlformats.org/drawingml/2006/main" xmlns:r="http://schemas.openxmlformats.org/officeDocument/2006/relationships" xmlns:p="http://schemas.openxmlformats.org/presentationml/2006/main">
-  <p:cSld>
-    <p:spTree>
-      <p:nvGrpSpPr>
-        <p:cNvPr id="1" name=""/>
-        <p:cNvGrpSpPr/>
-        <p:nvPr/>
-      </p:nvGrpSpPr>
-      <p:grpSpPr>
-        <a:xfrm>
-          <a:off x="0" y="0"/>
-          <a:ext cx="0" cy="0"/>
-          <a:chOff x="0" y="0"/>
-          <a:chExt cx="0" cy="0"/>
-        </a:xfrm>
-      </p:grpSpPr>
-      <p:sp>
-        <p:nvSpPr>
-          <p:cNvPr id="2" name="标题 1"/>
-          <p:cNvSpPr>
-            <a:spLocks noGrp="1"/>
-          </p:cNvSpPr>
-          <p:nvPr>
-            <p:ph type="title"/>
-          </p:nvPr>
-        </p:nvSpPr>
-        <p:spPr/>
-        <p:txBody>
-          <a:bodyPr/>
-          <a:lstStyle/>
-          <a:p>
-            <a:r>
-              <a:rPr lang="en-US" altLang="zh-CN" dirty="0" err="1"/>
-              <a:t>redis_builder</a:t>
-            </a:r>
-            <a:r>
-              <a:rPr lang="en-US" altLang="zh-CN" dirty="0"/>
-              <a:t> </a:t>
-            </a:r>
-            <a:r>
-              <a:rPr lang="zh-CN" altLang="en-US" dirty="0"/>
-              <a:t>工具使用</a:t>
-            </a:r>
-          </a:p>
-        </p:txBody>
-      </p:sp>
-      <p:sp>
-        <p:nvSpPr>
-          <p:cNvPr id="3" name="内容占位符 2"/>
-          <p:cNvSpPr>
-            <a:spLocks noGrp="1"/>
-          </p:cNvSpPr>
-          <p:nvPr>
-            <p:ph idx="1"/>
-          </p:nvPr>
-        </p:nvSpPr>
-        <p:spPr/>
-        <p:txBody>
-          <a:bodyPr/>
-          <a:lstStyle/>
-          <a:p>
-            <a:r>
-              <a:rPr lang="en-US" altLang="zh-CN" dirty="0"/>
-              <a:t>1</a:t>
-            </a:r>
-            <a:r>
-              <a:rPr lang="zh-CN" altLang="en-US" dirty="0"/>
-              <a:t>、跨平台：支持 </a:t>
-            </a:r>
-            <a:r>
-              <a:rPr lang="en-US" altLang="zh-CN" dirty="0"/>
-              <a:t>Linux/Windows</a:t>
-            </a:r>
-          </a:p>
-          <a:p>
-            <a:r>
-              <a:rPr lang="en-US" altLang="zh-CN" dirty="0"/>
-              <a:t>2</a:t>
-            </a:r>
-            <a:r>
-              <a:rPr lang="zh-CN" altLang="en-US" dirty="0"/>
-              <a:t>、支持“创建集群的建议原则”中的 </a:t>
-            </a:r>
-            <a:r>
-              <a:rPr lang="en-US" altLang="zh-CN" dirty="0"/>
-              <a:t>1– 5 </a:t>
-            </a:r>
-            <a:r>
-              <a:rPr lang="zh-CN" altLang="en-US" dirty="0"/>
-              <a:t>条</a:t>
-            </a:r>
-            <a:endParaRPr lang="en-US" altLang="zh-CN" dirty="0"/>
-          </a:p>
-          <a:p>
-            <a:r>
-              <a:rPr lang="en-US" altLang="zh-CN" dirty="0"/>
-              <a:t>3</a:t>
-            </a:r>
-            <a:r>
-              <a:rPr lang="zh-CN" altLang="en-US" dirty="0"/>
-              <a:t>、通过配置，自动创建 </a:t>
-            </a:r>
-            <a:r>
-              <a:rPr lang="en-US" altLang="zh-CN" dirty="0" err="1"/>
-              <a:t>redis</a:t>
-            </a:r>
-            <a:r>
-              <a:rPr lang="en-US" altLang="zh-CN" dirty="0"/>
-              <a:t> </a:t>
-            </a:r>
-            <a:r>
-              <a:rPr lang="zh-CN" altLang="en-US" dirty="0"/>
-              <a:t>集群，支持创建较大的 </a:t>
-            </a:r>
-            <a:r>
-              <a:rPr lang="en-US" altLang="zh-CN" dirty="0" err="1"/>
-              <a:t>redis</a:t>
-            </a:r>
-            <a:r>
-              <a:rPr lang="en-US" altLang="zh-CN" dirty="0"/>
-              <a:t> </a:t>
-            </a:r>
-            <a:r>
-              <a:rPr lang="zh-CN" altLang="en-US" dirty="0"/>
-              <a:t>集群</a:t>
-            </a:r>
-            <a:endParaRPr lang="en-US" altLang="zh-CN" dirty="0"/>
-          </a:p>
-          <a:p>
-            <a:r>
-              <a:rPr lang="en-US" altLang="zh-CN" dirty="0"/>
-              <a:t>4</a:t>
-            </a:r>
-            <a:r>
-              <a:rPr lang="zh-CN" altLang="en-US" dirty="0"/>
-              <a:t>、丰富的集群管理能力</a:t>
-            </a:r>
-            <a:endParaRPr lang="en-US" altLang="zh-CN" dirty="0"/>
-          </a:p>
-          <a:p>
-            <a:r>
-              <a:rPr lang="en-US" altLang="zh-CN" dirty="0"/>
-              <a:t>5</a:t>
-            </a:r>
-            <a:r>
-              <a:rPr lang="zh-CN" altLang="en-US" dirty="0"/>
-              <a:t>、支持安全管理集群的能力</a:t>
-            </a:r>
-          </a:p>
-        </p:txBody>
-      </p:sp>
-      <p:pic>
-        <p:nvPicPr>
-          <p:cNvPr id="4" name="图片 3"/>
-          <p:cNvPicPr>
-            <a:picLocks noChangeAspect="1"/>
-          </p:cNvPicPr>
-          <p:nvPr/>
-        </p:nvPicPr>
-        <p:blipFill>
-          <a:blip r:embed="rId2"/>
-          <a:stretch>
-            <a:fillRect/>
-          </a:stretch>
-        </p:blipFill>
-        <p:spPr>
-          <a:xfrm>
-            <a:off x="624098" y="3068960"/>
-            <a:ext cx="7908342" cy="2880320"/>
-          </a:xfrm>
-          <a:prstGeom prst="rect">
-            <a:avLst/>
-          </a:prstGeom>
-        </p:spPr>
-      </p:pic>
-    </p:spTree>
-    <p:extLst>
-      <p:ext uri="{BB962C8B-B14F-4D97-AF65-F5344CB8AC3E}">
-        <p14:creationId xmlns:p14="http://schemas.microsoft.com/office/powerpoint/2010/main" val="2008550456"/>
       </p:ext>
     </p:extLst>
   </p:cSld>
@@ -10703,30 +12757,16 @@
         </p:nvSpPr>
         <p:spPr/>
         <p:txBody>
-          <a:bodyPr>
-            <a:normAutofit/>
-          </a:bodyPr>
+          <a:bodyPr/>
           <a:lstStyle/>
           <a:p>
             <a:r>
+              <a:rPr lang="en-US" altLang="zh-CN" dirty="0"/>
+              <a:t>redis_builder </a:t>
+            </a:r>
+            <a:r>
               <a:rPr lang="zh-CN" altLang="en-US" dirty="0"/>
-              <a:t>手工指定集群节点分布 </a:t>
-            </a:r>
-            <a:r>
-              <a:rPr lang="en-US" altLang="zh-CN" dirty="0"/>
-              <a:t>--- </a:t>
-            </a:r>
-            <a:r>
-              <a:rPr lang="en-US" altLang="zh-CN" sz="2000" dirty="0" err="1"/>
-              <a:t>redis_builder</a:t>
-            </a:r>
-            <a:r>
-              <a:rPr lang="en-US" altLang="zh-CN" sz="2000" dirty="0"/>
-              <a:t> </a:t>
-            </a:r>
-            <a:r>
-              <a:rPr lang="zh-CN" altLang="en-US" sz="2000" dirty="0"/>
-              <a:t>创建集群</a:t>
+              <a:t>工具使用</a:t>
             </a:r>
           </a:p>
         </p:txBody>
@@ -10741,6 +12781,193 @@
             <p:ph idx="1"/>
           </p:nvPr>
         </p:nvSpPr>
+        <p:spPr/>
+        <p:txBody>
+          <a:bodyPr/>
+          <a:lstStyle/>
+          <a:p>
+            <a:r>
+              <a:rPr lang="en-US" altLang="zh-CN" dirty="0"/>
+              <a:t>1</a:t>
+            </a:r>
+            <a:r>
+              <a:rPr lang="zh-CN" altLang="en-US" dirty="0"/>
+              <a:t>、跨平台：支持 </a:t>
+            </a:r>
+            <a:r>
+              <a:rPr lang="en-US" altLang="zh-CN" dirty="0"/>
+              <a:t>Linux/Windows</a:t>
+            </a:r>
+          </a:p>
+          <a:p>
+            <a:r>
+              <a:rPr lang="en-US" altLang="zh-CN" dirty="0"/>
+              <a:t>2</a:t>
+            </a:r>
+            <a:r>
+              <a:rPr lang="zh-CN" altLang="en-US" dirty="0"/>
+              <a:t>、支持“创建集群的建议原则”中的 </a:t>
+            </a:r>
+            <a:r>
+              <a:rPr lang="en-US" altLang="zh-CN" dirty="0"/>
+              <a:t>1– 5 </a:t>
+            </a:r>
+            <a:r>
+              <a:rPr lang="zh-CN" altLang="en-US" dirty="0"/>
+              <a:t>条</a:t>
+            </a:r>
+            <a:endParaRPr lang="en-US" altLang="zh-CN" dirty="0"/>
+          </a:p>
+          <a:p>
+            <a:r>
+              <a:rPr lang="en-US" altLang="zh-CN" dirty="0"/>
+              <a:t>3</a:t>
+            </a:r>
+            <a:r>
+              <a:rPr lang="zh-CN" altLang="en-US" dirty="0"/>
+              <a:t>、通过配置，自动创建 </a:t>
+            </a:r>
+            <a:r>
+              <a:rPr lang="en-US" altLang="zh-CN" dirty="0"/>
+              <a:t>redis </a:t>
+            </a:r>
+            <a:r>
+              <a:rPr lang="zh-CN" altLang="en-US" dirty="0"/>
+              <a:t>集群，支持创建较大的 </a:t>
+            </a:r>
+            <a:r>
+              <a:rPr lang="en-US" altLang="zh-CN" dirty="0"/>
+              <a:t>redis </a:t>
+            </a:r>
+            <a:r>
+              <a:rPr lang="zh-CN" altLang="en-US" dirty="0"/>
+              <a:t>集群</a:t>
+            </a:r>
+            <a:endParaRPr lang="en-US" altLang="zh-CN" dirty="0"/>
+          </a:p>
+          <a:p>
+            <a:r>
+              <a:rPr lang="en-US" altLang="zh-CN" dirty="0"/>
+              <a:t>4</a:t>
+            </a:r>
+            <a:r>
+              <a:rPr lang="zh-CN" altLang="en-US" dirty="0"/>
+              <a:t>、丰富的集群管理能力</a:t>
+            </a:r>
+            <a:endParaRPr lang="en-US" altLang="zh-CN" dirty="0"/>
+          </a:p>
+          <a:p>
+            <a:r>
+              <a:rPr lang="en-US" altLang="zh-CN" dirty="0"/>
+              <a:t>5</a:t>
+            </a:r>
+            <a:r>
+              <a:rPr lang="zh-CN" altLang="en-US" dirty="0"/>
+              <a:t>、支持安全管理集群的能力</a:t>
+            </a:r>
+          </a:p>
+        </p:txBody>
+      </p:sp>
+      <p:pic>
+        <p:nvPicPr>
+          <p:cNvPr id="4" name="图片 3"/>
+          <p:cNvPicPr>
+            <a:picLocks noChangeAspect="1"/>
+          </p:cNvPicPr>
+          <p:nvPr/>
+        </p:nvPicPr>
+        <p:blipFill>
+          <a:blip r:embed="rId2"/>
+          <a:stretch>
+            <a:fillRect/>
+          </a:stretch>
+        </p:blipFill>
+        <p:spPr>
+          <a:xfrm>
+            <a:off x="624098" y="3068960"/>
+            <a:ext cx="7908342" cy="2880320"/>
+          </a:xfrm>
+          <a:prstGeom prst="rect">
+            <a:avLst/>
+          </a:prstGeom>
+        </p:spPr>
+      </p:pic>
+    </p:spTree>
+    <p:extLst>
+      <p:ext uri="{BB962C8B-B14F-4D97-AF65-F5344CB8AC3E}">
+        <p14:creationId xmlns:p14="http://schemas.microsoft.com/office/powerpoint/2010/main" val="2008550456"/>
+      </p:ext>
+    </p:extLst>
+  </p:cSld>
+  <p:clrMapOvr>
+    <a:masterClrMapping/>
+  </p:clrMapOvr>
+</p:sld>
+</file>
+
+<file path=ppt/slides/slide26.xml><?xml version="1.0" encoding="utf-8"?>
+<p:sld xmlns:a="http://schemas.openxmlformats.org/drawingml/2006/main" xmlns:r="http://schemas.openxmlformats.org/officeDocument/2006/relationships" xmlns:p="http://schemas.openxmlformats.org/presentationml/2006/main">
+  <p:cSld>
+    <p:spTree>
+      <p:nvGrpSpPr>
+        <p:cNvPr id="1" name=""/>
+        <p:cNvGrpSpPr/>
+        <p:nvPr/>
+      </p:nvGrpSpPr>
+      <p:grpSpPr>
+        <a:xfrm>
+          <a:off x="0" y="0"/>
+          <a:ext cx="0" cy="0"/>
+          <a:chOff x="0" y="0"/>
+          <a:chExt cx="0" cy="0"/>
+        </a:xfrm>
+      </p:grpSpPr>
+      <p:sp>
+        <p:nvSpPr>
+          <p:cNvPr id="2" name="标题 1"/>
+          <p:cNvSpPr>
+            <a:spLocks noGrp="1"/>
+          </p:cNvSpPr>
+          <p:nvPr>
+            <p:ph type="title"/>
+          </p:nvPr>
+        </p:nvSpPr>
+        <p:spPr/>
+        <p:txBody>
+          <a:bodyPr>
+            <a:normAutofit/>
+          </a:bodyPr>
+          <a:lstStyle/>
+          <a:p>
+            <a:r>
+              <a:rPr lang="zh-CN" altLang="en-US" dirty="0"/>
+              <a:t>手工指定集群节点分布 </a:t>
+            </a:r>
+            <a:r>
+              <a:rPr lang="en-US" altLang="zh-CN" dirty="0"/>
+              <a:t>--- </a:t>
+            </a:r>
+            <a:r>
+              <a:rPr lang="en-US" altLang="zh-CN" sz="2000" dirty="0"/>
+              <a:t>redis_builder </a:t>
+            </a:r>
+            <a:r>
+              <a:rPr lang="zh-CN" altLang="en-US" sz="2000" dirty="0"/>
+              <a:t>创建集群</a:t>
+            </a:r>
+          </a:p>
+        </p:txBody>
+      </p:sp>
+      <p:sp>
+        <p:nvSpPr>
+          <p:cNvPr id="3" name="内容占位符 2"/>
+          <p:cNvSpPr>
+            <a:spLocks noGrp="1"/>
+          </p:cNvSpPr>
+          <p:nvPr>
+            <p:ph idx="1"/>
+          </p:nvPr>
+        </p:nvSpPr>
         <p:spPr>
           <a:xfrm>
             <a:off x="428596" y="1047733"/>
@@ -10933,15 +13160,7 @@
           <a:p>
             <a:r>
               <a:rPr lang="en-US" altLang="zh-CN" sz="1600" dirty="0"/>
-              <a:t>./</a:t>
-            </a:r>
-            <a:r>
-              <a:rPr lang="en-US" altLang="zh-CN" sz="1600" dirty="0" err="1"/>
-              <a:t>redis_builder</a:t>
-            </a:r>
-            <a:r>
-              <a:rPr lang="en-US" altLang="zh-CN" sz="1600" dirty="0"/>
-              <a:t> -a create -f cluster.xml</a:t>
+              <a:t>./redis_builder -a create -f cluster.xml</a:t>
             </a:r>
             <a:endParaRPr lang="zh-CN" altLang="en-US" sz="1600" dirty="0"/>
           </a:p>
@@ -11378,7 +13597,7 @@
 </p:sld>
 </file>
 
-<file path=ppt/slides/slide26.xml><?xml version="1.0" encoding="utf-8"?>
+<file path=ppt/slides/slide27.xml><?xml version="1.0" encoding="utf-8"?>
 <p:sld xmlns:a="http://schemas.openxmlformats.org/drawingml/2006/main" xmlns:r="http://schemas.openxmlformats.org/officeDocument/2006/relationships" xmlns:p="http://schemas.openxmlformats.org/presentationml/2006/main">
   <p:cSld>
     <p:spTree>
@@ -11419,12 +13638,8 @@
               <a:t>--- </a:t>
             </a:r>
             <a:r>
-              <a:rPr lang="en-US" altLang="zh-CN" sz="2000" dirty="0" err="1"/>
-              <a:t>redis_builder</a:t>
-            </a:r>
-            <a:r>
               <a:rPr lang="en-US" altLang="zh-CN" sz="2000" dirty="0"/>
-              <a:t> </a:t>
+              <a:t>redis_builder </a:t>
             </a:r>
             <a:r>
               <a:rPr lang="zh-CN" altLang="en-US" sz="2000" dirty="0"/>
@@ -11617,15 +13832,7 @@
           <a:p>
             <a:r>
               <a:rPr lang="en-US" altLang="zh-CN" sz="1400" dirty="0"/>
-              <a:t>./</a:t>
-            </a:r>
-            <a:r>
-              <a:rPr lang="en-US" altLang="zh-CN" sz="1400" dirty="0" err="1"/>
-              <a:t>redis_builder</a:t>
-            </a:r>
-            <a:r>
-              <a:rPr lang="en-US" altLang="zh-CN" sz="1400" dirty="0"/>
-              <a:t> -a create -f cluster.xml </a:t>
+              <a:t>./redis_builder -a create -f cluster.xml </a:t>
             </a:r>
             <a:r>
               <a:rPr lang="en-US" altLang="zh-CN" sz="1400" b="1" dirty="0"/>
@@ -11885,138 +14092,6 @@
 </p:sld>
 </file>
 
-<file path=ppt/slides/slide27.xml><?xml version="1.0" encoding="utf-8"?>
-<p:sld xmlns:a="http://schemas.openxmlformats.org/drawingml/2006/main" xmlns:r="http://schemas.openxmlformats.org/officeDocument/2006/relationships" xmlns:p="http://schemas.openxmlformats.org/presentationml/2006/main">
-  <p:cSld>
-    <p:spTree>
-      <p:nvGrpSpPr>
-        <p:cNvPr id="1" name=""/>
-        <p:cNvGrpSpPr/>
-        <p:nvPr/>
-      </p:nvGrpSpPr>
-      <p:grpSpPr>
-        <a:xfrm>
-          <a:off x="0" y="0"/>
-          <a:ext cx="0" cy="0"/>
-          <a:chOff x="0" y="0"/>
-          <a:chExt cx="0" cy="0"/>
-        </a:xfrm>
-      </p:grpSpPr>
-      <p:sp>
-        <p:nvSpPr>
-          <p:cNvPr id="2" name="标题 1"/>
-          <p:cNvSpPr>
-            <a:spLocks noGrp="1"/>
-          </p:cNvSpPr>
-          <p:nvPr>
-            <p:ph type="title"/>
-          </p:nvPr>
-        </p:nvSpPr>
-        <p:spPr/>
-        <p:txBody>
-          <a:bodyPr/>
-          <a:lstStyle/>
-          <a:p>
-            <a:r>
-              <a:rPr lang="en-US" altLang="zh-CN" dirty="0" err="1"/>
-              <a:t>redis_builder</a:t>
-            </a:r>
-            <a:r>
-              <a:rPr lang="en-US" altLang="zh-CN" dirty="0"/>
-              <a:t> </a:t>
-            </a:r>
-            <a:r>
-              <a:rPr lang="zh-CN" altLang="en-US" dirty="0"/>
-              <a:t>命令行交互界面</a:t>
-            </a:r>
-          </a:p>
-        </p:txBody>
-      </p:sp>
-      <p:sp>
-        <p:nvSpPr>
-          <p:cNvPr id="3" name="内容占位符 2"/>
-          <p:cNvSpPr>
-            <a:spLocks noGrp="1"/>
-          </p:cNvSpPr>
-          <p:nvPr>
-            <p:ph idx="1"/>
-          </p:nvPr>
-        </p:nvSpPr>
-        <p:spPr>
-          <a:xfrm>
-            <a:off x="457200" y="1124744"/>
-            <a:ext cx="8200995" cy="5066525"/>
-          </a:xfrm>
-        </p:spPr>
-        <p:txBody>
-          <a:bodyPr/>
-          <a:lstStyle/>
-          <a:p>
-            <a:endParaRPr lang="en-US" altLang="zh-CN" dirty="0"/>
-          </a:p>
-        </p:txBody>
-      </p:sp>
-      <p:pic>
-        <p:nvPicPr>
-          <p:cNvPr id="7" name="图片 6"/>
-          <p:cNvPicPr>
-            <a:picLocks noChangeAspect="1"/>
-          </p:cNvPicPr>
-          <p:nvPr/>
-        </p:nvPicPr>
-        <p:blipFill>
-          <a:blip r:embed="rId2"/>
-          <a:stretch>
-            <a:fillRect/>
-          </a:stretch>
-        </p:blipFill>
-        <p:spPr>
-          <a:xfrm>
-            <a:off x="457201" y="1124744"/>
-            <a:ext cx="8200993" cy="1704762"/>
-          </a:xfrm>
-          <a:prstGeom prst="rect">
-            <a:avLst/>
-          </a:prstGeom>
-        </p:spPr>
-      </p:pic>
-      <p:pic>
-        <p:nvPicPr>
-          <p:cNvPr id="9" name="图片 8"/>
-          <p:cNvPicPr>
-            <a:picLocks noChangeAspect="1"/>
-          </p:cNvPicPr>
-          <p:nvPr/>
-        </p:nvPicPr>
-        <p:blipFill>
-          <a:blip r:embed="rId3"/>
-          <a:stretch>
-            <a:fillRect/>
-          </a:stretch>
-        </p:blipFill>
-        <p:spPr>
-          <a:xfrm>
-            <a:off x="457201" y="2911082"/>
-            <a:ext cx="8200993" cy="3280188"/>
-          </a:xfrm>
-          <a:prstGeom prst="rect">
-            <a:avLst/>
-          </a:prstGeom>
-        </p:spPr>
-      </p:pic>
-    </p:spTree>
-    <p:extLst>
-      <p:ext uri="{BB962C8B-B14F-4D97-AF65-F5344CB8AC3E}">
-        <p14:creationId xmlns:p14="http://schemas.microsoft.com/office/powerpoint/2010/main" val="1005353876"/>
-      </p:ext>
-    </p:extLst>
-  </p:cSld>
-  <p:clrMapOvr>
-    <a:masterClrMapping/>
-  </p:clrMapOvr>
-</p:sld>
-</file>
-
 <file path=ppt/slides/slide28.xml><?xml version="1.0" encoding="utf-8"?>
 <p:sld xmlns:a="http://schemas.openxmlformats.org/drawingml/2006/main" xmlns:r="http://schemas.openxmlformats.org/officeDocument/2006/relationships" xmlns:p="http://schemas.openxmlformats.org/presentationml/2006/main">
   <p:cSld>
@@ -12050,53 +14125,47 @@
           <a:lstStyle/>
           <a:p>
             <a:r>
+              <a:rPr lang="en-US" altLang="zh-CN" dirty="0"/>
+              <a:t>redis_builder </a:t>
+            </a:r>
+            <a:r>
               <a:rPr lang="zh-CN" altLang="en-US" dirty="0"/>
-              <a:t>显示</a:t>
-            </a:r>
-            <a:r>
-              <a:rPr lang="en-US" altLang="zh-CN" dirty="0"/>
-              <a:t> </a:t>
-            </a:r>
-            <a:r>
-              <a:rPr lang="en-US" altLang="zh-CN" dirty="0" err="1"/>
-              <a:t>redis</a:t>
-            </a:r>
-            <a:r>
-              <a:rPr lang="en-US" altLang="zh-CN" dirty="0"/>
-              <a:t> </a:t>
-            </a:r>
-            <a:r>
-              <a:rPr lang="zh-CN" altLang="en-US" dirty="0"/>
-              <a:t>集群的节点分布 </a:t>
-            </a:r>
-            <a:r>
-              <a:rPr lang="en-US" altLang="zh-CN" dirty="0"/>
-              <a:t>--- </a:t>
-            </a:r>
-            <a:r>
-              <a:rPr lang="en-US" altLang="zh-CN" sz="2000" dirty="0" err="1"/>
-              <a:t>redis_builder</a:t>
-            </a:r>
-            <a:r>
-              <a:rPr lang="en-US" altLang="zh-CN" sz="2000" dirty="0"/>
-              <a:t> </a:t>
-            </a:r>
-            <a:r>
-              <a:rPr lang="zh-CN" altLang="en-US" sz="2000" dirty="0"/>
-              <a:t>使用</a:t>
-            </a:r>
+              <a:t>命令行交互界面</a:t>
+            </a:r>
+          </a:p>
+        </p:txBody>
+      </p:sp>
+      <p:sp>
+        <p:nvSpPr>
+          <p:cNvPr id="3" name="内容占位符 2"/>
+          <p:cNvSpPr>
+            <a:spLocks noGrp="1"/>
+          </p:cNvSpPr>
+          <p:nvPr>
+            <p:ph idx="1"/>
+          </p:nvPr>
+        </p:nvSpPr>
+        <p:spPr>
+          <a:xfrm>
+            <a:off x="457200" y="1124744"/>
+            <a:ext cx="8200995" cy="5066525"/>
+          </a:xfrm>
+        </p:spPr>
+        <p:txBody>
+          <a:bodyPr/>
+          <a:lstStyle/>
+          <a:p>
+            <a:endParaRPr lang="en-US" altLang="zh-CN" dirty="0"/>
           </a:p>
         </p:txBody>
       </p:sp>
       <p:pic>
         <p:nvPicPr>
-          <p:cNvPr id="4" name="内容占位符 3"/>
+          <p:cNvPr id="7" name="图片 6"/>
           <p:cNvPicPr>
-            <a:picLocks noGrp="1" noChangeAspect="1"/>
+            <a:picLocks noChangeAspect="1"/>
           </p:cNvPicPr>
-          <p:nvPr>
-            <p:ph idx="1"/>
-          </p:nvPr>
+          <p:nvPr/>
         </p:nvPicPr>
         <p:blipFill>
           <a:blip r:embed="rId2"/>
@@ -12106,8 +14175,32 @@
         </p:blipFill>
         <p:spPr>
           <a:xfrm>
-            <a:off x="457201" y="1268760"/>
-            <a:ext cx="8219255" cy="4824535"/>
+            <a:off x="457201" y="1124744"/>
+            <a:ext cx="8200993" cy="1704762"/>
+          </a:xfrm>
+          <a:prstGeom prst="rect">
+            <a:avLst/>
+          </a:prstGeom>
+        </p:spPr>
+      </p:pic>
+      <p:pic>
+        <p:nvPicPr>
+          <p:cNvPr id="9" name="图片 8"/>
+          <p:cNvPicPr>
+            <a:picLocks noChangeAspect="1"/>
+          </p:cNvPicPr>
+          <p:nvPr/>
+        </p:nvPicPr>
+        <p:blipFill>
+          <a:blip r:embed="rId3"/>
+          <a:stretch>
+            <a:fillRect/>
+          </a:stretch>
+        </p:blipFill>
+        <p:spPr>
+          <a:xfrm>
+            <a:off x="457201" y="2911082"/>
+            <a:ext cx="8200993" cy="3280188"/>
           </a:xfrm>
           <a:prstGeom prst="rect">
             <a:avLst/>
@@ -12117,7 +14210,7 @@
     </p:spTree>
     <p:extLst>
       <p:ext uri="{BB962C8B-B14F-4D97-AF65-F5344CB8AC3E}">
-        <p14:creationId xmlns:p14="http://schemas.microsoft.com/office/powerpoint/2010/main" val="371761843"/>
+        <p14:creationId xmlns:p14="http://schemas.microsoft.com/office/powerpoint/2010/main" val="1005353876"/>
       </p:ext>
     </p:extLst>
   </p:cSld>
@@ -12161,31 +14254,23 @@
           <a:p>
             <a:r>
               <a:rPr lang="zh-CN" altLang="en-US" dirty="0"/>
-              <a:t>直接运行</a:t>
-            </a:r>
-            <a:r>
-              <a:rPr lang="en-US" altLang="zh-CN" dirty="0" err="1"/>
-              <a:t>redis</a:t>
+              <a:t>显示</a:t>
             </a:r>
             <a:r>
               <a:rPr lang="en-US" altLang="zh-CN" dirty="0"/>
-              <a:t> </a:t>
+              <a:t> redis </a:t>
             </a:r>
             <a:r>
               <a:rPr lang="zh-CN" altLang="en-US" dirty="0"/>
-              <a:t>命令 </a:t>
+              <a:t>集群的节点分布 </a:t>
             </a:r>
             <a:r>
               <a:rPr lang="en-US" altLang="zh-CN" dirty="0"/>
               <a:t>--- </a:t>
             </a:r>
             <a:r>
-              <a:rPr lang="en-US" altLang="zh-CN" sz="2000" dirty="0" err="1"/>
-              <a:t>redis_builder</a:t>
-            </a:r>
-            <a:r>
               <a:rPr lang="en-US" altLang="zh-CN" sz="2000" dirty="0"/>
-              <a:t> </a:t>
+              <a:t>redis_builder </a:t>
             </a:r>
             <a:r>
               <a:rPr lang="zh-CN" altLang="en-US" sz="2000" dirty="0"/>
@@ -12205,81 +14290,15 @@
           </p:nvPr>
         </p:nvPicPr>
         <p:blipFill>
-          <a:blip r:embed="rId2">
-            <a:extLst>
-              <a:ext uri="{28A0092B-C50C-407E-A947-70E740481C1C}">
-                <a14:useLocalDpi xmlns:a14="http://schemas.microsoft.com/office/drawing/2010/main" val="0"/>
-              </a:ext>
-            </a:extLst>
-          </a:blip>
+          <a:blip r:embed="rId2"/>
           <a:stretch>
             <a:fillRect/>
           </a:stretch>
         </p:blipFill>
         <p:spPr>
           <a:xfrm>
-            <a:off x="457201" y="980728"/>
-            <a:ext cx="8147247" cy="2554153"/>
-          </a:xfrm>
-          <a:prstGeom prst="rect">
-            <a:avLst/>
-          </a:prstGeom>
-        </p:spPr>
-      </p:pic>
-      <p:pic>
-        <p:nvPicPr>
-          <p:cNvPr id="5" name="图片 4"/>
-          <p:cNvPicPr>
-            <a:picLocks noChangeAspect="1"/>
-          </p:cNvPicPr>
-          <p:nvPr/>
-        </p:nvPicPr>
-        <p:blipFill>
-          <a:blip r:embed="rId3">
-            <a:extLst>
-              <a:ext uri="{28A0092B-C50C-407E-A947-70E740481C1C}">
-                <a14:useLocalDpi xmlns:a14="http://schemas.microsoft.com/office/drawing/2010/main" val="0"/>
-              </a:ext>
-            </a:extLst>
-          </a:blip>
-          <a:stretch>
-            <a:fillRect/>
-          </a:stretch>
-        </p:blipFill>
-        <p:spPr>
-          <a:xfrm>
-            <a:off x="3923928" y="3688025"/>
-            <a:ext cx="4680520" cy="2477279"/>
-          </a:xfrm>
-          <a:prstGeom prst="rect">
-            <a:avLst/>
-          </a:prstGeom>
-        </p:spPr>
-      </p:pic>
-      <p:pic>
-        <p:nvPicPr>
-          <p:cNvPr id="6" name="图片 5"/>
-          <p:cNvPicPr>
-            <a:picLocks noChangeAspect="1"/>
-          </p:cNvPicPr>
-          <p:nvPr/>
-        </p:nvPicPr>
-        <p:blipFill>
-          <a:blip r:embed="rId4">
-            <a:extLst>
-              <a:ext uri="{28A0092B-C50C-407E-A947-70E740481C1C}">
-                <a14:useLocalDpi xmlns:a14="http://schemas.microsoft.com/office/drawing/2010/main" val="0"/>
-              </a:ext>
-            </a:extLst>
-          </a:blip>
-          <a:stretch>
-            <a:fillRect/>
-          </a:stretch>
-        </p:blipFill>
-        <p:spPr>
-          <a:xfrm>
-            <a:off x="457201" y="3688025"/>
-            <a:ext cx="3250703" cy="2477279"/>
+            <a:off x="457201" y="1268760"/>
+            <a:ext cx="8219255" cy="4824535"/>
           </a:xfrm>
           <a:prstGeom prst="rect">
             <a:avLst/>
@@ -12289,7 +14308,7 @@
     </p:spTree>
     <p:extLst>
       <p:ext uri="{BB962C8B-B14F-4D97-AF65-F5344CB8AC3E}">
-        <p14:creationId xmlns:p14="http://schemas.microsoft.com/office/powerpoint/2010/main" val="1000878735"/>
+        <p14:creationId xmlns:p14="http://schemas.microsoft.com/office/powerpoint/2010/main" val="371761843"/>
       </p:ext>
     </p:extLst>
   </p:cSld>
@@ -12483,31 +14502,23 @@
           <a:p>
             <a:r>
               <a:rPr lang="zh-CN" altLang="en-US" dirty="0"/>
-              <a:t>显示 </a:t>
-            </a:r>
-            <a:r>
-              <a:rPr lang="en-US" altLang="zh-CN" dirty="0" err="1"/>
-              <a:t>redis</a:t>
+              <a:t>直接运行</a:t>
             </a:r>
             <a:r>
               <a:rPr lang="en-US" altLang="zh-CN" dirty="0"/>
-              <a:t> </a:t>
+              <a:t>redis </a:t>
             </a:r>
             <a:r>
               <a:rPr lang="zh-CN" altLang="en-US" dirty="0"/>
-              <a:t>集群的运行状态 </a:t>
+              <a:t>命令 </a:t>
             </a:r>
             <a:r>
               <a:rPr lang="en-US" altLang="zh-CN" dirty="0"/>
               <a:t>--- </a:t>
             </a:r>
             <a:r>
-              <a:rPr lang="en-US" altLang="zh-CN" sz="2000" dirty="0" err="1"/>
-              <a:t>redis_builder</a:t>
-            </a:r>
-            <a:r>
               <a:rPr lang="en-US" altLang="zh-CN" sz="2000" dirty="0"/>
-              <a:t> </a:t>
+              <a:t>redis_builder </a:t>
             </a:r>
             <a:r>
               <a:rPr lang="zh-CN" altLang="en-US" sz="2000" dirty="0"/>
@@ -12540,6 +14551,170 @@
         </p:blipFill>
         <p:spPr>
           <a:xfrm>
+            <a:off x="457201" y="980728"/>
+            <a:ext cx="8147247" cy="2554153"/>
+          </a:xfrm>
+          <a:prstGeom prst="rect">
+            <a:avLst/>
+          </a:prstGeom>
+        </p:spPr>
+      </p:pic>
+      <p:pic>
+        <p:nvPicPr>
+          <p:cNvPr id="5" name="图片 4"/>
+          <p:cNvPicPr>
+            <a:picLocks noChangeAspect="1"/>
+          </p:cNvPicPr>
+          <p:nvPr/>
+        </p:nvPicPr>
+        <p:blipFill>
+          <a:blip r:embed="rId3">
+            <a:extLst>
+              <a:ext uri="{28A0092B-C50C-407E-A947-70E740481C1C}">
+                <a14:useLocalDpi xmlns:a14="http://schemas.microsoft.com/office/drawing/2010/main" val="0"/>
+              </a:ext>
+            </a:extLst>
+          </a:blip>
+          <a:stretch>
+            <a:fillRect/>
+          </a:stretch>
+        </p:blipFill>
+        <p:spPr>
+          <a:xfrm>
+            <a:off x="3923928" y="3688025"/>
+            <a:ext cx="4680520" cy="2477279"/>
+          </a:xfrm>
+          <a:prstGeom prst="rect">
+            <a:avLst/>
+          </a:prstGeom>
+        </p:spPr>
+      </p:pic>
+      <p:pic>
+        <p:nvPicPr>
+          <p:cNvPr id="6" name="图片 5"/>
+          <p:cNvPicPr>
+            <a:picLocks noChangeAspect="1"/>
+          </p:cNvPicPr>
+          <p:nvPr/>
+        </p:nvPicPr>
+        <p:blipFill>
+          <a:blip r:embed="rId4">
+            <a:extLst>
+              <a:ext uri="{28A0092B-C50C-407E-A947-70E740481C1C}">
+                <a14:useLocalDpi xmlns:a14="http://schemas.microsoft.com/office/drawing/2010/main" val="0"/>
+              </a:ext>
+            </a:extLst>
+          </a:blip>
+          <a:stretch>
+            <a:fillRect/>
+          </a:stretch>
+        </p:blipFill>
+        <p:spPr>
+          <a:xfrm>
+            <a:off x="457201" y="3688025"/>
+            <a:ext cx="3250703" cy="2477279"/>
+          </a:xfrm>
+          <a:prstGeom prst="rect">
+            <a:avLst/>
+          </a:prstGeom>
+        </p:spPr>
+      </p:pic>
+    </p:spTree>
+    <p:extLst>
+      <p:ext uri="{BB962C8B-B14F-4D97-AF65-F5344CB8AC3E}">
+        <p14:creationId xmlns:p14="http://schemas.microsoft.com/office/powerpoint/2010/main" val="1000878735"/>
+      </p:ext>
+    </p:extLst>
+  </p:cSld>
+  <p:clrMapOvr>
+    <a:masterClrMapping/>
+  </p:clrMapOvr>
+</p:sld>
+</file>
+
+<file path=ppt/slides/slide31.xml><?xml version="1.0" encoding="utf-8"?>
+<p:sld xmlns:a="http://schemas.openxmlformats.org/drawingml/2006/main" xmlns:r="http://schemas.openxmlformats.org/officeDocument/2006/relationships" xmlns:p="http://schemas.openxmlformats.org/presentationml/2006/main">
+  <p:cSld>
+    <p:spTree>
+      <p:nvGrpSpPr>
+        <p:cNvPr id="1" name=""/>
+        <p:cNvGrpSpPr/>
+        <p:nvPr/>
+      </p:nvGrpSpPr>
+      <p:grpSpPr>
+        <a:xfrm>
+          <a:off x="0" y="0"/>
+          <a:ext cx="0" cy="0"/>
+          <a:chOff x="0" y="0"/>
+          <a:chExt cx="0" cy="0"/>
+        </a:xfrm>
+      </p:grpSpPr>
+      <p:sp>
+        <p:nvSpPr>
+          <p:cNvPr id="2" name="标题 1"/>
+          <p:cNvSpPr>
+            <a:spLocks noGrp="1"/>
+          </p:cNvSpPr>
+          <p:nvPr>
+            <p:ph type="title"/>
+          </p:nvPr>
+        </p:nvSpPr>
+        <p:spPr/>
+        <p:txBody>
+          <a:bodyPr/>
+          <a:lstStyle/>
+          <a:p>
+            <a:r>
+              <a:rPr lang="zh-CN" altLang="en-US" dirty="0"/>
+              <a:t>显示 </a:t>
+            </a:r>
+            <a:r>
+              <a:rPr lang="en-US" altLang="zh-CN" dirty="0"/>
+              <a:t>redis </a:t>
+            </a:r>
+            <a:r>
+              <a:rPr lang="zh-CN" altLang="en-US" dirty="0"/>
+              <a:t>集群的运行状态 </a:t>
+            </a:r>
+            <a:r>
+              <a:rPr lang="en-US" altLang="zh-CN" dirty="0"/>
+              <a:t>--- </a:t>
+            </a:r>
+            <a:r>
+              <a:rPr lang="en-US" altLang="zh-CN" sz="2000" dirty="0"/>
+              <a:t>redis_builder </a:t>
+            </a:r>
+            <a:r>
+              <a:rPr lang="zh-CN" altLang="en-US" sz="2000" dirty="0"/>
+              <a:t>使用</a:t>
+            </a:r>
+          </a:p>
+        </p:txBody>
+      </p:sp>
+      <p:pic>
+        <p:nvPicPr>
+          <p:cNvPr id="4" name="内容占位符 3"/>
+          <p:cNvPicPr>
+            <a:picLocks noGrp="1" noChangeAspect="1"/>
+          </p:cNvPicPr>
+          <p:nvPr>
+            <p:ph idx="1"/>
+          </p:nvPr>
+        </p:nvPicPr>
+        <p:blipFill>
+          <a:blip r:embed="rId2">
+            <a:extLst>
+              <a:ext uri="{28A0092B-C50C-407E-A947-70E740481C1C}">
+                <a14:useLocalDpi xmlns:a14="http://schemas.microsoft.com/office/drawing/2010/main" val="0"/>
+              </a:ext>
+            </a:extLst>
+          </a:blip>
+          <a:stretch>
+            <a:fillRect/>
+          </a:stretch>
+        </p:blipFill>
+        <p:spPr>
+          <a:xfrm>
             <a:off x="457201" y="1196752"/>
             <a:ext cx="8075239" cy="4680520"/>
           </a:xfrm>
@@ -12558,7 +14733,7 @@
 </p:sld>
 </file>
 
-<file path=ppt/slides/slide31.xml><?xml version="1.0" encoding="utf-8"?>
+<file path=ppt/slides/slide32.xml><?xml version="1.0" encoding="utf-8"?>
 <p:sld xmlns:a="http://schemas.openxmlformats.org/drawingml/2006/main" xmlns:r="http://schemas.openxmlformats.org/officeDocument/2006/relationships" xmlns:p="http://schemas.openxmlformats.org/presentationml/2006/main">
   <p:cSld>
     <p:spTree>
@@ -15999,12 +18174,8 @@
           <a:lstStyle/>
           <a:p>
             <a:r>
-              <a:rPr lang="en-US" altLang="zh-CN" sz="1800" dirty="0" err="1"/>
-              <a:t>Redis</a:t>
-            </a:r>
-            <a:r>
               <a:rPr lang="en-US" altLang="zh-CN" sz="1800" dirty="0"/>
-              <a:t> </a:t>
+              <a:t>Redis </a:t>
             </a:r>
             <a:r>
               <a:rPr lang="zh-CN" altLang="en-US" sz="1800" dirty="0"/>

</xml_diff>